<commit_message>
only indel and only snp data
</commit_message>
<xml_diff>
--- a/short_genetic_variants/docs/short_indels_v05.pptx
+++ b/short_genetic_variants/docs/short_indels_v05.pptx
@@ -5,12 +5,13 @@
     <p:sldMasterId id="2147483648" r:id="rId1"/>
   </p:sldMasterIdLst>
   <p:notesMasterIdLst>
-    <p:notesMasterId r:id="rId5"/>
+    <p:notesMasterId r:id="rId6"/>
   </p:notesMasterIdLst>
   <p:sldIdLst>
     <p:sldId id="256" r:id="rId2"/>
     <p:sldId id="257" r:id="rId3"/>
     <p:sldId id="258" r:id="rId4"/>
+    <p:sldId id="259" r:id="rId5"/>
   </p:sldIdLst>
   <p:sldSz cx="12192000" cy="6858000"/>
   <p:notesSz cx="6858000" cy="9144000"/>
@@ -199,7 +200,7 @@
           <a:p>
             <a:fld id="{ADC703C6-BB32-1847-9BA4-6A93FF920BED}" type="datetimeFigureOut">
               <a:rPr lang="en-GB" smtClean="0"/>
-              <a:t>17/09/2020</a:t>
+              <a:t>22/09/2020</a:t>
             </a:fld>
             <a:endParaRPr lang="en-GB"/>
           </a:p>
@@ -616,7 +617,7 @@
           <a:p>
             <a:fld id="{5C316670-22DA-CE45-BF19-C0B19D676291}" type="datetimeFigureOut">
               <a:rPr lang="en-GB" smtClean="0"/>
-              <a:t>17/09/2020</a:t>
+              <a:t>22/09/2020</a:t>
             </a:fld>
             <a:endParaRPr lang="en-GB"/>
           </a:p>
@@ -816,7 +817,7 @@
           <a:p>
             <a:fld id="{5C316670-22DA-CE45-BF19-C0B19D676291}" type="datetimeFigureOut">
               <a:rPr lang="en-GB" smtClean="0"/>
-              <a:t>17/09/2020</a:t>
+              <a:t>22/09/2020</a:t>
             </a:fld>
             <a:endParaRPr lang="en-GB"/>
           </a:p>
@@ -1026,7 +1027,7 @@
           <a:p>
             <a:fld id="{5C316670-22DA-CE45-BF19-C0B19D676291}" type="datetimeFigureOut">
               <a:rPr lang="en-GB" smtClean="0"/>
-              <a:t>17/09/2020</a:t>
+              <a:t>22/09/2020</a:t>
             </a:fld>
             <a:endParaRPr lang="en-GB"/>
           </a:p>
@@ -1226,7 +1227,7 @@
           <a:p>
             <a:fld id="{5C316670-22DA-CE45-BF19-C0B19D676291}" type="datetimeFigureOut">
               <a:rPr lang="en-GB" smtClean="0"/>
-              <a:t>17/09/2020</a:t>
+              <a:t>22/09/2020</a:t>
             </a:fld>
             <a:endParaRPr lang="en-GB"/>
           </a:p>
@@ -1502,7 +1503,7 @@
           <a:p>
             <a:fld id="{5C316670-22DA-CE45-BF19-C0B19D676291}" type="datetimeFigureOut">
               <a:rPr lang="en-GB" smtClean="0"/>
-              <a:t>17/09/2020</a:t>
+              <a:t>22/09/2020</a:t>
             </a:fld>
             <a:endParaRPr lang="en-GB"/>
           </a:p>
@@ -1770,7 +1771,7 @@
           <a:p>
             <a:fld id="{5C316670-22DA-CE45-BF19-C0B19D676291}" type="datetimeFigureOut">
               <a:rPr lang="en-GB" smtClean="0"/>
-              <a:t>17/09/2020</a:t>
+              <a:t>22/09/2020</a:t>
             </a:fld>
             <a:endParaRPr lang="en-GB"/>
           </a:p>
@@ -2185,7 +2186,7 @@
           <a:p>
             <a:fld id="{5C316670-22DA-CE45-BF19-C0B19D676291}" type="datetimeFigureOut">
               <a:rPr lang="en-GB" smtClean="0"/>
-              <a:t>17/09/2020</a:t>
+              <a:t>22/09/2020</a:t>
             </a:fld>
             <a:endParaRPr lang="en-GB"/>
           </a:p>
@@ -2327,7 +2328,7 @@
           <a:p>
             <a:fld id="{5C316670-22DA-CE45-BF19-C0B19D676291}" type="datetimeFigureOut">
               <a:rPr lang="en-GB" smtClean="0"/>
-              <a:t>17/09/2020</a:t>
+              <a:t>22/09/2020</a:t>
             </a:fld>
             <a:endParaRPr lang="en-GB"/>
           </a:p>
@@ -2440,7 +2441,7 @@
           <a:p>
             <a:fld id="{5C316670-22DA-CE45-BF19-C0B19D676291}" type="datetimeFigureOut">
               <a:rPr lang="en-GB" smtClean="0"/>
-              <a:t>17/09/2020</a:t>
+              <a:t>22/09/2020</a:t>
             </a:fld>
             <a:endParaRPr lang="en-GB"/>
           </a:p>
@@ -2753,7 +2754,7 @@
           <a:p>
             <a:fld id="{5C316670-22DA-CE45-BF19-C0B19D676291}" type="datetimeFigureOut">
               <a:rPr lang="en-GB" smtClean="0"/>
-              <a:t>17/09/2020</a:t>
+              <a:t>22/09/2020</a:t>
             </a:fld>
             <a:endParaRPr lang="en-GB"/>
           </a:p>
@@ -3042,7 +3043,7 @@
           <a:p>
             <a:fld id="{5C316670-22DA-CE45-BF19-C0B19D676291}" type="datetimeFigureOut">
               <a:rPr lang="en-GB" smtClean="0"/>
-              <a:t>17/09/2020</a:t>
+              <a:t>22/09/2020</a:t>
             </a:fld>
             <a:endParaRPr lang="en-GB"/>
           </a:p>
@@ -3285,7 +3286,7 @@
           <a:p>
             <a:fld id="{5C316670-22DA-CE45-BF19-C0B19D676291}" type="datetimeFigureOut">
               <a:rPr lang="en-GB" smtClean="0"/>
-              <a:t>17/09/2020</a:t>
+              <a:t>22/09/2020</a:t>
             </a:fld>
             <a:endParaRPr lang="en-GB"/>
           </a:p>
@@ -9663,6 +9664,76 @@
     <p:extLst>
       <p:ext uri="{BB962C8B-B14F-4D97-AF65-F5344CB8AC3E}">
         <p14:creationId xmlns:p14="http://schemas.microsoft.com/office/powerpoint/2010/main" val="2046394355"/>
+      </p:ext>
+    </p:extLst>
+  </p:cSld>
+  <p:clrMapOvr>
+    <a:masterClrMapping/>
+  </p:clrMapOvr>
+</p:sld>
+</file>
+
+<file path=ppt/slides/slide4.xml><?xml version="1.0" encoding="utf-8"?>
+<p:sld xmlns:a="http://schemas.openxmlformats.org/drawingml/2006/main" xmlns:r="http://schemas.openxmlformats.org/officeDocument/2006/relationships" xmlns:p="http://schemas.openxmlformats.org/presentationml/2006/main">
+  <p:cSld>
+    <p:spTree>
+      <p:nvGrpSpPr>
+        <p:cNvPr id="1" name=""/>
+        <p:cNvGrpSpPr/>
+        <p:nvPr/>
+      </p:nvGrpSpPr>
+      <p:grpSpPr>
+        <a:xfrm>
+          <a:off x="0" y="0"/>
+          <a:ext cx="0" cy="0"/>
+          <a:chOff x="0" y="0"/>
+          <a:chExt cx="0" cy="0"/>
+        </a:xfrm>
+      </p:grpSpPr>
+      <p:sp>
+        <p:nvSpPr>
+          <p:cNvPr id="2" name="Rectangle 1">
+            <a:extLst>
+              <a:ext uri="{FF2B5EF4-FFF2-40B4-BE49-F238E27FC236}">
+                <a16:creationId xmlns:a16="http://schemas.microsoft.com/office/drawing/2014/main" id="{BB1D6925-4CD7-C545-B456-6B1095D358BE}"/>
+              </a:ext>
+            </a:extLst>
+          </p:cNvPr>
+          <p:cNvSpPr/>
+          <p:nvPr/>
+        </p:nvSpPr>
+        <p:spPr>
+          <a:xfrm>
+            <a:off x="293914" y="329977"/>
+            <a:ext cx="6096000" cy="646331"/>
+          </a:xfrm>
+          <a:prstGeom prst="rect">
+            <a:avLst/>
+          </a:prstGeom>
+        </p:spPr>
+        <p:txBody>
+          <a:bodyPr>
+            <a:spAutoFit/>
+          </a:bodyPr>
+          <a:lstStyle/>
+          <a:p>
+            <a:r>
+              <a:rPr lang="en-US" dirty="0">
+                <a:solidFill>
+                  <a:srgbClr val="000000"/>
+                </a:solidFill>
+                <a:latin typeface="Cambria" panose="02040503050406030204" pitchFamily="18" charset="0"/>
+              </a:rPr>
+              <a:t>if biased gene conversion is common, the SFS might differ depending on whether the ancestral allele was A,C,G or T.</a:t>
+            </a:r>
+            <a:endParaRPr lang="en-GB" dirty="0"/>
+          </a:p>
+        </p:txBody>
+      </p:sp>
+    </p:spTree>
+    <p:extLst>
+      <p:ext uri="{BB962C8B-B14F-4D97-AF65-F5344CB8AC3E}">
+        <p14:creationId xmlns:p14="http://schemas.microsoft.com/office/powerpoint/2010/main" val="3167113446"/>
       </p:ext>
     </p:extLst>
   </p:cSld>

</xml_diff>

<commit_message>
pairwise combinations of annotation
</commit_message>
<xml_diff>
--- a/short_genetic_variants/docs/short_indels_v05.pptx
+++ b/short_genetic_variants/docs/short_indels_v05.pptx
@@ -5,13 +5,16 @@
     <p:sldMasterId id="2147483648" r:id="rId1"/>
   </p:sldMasterIdLst>
   <p:notesMasterIdLst>
-    <p:notesMasterId r:id="rId6"/>
+    <p:notesMasterId r:id="rId9"/>
   </p:notesMasterIdLst>
   <p:sldIdLst>
     <p:sldId id="256" r:id="rId2"/>
     <p:sldId id="257" r:id="rId3"/>
-    <p:sldId id="258" r:id="rId4"/>
-    <p:sldId id="259" r:id="rId5"/>
+    <p:sldId id="260" r:id="rId4"/>
+    <p:sldId id="261" r:id="rId5"/>
+    <p:sldId id="262" r:id="rId6"/>
+    <p:sldId id="259" r:id="rId7"/>
+    <p:sldId id="258" r:id="rId8"/>
   </p:sldIdLst>
   <p:sldSz cx="12192000" cy="6858000"/>
   <p:notesSz cx="6858000" cy="9144000"/>
@@ -200,7 +203,7 @@
           <a:p>
             <a:fld id="{ADC703C6-BB32-1847-9BA4-6A93FF920BED}" type="datetimeFigureOut">
               <a:rPr lang="en-GB" smtClean="0"/>
-              <a:t>22/09/2020</a:t>
+              <a:t>23/09/2020</a:t>
             </a:fld>
             <a:endParaRPr lang="en-GB"/>
           </a:p>
@@ -617,7 +620,7 @@
           <a:p>
             <a:fld id="{5C316670-22DA-CE45-BF19-C0B19D676291}" type="datetimeFigureOut">
               <a:rPr lang="en-GB" smtClean="0"/>
-              <a:t>22/09/2020</a:t>
+              <a:t>23/09/2020</a:t>
             </a:fld>
             <a:endParaRPr lang="en-GB"/>
           </a:p>
@@ -817,7 +820,7 @@
           <a:p>
             <a:fld id="{5C316670-22DA-CE45-BF19-C0B19D676291}" type="datetimeFigureOut">
               <a:rPr lang="en-GB" smtClean="0"/>
-              <a:t>22/09/2020</a:t>
+              <a:t>23/09/2020</a:t>
             </a:fld>
             <a:endParaRPr lang="en-GB"/>
           </a:p>
@@ -1027,7 +1030,7 @@
           <a:p>
             <a:fld id="{5C316670-22DA-CE45-BF19-C0B19D676291}" type="datetimeFigureOut">
               <a:rPr lang="en-GB" smtClean="0"/>
-              <a:t>22/09/2020</a:t>
+              <a:t>23/09/2020</a:t>
             </a:fld>
             <a:endParaRPr lang="en-GB"/>
           </a:p>
@@ -1227,7 +1230,7 @@
           <a:p>
             <a:fld id="{5C316670-22DA-CE45-BF19-C0B19D676291}" type="datetimeFigureOut">
               <a:rPr lang="en-GB" smtClean="0"/>
-              <a:t>22/09/2020</a:t>
+              <a:t>23/09/2020</a:t>
             </a:fld>
             <a:endParaRPr lang="en-GB"/>
           </a:p>
@@ -1503,7 +1506,7 @@
           <a:p>
             <a:fld id="{5C316670-22DA-CE45-BF19-C0B19D676291}" type="datetimeFigureOut">
               <a:rPr lang="en-GB" smtClean="0"/>
-              <a:t>22/09/2020</a:t>
+              <a:t>23/09/2020</a:t>
             </a:fld>
             <a:endParaRPr lang="en-GB"/>
           </a:p>
@@ -1771,7 +1774,7 @@
           <a:p>
             <a:fld id="{5C316670-22DA-CE45-BF19-C0B19D676291}" type="datetimeFigureOut">
               <a:rPr lang="en-GB" smtClean="0"/>
-              <a:t>22/09/2020</a:t>
+              <a:t>23/09/2020</a:t>
             </a:fld>
             <a:endParaRPr lang="en-GB"/>
           </a:p>
@@ -2186,7 +2189,7 @@
           <a:p>
             <a:fld id="{5C316670-22DA-CE45-BF19-C0B19D676291}" type="datetimeFigureOut">
               <a:rPr lang="en-GB" smtClean="0"/>
-              <a:t>22/09/2020</a:t>
+              <a:t>23/09/2020</a:t>
             </a:fld>
             <a:endParaRPr lang="en-GB"/>
           </a:p>
@@ -2328,7 +2331,7 @@
           <a:p>
             <a:fld id="{5C316670-22DA-CE45-BF19-C0B19D676291}" type="datetimeFigureOut">
               <a:rPr lang="en-GB" smtClean="0"/>
-              <a:t>22/09/2020</a:t>
+              <a:t>23/09/2020</a:t>
             </a:fld>
             <a:endParaRPr lang="en-GB"/>
           </a:p>
@@ -2441,7 +2444,7 @@
           <a:p>
             <a:fld id="{5C316670-22DA-CE45-BF19-C0B19D676291}" type="datetimeFigureOut">
               <a:rPr lang="en-GB" smtClean="0"/>
-              <a:t>22/09/2020</a:t>
+              <a:t>23/09/2020</a:t>
             </a:fld>
             <a:endParaRPr lang="en-GB"/>
           </a:p>
@@ -2754,7 +2757,7 @@
           <a:p>
             <a:fld id="{5C316670-22DA-CE45-BF19-C0B19D676291}" type="datetimeFigureOut">
               <a:rPr lang="en-GB" smtClean="0"/>
-              <a:t>22/09/2020</a:t>
+              <a:t>23/09/2020</a:t>
             </a:fld>
             <a:endParaRPr lang="en-GB"/>
           </a:p>
@@ -3043,7 +3046,7 @@
           <a:p>
             <a:fld id="{5C316670-22DA-CE45-BF19-C0B19D676291}" type="datetimeFigureOut">
               <a:rPr lang="en-GB" smtClean="0"/>
-              <a:t>22/09/2020</a:t>
+              <a:t>23/09/2020</a:t>
             </a:fld>
             <a:endParaRPr lang="en-GB"/>
           </a:p>
@@ -3286,7 +3289,7 @@
           <a:p>
             <a:fld id="{5C316670-22DA-CE45-BF19-C0B19D676291}" type="datetimeFigureOut">
               <a:rPr lang="en-GB" smtClean="0"/>
-              <a:t>22/09/2020</a:t>
+              <a:t>23/09/2020</a:t>
             </a:fld>
             <a:endParaRPr lang="en-GB"/>
           </a:p>
@@ -3999,6 +4002,3104 @@
           <a:chExt cx="0" cy="0"/>
         </a:xfrm>
       </p:grpSpPr>
+      <p:sp>
+        <p:nvSpPr>
+          <p:cNvPr id="2" name="TextBox 1">
+            <a:extLst>
+              <a:ext uri="{FF2B5EF4-FFF2-40B4-BE49-F238E27FC236}">
+                <a16:creationId xmlns:a16="http://schemas.microsoft.com/office/drawing/2014/main" id="{C95969F1-B674-114B-B3E4-0FB4C9FE44A9}"/>
+              </a:ext>
+            </a:extLst>
+          </p:cNvPr>
+          <p:cNvSpPr txBox="1"/>
+          <p:nvPr/>
+        </p:nvSpPr>
+        <p:spPr>
+          <a:xfrm>
+            <a:off x="3381278" y="473469"/>
+            <a:ext cx="833883" cy="369332"/>
+          </a:xfrm>
+          <a:prstGeom prst="rect">
+            <a:avLst/>
+          </a:prstGeom>
+          <a:noFill/>
+          <a:ln w="28575">
+            <a:solidFill>
+              <a:srgbClr val="00B050"/>
+            </a:solidFill>
+          </a:ln>
+        </p:spPr>
+        <p:txBody>
+          <a:bodyPr wrap="none" rtlCol="0">
+            <a:spAutoFit/>
+          </a:bodyPr>
+          <a:lstStyle/>
+          <a:p>
+            <a:r>
+              <a:rPr lang="en-GB" dirty="0"/>
+              <a:t>INDELs</a:t>
+            </a:r>
+          </a:p>
+        </p:txBody>
+      </p:sp>
+      <p:sp>
+        <p:nvSpPr>
+          <p:cNvPr id="3" name="TextBox 2">
+            <a:extLst>
+              <a:ext uri="{FF2B5EF4-FFF2-40B4-BE49-F238E27FC236}">
+                <a16:creationId xmlns:a16="http://schemas.microsoft.com/office/drawing/2014/main" id="{7D95E3FD-F43F-C446-B986-41F070B85DE2}"/>
+              </a:ext>
+            </a:extLst>
+          </p:cNvPr>
+          <p:cNvSpPr txBox="1"/>
+          <p:nvPr/>
+        </p:nvSpPr>
+        <p:spPr>
+          <a:xfrm>
+            <a:off x="7021220" y="2417588"/>
+            <a:ext cx="835485" cy="369332"/>
+          </a:xfrm>
+          <a:prstGeom prst="rect">
+            <a:avLst/>
+          </a:prstGeom>
+          <a:noFill/>
+          <a:ln w="38100">
+            <a:solidFill>
+              <a:srgbClr val="00B050"/>
+            </a:solidFill>
+          </a:ln>
+        </p:spPr>
+        <p:txBody>
+          <a:bodyPr wrap="none" rtlCol="0">
+            <a:spAutoFit/>
+          </a:bodyPr>
+          <a:lstStyle>
+            <a:defPPr>
+              <a:defRPr lang="en-US"/>
+            </a:defPPr>
+          </a:lstStyle>
+          <a:p>
+            <a:r>
+              <a:rPr lang="en-GB" dirty="0"/>
+              <a:t>Coding</a:t>
+            </a:r>
+          </a:p>
+        </p:txBody>
+      </p:sp>
+      <p:sp>
+        <p:nvSpPr>
+          <p:cNvPr id="4" name="TextBox 3">
+            <a:extLst>
+              <a:ext uri="{FF2B5EF4-FFF2-40B4-BE49-F238E27FC236}">
+                <a16:creationId xmlns:a16="http://schemas.microsoft.com/office/drawing/2014/main" id="{A56E0855-197B-D747-A162-02EBFD66CC04}"/>
+              </a:ext>
+            </a:extLst>
+          </p:cNvPr>
+          <p:cNvSpPr txBox="1"/>
+          <p:nvPr/>
+        </p:nvSpPr>
+        <p:spPr>
+          <a:xfrm>
+            <a:off x="4793000" y="2417591"/>
+            <a:ext cx="1271182" cy="369332"/>
+          </a:xfrm>
+          <a:prstGeom prst="rect">
+            <a:avLst/>
+          </a:prstGeom>
+          <a:noFill/>
+          <a:ln w="38100">
+            <a:solidFill>
+              <a:srgbClr val="00B050"/>
+            </a:solidFill>
+          </a:ln>
+        </p:spPr>
+        <p:txBody>
+          <a:bodyPr wrap="none" rtlCol="0">
+            <a:spAutoFit/>
+          </a:bodyPr>
+          <a:lstStyle>
+            <a:defPPr>
+              <a:defRPr lang="en-US"/>
+            </a:defPPr>
+          </a:lstStyle>
+          <a:p>
+            <a:r>
+              <a:rPr lang="en-GB"/>
+              <a:t>Non-coding</a:t>
+            </a:r>
+            <a:endParaRPr lang="en-GB" dirty="0"/>
+          </a:p>
+        </p:txBody>
+      </p:sp>
+      <p:sp>
+        <p:nvSpPr>
+          <p:cNvPr id="5" name="TextBox 4">
+            <a:extLst>
+              <a:ext uri="{FF2B5EF4-FFF2-40B4-BE49-F238E27FC236}">
+                <a16:creationId xmlns:a16="http://schemas.microsoft.com/office/drawing/2014/main" id="{8D541765-0790-C94F-B96D-E576B6576D70}"/>
+              </a:ext>
+            </a:extLst>
+          </p:cNvPr>
+          <p:cNvSpPr txBox="1"/>
+          <p:nvPr/>
+        </p:nvSpPr>
+        <p:spPr>
+          <a:xfrm>
+            <a:off x="2268473" y="1322300"/>
+            <a:ext cx="1112805" cy="369332"/>
+          </a:xfrm>
+          <a:prstGeom prst="rect">
+            <a:avLst/>
+          </a:prstGeom>
+          <a:noFill/>
+          <a:ln w="28575">
+            <a:solidFill>
+              <a:srgbClr val="00B050"/>
+            </a:solidFill>
+          </a:ln>
+        </p:spPr>
+        <p:txBody>
+          <a:bodyPr wrap="none" rtlCol="0">
+            <a:spAutoFit/>
+          </a:bodyPr>
+          <a:lstStyle>
+            <a:defPPr>
+              <a:defRPr lang="en-US"/>
+            </a:defPPr>
+          </a:lstStyle>
+          <a:p>
+            <a:r>
+              <a:rPr lang="en-GB" dirty="0"/>
+              <a:t>Insertions</a:t>
+            </a:r>
+          </a:p>
+        </p:txBody>
+      </p:sp>
+      <p:sp>
+        <p:nvSpPr>
+          <p:cNvPr id="6" name="TextBox 5">
+            <a:extLst>
+              <a:ext uri="{FF2B5EF4-FFF2-40B4-BE49-F238E27FC236}">
+                <a16:creationId xmlns:a16="http://schemas.microsoft.com/office/drawing/2014/main" id="{FB6206D8-1280-5442-AF0D-E4083F85FBC9}"/>
+              </a:ext>
+            </a:extLst>
+          </p:cNvPr>
+          <p:cNvSpPr txBox="1"/>
+          <p:nvPr/>
+        </p:nvSpPr>
+        <p:spPr>
+          <a:xfrm>
+            <a:off x="4215161" y="1293540"/>
+            <a:ext cx="1073114" cy="369332"/>
+          </a:xfrm>
+          <a:prstGeom prst="rect">
+            <a:avLst/>
+          </a:prstGeom>
+          <a:noFill/>
+          <a:ln w="28575">
+            <a:solidFill>
+              <a:srgbClr val="00B050"/>
+            </a:solidFill>
+          </a:ln>
+        </p:spPr>
+        <p:txBody>
+          <a:bodyPr wrap="none" rtlCol="0">
+            <a:spAutoFit/>
+          </a:bodyPr>
+          <a:lstStyle>
+            <a:defPPr>
+              <a:defRPr lang="en-US"/>
+            </a:defPPr>
+          </a:lstStyle>
+          <a:p>
+            <a:r>
+              <a:rPr lang="en-GB" dirty="0"/>
+              <a:t>Deletions</a:t>
+            </a:r>
+          </a:p>
+        </p:txBody>
+      </p:sp>
+      <p:sp>
+        <p:nvSpPr>
+          <p:cNvPr id="7" name="TextBox 6">
+            <a:extLst>
+              <a:ext uri="{FF2B5EF4-FFF2-40B4-BE49-F238E27FC236}">
+                <a16:creationId xmlns:a16="http://schemas.microsoft.com/office/drawing/2014/main" id="{D8F12F0E-1934-B447-95AE-5E014D8B94E2}"/>
+              </a:ext>
+            </a:extLst>
+          </p:cNvPr>
+          <p:cNvSpPr txBox="1"/>
+          <p:nvPr/>
+        </p:nvSpPr>
+        <p:spPr>
+          <a:xfrm>
+            <a:off x="8464602" y="3647796"/>
+            <a:ext cx="919162" cy="369332"/>
+          </a:xfrm>
+          <a:prstGeom prst="rect">
+            <a:avLst/>
+          </a:prstGeom>
+          <a:noFill/>
+          <a:ln w="38100">
+            <a:solidFill>
+              <a:srgbClr val="00B050"/>
+            </a:solidFill>
+          </a:ln>
+        </p:spPr>
+        <p:txBody>
+          <a:bodyPr wrap="none" rtlCol="0">
+            <a:spAutoFit/>
+          </a:bodyPr>
+          <a:lstStyle>
+            <a:defPPr>
+              <a:defRPr lang="en-US"/>
+            </a:defPPr>
+          </a:lstStyle>
+          <a:p>
+            <a:r>
+              <a:rPr lang="en-GB" dirty="0"/>
+              <a:t>Inframe</a:t>
+            </a:r>
+          </a:p>
+        </p:txBody>
+      </p:sp>
+      <p:sp>
+        <p:nvSpPr>
+          <p:cNvPr id="8" name="TextBox 7">
+            <a:extLst>
+              <a:ext uri="{FF2B5EF4-FFF2-40B4-BE49-F238E27FC236}">
+                <a16:creationId xmlns:a16="http://schemas.microsoft.com/office/drawing/2014/main" id="{AD7E155A-D4FD-F641-94BF-E516F3703C44}"/>
+              </a:ext>
+            </a:extLst>
+          </p:cNvPr>
+          <p:cNvSpPr txBox="1"/>
+          <p:nvPr/>
+        </p:nvSpPr>
+        <p:spPr>
+          <a:xfrm>
+            <a:off x="6985705" y="3647796"/>
+            <a:ext cx="1188210" cy="369332"/>
+          </a:xfrm>
+          <a:prstGeom prst="rect">
+            <a:avLst/>
+          </a:prstGeom>
+          <a:noFill/>
+          <a:ln w="28575">
+            <a:solidFill>
+              <a:srgbClr val="00B050"/>
+            </a:solidFill>
+          </a:ln>
+        </p:spPr>
+        <p:txBody>
+          <a:bodyPr wrap="none" rtlCol="0">
+            <a:spAutoFit/>
+          </a:bodyPr>
+          <a:lstStyle>
+            <a:defPPr>
+              <a:defRPr lang="en-US"/>
+            </a:defPPr>
+          </a:lstStyle>
+          <a:p>
+            <a:r>
+              <a:rPr lang="en-GB" dirty="0"/>
+              <a:t>Frameshift</a:t>
+            </a:r>
+          </a:p>
+        </p:txBody>
+      </p:sp>
+      <p:sp>
+        <p:nvSpPr>
+          <p:cNvPr id="9" name="TextBox 8">
+            <a:extLst>
+              <a:ext uri="{FF2B5EF4-FFF2-40B4-BE49-F238E27FC236}">
+                <a16:creationId xmlns:a16="http://schemas.microsoft.com/office/drawing/2014/main" id="{D622F537-75AC-4544-90D4-745293D4D248}"/>
+              </a:ext>
+            </a:extLst>
+          </p:cNvPr>
+          <p:cNvSpPr txBox="1"/>
+          <p:nvPr/>
+        </p:nvSpPr>
+        <p:spPr>
+          <a:xfrm>
+            <a:off x="1423182" y="4701266"/>
+            <a:ext cx="1386855" cy="369332"/>
+          </a:xfrm>
+          <a:prstGeom prst="rect">
+            <a:avLst/>
+          </a:prstGeom>
+          <a:noFill/>
+          <a:ln w="38100">
+            <a:solidFill>
+              <a:srgbClr val="0EBA38"/>
+            </a:solidFill>
+          </a:ln>
+        </p:spPr>
+        <p:txBody>
+          <a:bodyPr wrap="none" rtlCol="0">
+            <a:spAutoFit/>
+          </a:bodyPr>
+          <a:lstStyle/>
+          <a:p>
+            <a:r>
+              <a:rPr lang="en-GB" dirty="0"/>
+              <a:t>Downstream</a:t>
+            </a:r>
+          </a:p>
+        </p:txBody>
+      </p:sp>
+      <p:sp>
+        <p:nvSpPr>
+          <p:cNvPr id="10" name="TextBox 9">
+            <a:extLst>
+              <a:ext uri="{FF2B5EF4-FFF2-40B4-BE49-F238E27FC236}">
+                <a16:creationId xmlns:a16="http://schemas.microsoft.com/office/drawing/2014/main" id="{C4E0388D-38E9-A84C-8DF6-96DFD4B8DC18}"/>
+              </a:ext>
+            </a:extLst>
+          </p:cNvPr>
+          <p:cNvSpPr txBox="1"/>
+          <p:nvPr/>
+        </p:nvSpPr>
+        <p:spPr>
+          <a:xfrm>
+            <a:off x="106185" y="4701266"/>
+            <a:ext cx="1104470" cy="369332"/>
+          </a:xfrm>
+          <a:prstGeom prst="rect">
+            <a:avLst/>
+          </a:prstGeom>
+          <a:noFill/>
+          <a:ln w="38100">
+            <a:solidFill>
+              <a:srgbClr val="0EBA38"/>
+            </a:solidFill>
+          </a:ln>
+        </p:spPr>
+        <p:txBody>
+          <a:bodyPr wrap="none" rtlCol="0">
+            <a:spAutoFit/>
+          </a:bodyPr>
+          <a:lstStyle/>
+          <a:p>
+            <a:r>
+              <a:rPr lang="en-GB" dirty="0"/>
+              <a:t>Upstream</a:t>
+            </a:r>
+          </a:p>
+        </p:txBody>
+      </p:sp>
+      <p:sp>
+        <p:nvSpPr>
+          <p:cNvPr id="11" name="TextBox 10">
+            <a:extLst>
+              <a:ext uri="{FF2B5EF4-FFF2-40B4-BE49-F238E27FC236}">
+                <a16:creationId xmlns:a16="http://schemas.microsoft.com/office/drawing/2014/main" id="{37BDB9E5-301E-BB43-85D3-C814582DA22F}"/>
+              </a:ext>
+            </a:extLst>
+          </p:cNvPr>
+          <p:cNvSpPr txBox="1"/>
+          <p:nvPr/>
+        </p:nvSpPr>
+        <p:spPr>
+          <a:xfrm>
+            <a:off x="165407" y="3647796"/>
+            <a:ext cx="1123962" cy="369332"/>
+          </a:xfrm>
+          <a:prstGeom prst="rect">
+            <a:avLst/>
+          </a:prstGeom>
+          <a:noFill/>
+          <a:ln w="38100">
+            <a:solidFill>
+              <a:srgbClr val="00B050"/>
+            </a:solidFill>
+          </a:ln>
+        </p:spPr>
+        <p:txBody>
+          <a:bodyPr wrap="none" rtlCol="0">
+            <a:spAutoFit/>
+          </a:bodyPr>
+          <a:lstStyle>
+            <a:defPPr>
+              <a:defRPr lang="en-US"/>
+            </a:defPPr>
+          </a:lstStyle>
+          <a:p>
+            <a:r>
+              <a:rPr lang="en-GB" dirty="0"/>
+              <a:t>Intergenic</a:t>
+            </a:r>
+          </a:p>
+        </p:txBody>
+      </p:sp>
+      <p:sp>
+        <p:nvSpPr>
+          <p:cNvPr id="12" name="TextBox 11">
+            <a:extLst>
+              <a:ext uri="{FF2B5EF4-FFF2-40B4-BE49-F238E27FC236}">
+                <a16:creationId xmlns:a16="http://schemas.microsoft.com/office/drawing/2014/main" id="{9CF2773B-8756-7842-A692-E2A40ACD638C}"/>
+              </a:ext>
+            </a:extLst>
+          </p:cNvPr>
+          <p:cNvSpPr txBox="1"/>
+          <p:nvPr/>
+        </p:nvSpPr>
+        <p:spPr>
+          <a:xfrm>
+            <a:off x="1580056" y="3647796"/>
+            <a:ext cx="1120050" cy="369332"/>
+          </a:xfrm>
+          <a:prstGeom prst="rect">
+            <a:avLst/>
+          </a:prstGeom>
+          <a:noFill/>
+          <a:ln w="38100">
+            <a:solidFill>
+              <a:srgbClr val="00B050"/>
+            </a:solidFill>
+          </a:ln>
+        </p:spPr>
+        <p:txBody>
+          <a:bodyPr wrap="none" rtlCol="0">
+            <a:spAutoFit/>
+          </a:bodyPr>
+          <a:lstStyle>
+            <a:defPPr>
+              <a:defRPr lang="en-US"/>
+            </a:defPPr>
+          </a:lstStyle>
+          <a:p>
+            <a:r>
+              <a:rPr lang="en-GB" dirty="0"/>
+              <a:t>Intragenic</a:t>
+            </a:r>
+          </a:p>
+        </p:txBody>
+      </p:sp>
+      <p:sp>
+        <p:nvSpPr>
+          <p:cNvPr id="13" name="TextBox 12">
+            <a:extLst>
+              <a:ext uri="{FF2B5EF4-FFF2-40B4-BE49-F238E27FC236}">
+                <a16:creationId xmlns:a16="http://schemas.microsoft.com/office/drawing/2014/main" id="{3C77036E-8C39-474F-B973-E4CB11F45279}"/>
+              </a:ext>
+            </a:extLst>
+          </p:cNvPr>
+          <p:cNvSpPr txBox="1"/>
+          <p:nvPr/>
+        </p:nvSpPr>
+        <p:spPr>
+          <a:xfrm>
+            <a:off x="4476807" y="3647796"/>
+            <a:ext cx="759119" cy="369332"/>
+          </a:xfrm>
+          <a:prstGeom prst="rect">
+            <a:avLst/>
+          </a:prstGeom>
+          <a:noFill/>
+          <a:ln w="38100">
+            <a:solidFill>
+              <a:srgbClr val="00B050"/>
+            </a:solidFill>
+          </a:ln>
+        </p:spPr>
+        <p:txBody>
+          <a:bodyPr wrap="none" rtlCol="0">
+            <a:spAutoFit/>
+          </a:bodyPr>
+          <a:lstStyle>
+            <a:defPPr>
+              <a:defRPr lang="en-US"/>
+            </a:defPPr>
+          </a:lstStyle>
+          <a:p>
+            <a:r>
+              <a:rPr lang="en-GB" dirty="0"/>
+              <a:t>Intron</a:t>
+            </a:r>
+          </a:p>
+        </p:txBody>
+      </p:sp>
+      <p:sp>
+        <p:nvSpPr>
+          <p:cNvPr id="15" name="TextBox 14">
+            <a:extLst>
+              <a:ext uri="{FF2B5EF4-FFF2-40B4-BE49-F238E27FC236}">
+                <a16:creationId xmlns:a16="http://schemas.microsoft.com/office/drawing/2014/main" id="{15F525EB-463A-C041-AE79-856CC87A775D}"/>
+              </a:ext>
+            </a:extLst>
+          </p:cNvPr>
+          <p:cNvSpPr txBox="1"/>
+          <p:nvPr/>
+        </p:nvSpPr>
+        <p:spPr>
+          <a:xfrm>
+            <a:off x="9081748" y="4706706"/>
+            <a:ext cx="1820883" cy="369332"/>
+          </a:xfrm>
+          <a:prstGeom prst="rect">
+            <a:avLst/>
+          </a:prstGeom>
+          <a:noFill/>
+          <a:ln w="38100">
+            <a:solidFill>
+              <a:srgbClr val="0EBA38"/>
+            </a:solidFill>
+          </a:ln>
+        </p:spPr>
+        <p:txBody>
+          <a:bodyPr wrap="none" rtlCol="0">
+            <a:spAutoFit/>
+          </a:bodyPr>
+          <a:lstStyle/>
+          <a:p>
+            <a:r>
+              <a:rPr lang="en-GB" dirty="0"/>
+              <a:t>Non-synonymous</a:t>
+            </a:r>
+          </a:p>
+        </p:txBody>
+      </p:sp>
+      <p:sp>
+        <p:nvSpPr>
+          <p:cNvPr id="16" name="TextBox 15">
+            <a:extLst>
+              <a:ext uri="{FF2B5EF4-FFF2-40B4-BE49-F238E27FC236}">
+                <a16:creationId xmlns:a16="http://schemas.microsoft.com/office/drawing/2014/main" id="{A4ABC4CB-ED86-A945-9AB4-E03E6FFEE8ED}"/>
+              </a:ext>
+            </a:extLst>
+          </p:cNvPr>
+          <p:cNvSpPr txBox="1"/>
+          <p:nvPr/>
+        </p:nvSpPr>
+        <p:spPr>
+          <a:xfrm>
+            <a:off x="7286432" y="4706706"/>
+            <a:ext cx="1374992" cy="369332"/>
+          </a:xfrm>
+          <a:prstGeom prst="rect">
+            <a:avLst/>
+          </a:prstGeom>
+          <a:noFill/>
+          <a:ln w="28575">
+            <a:solidFill>
+              <a:schemeClr val="bg1">
+                <a:lumMod val="50000"/>
+              </a:schemeClr>
+            </a:solidFill>
+          </a:ln>
+        </p:spPr>
+        <p:txBody>
+          <a:bodyPr wrap="none" rtlCol="0">
+            <a:spAutoFit/>
+          </a:bodyPr>
+          <a:lstStyle>
+            <a:defPPr>
+              <a:defRPr lang="en-US"/>
+            </a:defPPr>
+          </a:lstStyle>
+          <a:p>
+            <a:r>
+              <a:rPr lang="en-GB" dirty="0"/>
+              <a:t>Synonymous</a:t>
+            </a:r>
+          </a:p>
+        </p:txBody>
+      </p:sp>
+      <p:sp>
+        <p:nvSpPr>
+          <p:cNvPr id="17" name="TextBox 16">
+            <a:extLst>
+              <a:ext uri="{FF2B5EF4-FFF2-40B4-BE49-F238E27FC236}">
+                <a16:creationId xmlns:a16="http://schemas.microsoft.com/office/drawing/2014/main" id="{51485A27-8836-534E-A5A0-EAE52282EBE7}"/>
+              </a:ext>
+            </a:extLst>
+          </p:cNvPr>
+          <p:cNvSpPr txBox="1"/>
+          <p:nvPr/>
+        </p:nvSpPr>
+        <p:spPr>
+          <a:xfrm>
+            <a:off x="9762992" y="5742279"/>
+            <a:ext cx="1000595" cy="369332"/>
+          </a:xfrm>
+          <a:prstGeom prst="rect">
+            <a:avLst/>
+          </a:prstGeom>
+          <a:noFill/>
+          <a:ln w="38100">
+            <a:solidFill>
+              <a:srgbClr val="0EBA38"/>
+            </a:solidFill>
+          </a:ln>
+        </p:spPr>
+        <p:txBody>
+          <a:bodyPr wrap="none" rtlCol="0">
+            <a:spAutoFit/>
+          </a:bodyPr>
+          <a:lstStyle/>
+          <a:p>
+            <a:r>
+              <a:rPr lang="en-GB" dirty="0"/>
+              <a:t>Stop lost</a:t>
+            </a:r>
+          </a:p>
+        </p:txBody>
+      </p:sp>
+      <p:sp>
+        <p:nvSpPr>
+          <p:cNvPr id="18" name="TextBox 17">
+            <a:extLst>
+              <a:ext uri="{FF2B5EF4-FFF2-40B4-BE49-F238E27FC236}">
+                <a16:creationId xmlns:a16="http://schemas.microsoft.com/office/drawing/2014/main" id="{C53AAE02-768A-5940-8A07-21BF9B35F088}"/>
+              </a:ext>
+            </a:extLst>
+          </p:cNvPr>
+          <p:cNvSpPr txBox="1"/>
+          <p:nvPr/>
+        </p:nvSpPr>
+        <p:spPr>
+          <a:xfrm>
+            <a:off x="4487430" y="4698920"/>
+            <a:ext cx="731290" cy="369332"/>
+          </a:xfrm>
+          <a:prstGeom prst="rect">
+            <a:avLst/>
+          </a:prstGeom>
+          <a:noFill/>
+          <a:ln w="38100">
+            <a:solidFill>
+              <a:srgbClr val="0EBA38"/>
+            </a:solidFill>
+          </a:ln>
+        </p:spPr>
+        <p:txBody>
+          <a:bodyPr wrap="none" rtlCol="0">
+            <a:spAutoFit/>
+          </a:bodyPr>
+          <a:lstStyle/>
+          <a:p>
+            <a:r>
+              <a:rPr lang="en-GB" dirty="0"/>
+              <a:t>Splice</a:t>
+            </a:r>
+          </a:p>
+        </p:txBody>
+      </p:sp>
+      <p:sp>
+        <p:nvSpPr>
+          <p:cNvPr id="19" name="TextBox 18">
+            <a:extLst>
+              <a:ext uri="{FF2B5EF4-FFF2-40B4-BE49-F238E27FC236}">
+                <a16:creationId xmlns:a16="http://schemas.microsoft.com/office/drawing/2014/main" id="{B184F11B-FC9D-0240-9F5C-6DF7F4CF66C5}"/>
+              </a:ext>
+            </a:extLst>
+          </p:cNvPr>
+          <p:cNvSpPr txBox="1"/>
+          <p:nvPr/>
+        </p:nvSpPr>
+        <p:spPr>
+          <a:xfrm>
+            <a:off x="5526613" y="3647796"/>
+            <a:ext cx="569387" cy="369332"/>
+          </a:xfrm>
+          <a:prstGeom prst="rect">
+            <a:avLst/>
+          </a:prstGeom>
+          <a:noFill/>
+          <a:ln w="38100">
+            <a:solidFill>
+              <a:srgbClr val="00B050"/>
+            </a:solidFill>
+          </a:ln>
+        </p:spPr>
+        <p:txBody>
+          <a:bodyPr wrap="none" rtlCol="0">
+            <a:spAutoFit/>
+          </a:bodyPr>
+          <a:lstStyle>
+            <a:defPPr>
+              <a:defRPr lang="en-US"/>
+            </a:defPPr>
+          </a:lstStyle>
+          <a:p>
+            <a:r>
+              <a:rPr lang="en-GB" dirty="0"/>
+              <a:t>UTR</a:t>
+            </a:r>
+          </a:p>
+        </p:txBody>
+      </p:sp>
+      <p:sp>
+        <p:nvSpPr>
+          <p:cNvPr id="20" name="TextBox 19">
+            <a:extLst>
+              <a:ext uri="{FF2B5EF4-FFF2-40B4-BE49-F238E27FC236}">
+                <a16:creationId xmlns:a16="http://schemas.microsoft.com/office/drawing/2014/main" id="{08A969FB-85D7-E644-A7D5-FA2C739F4392}"/>
+              </a:ext>
+            </a:extLst>
+          </p:cNvPr>
+          <p:cNvSpPr txBox="1"/>
+          <p:nvPr/>
+        </p:nvSpPr>
+        <p:spPr>
+          <a:xfrm>
+            <a:off x="8738929" y="5742279"/>
+            <a:ext cx="1024063" cy="369332"/>
+          </a:xfrm>
+          <a:prstGeom prst="rect">
+            <a:avLst/>
+          </a:prstGeom>
+          <a:noFill/>
+          <a:ln w="38100">
+            <a:solidFill>
+              <a:srgbClr val="0EBA38"/>
+            </a:solidFill>
+          </a:ln>
+        </p:spPr>
+        <p:txBody>
+          <a:bodyPr wrap="none" rtlCol="0">
+            <a:spAutoFit/>
+          </a:bodyPr>
+          <a:lstStyle/>
+          <a:p>
+            <a:r>
+              <a:rPr lang="en-GB" dirty="0"/>
+              <a:t>Start lost</a:t>
+            </a:r>
+          </a:p>
+        </p:txBody>
+      </p:sp>
+      <p:sp>
+        <p:nvSpPr>
+          <p:cNvPr id="21" name="TextBox 20">
+            <a:extLst>
+              <a:ext uri="{FF2B5EF4-FFF2-40B4-BE49-F238E27FC236}">
+                <a16:creationId xmlns:a16="http://schemas.microsoft.com/office/drawing/2014/main" id="{CA4DFDB3-A073-6243-87E2-60E371AEC615}"/>
+              </a:ext>
+            </a:extLst>
+          </p:cNvPr>
+          <p:cNvSpPr txBox="1"/>
+          <p:nvPr/>
+        </p:nvSpPr>
+        <p:spPr>
+          <a:xfrm>
+            <a:off x="10763587" y="5742279"/>
+            <a:ext cx="1289007" cy="369332"/>
+          </a:xfrm>
+          <a:prstGeom prst="rect">
+            <a:avLst/>
+          </a:prstGeom>
+          <a:noFill/>
+          <a:ln w="38100">
+            <a:solidFill>
+              <a:srgbClr val="0EBA38"/>
+            </a:solidFill>
+          </a:ln>
+        </p:spPr>
+        <p:txBody>
+          <a:bodyPr wrap="none" rtlCol="0">
+            <a:spAutoFit/>
+          </a:bodyPr>
+          <a:lstStyle/>
+          <a:p>
+            <a:r>
+              <a:rPr lang="en-GB" dirty="0"/>
+              <a:t>Stop gained</a:t>
+            </a:r>
+          </a:p>
+        </p:txBody>
+      </p:sp>
+      <p:sp>
+        <p:nvSpPr>
+          <p:cNvPr id="22" name="TextBox 21">
+            <a:extLst>
+              <a:ext uri="{FF2B5EF4-FFF2-40B4-BE49-F238E27FC236}">
+                <a16:creationId xmlns:a16="http://schemas.microsoft.com/office/drawing/2014/main" id="{C0C9E807-A861-E24F-9754-C9B2541423CB}"/>
+              </a:ext>
+            </a:extLst>
+          </p:cNvPr>
+          <p:cNvSpPr txBox="1"/>
+          <p:nvPr/>
+        </p:nvSpPr>
+        <p:spPr>
+          <a:xfrm>
+            <a:off x="5364252" y="5719127"/>
+            <a:ext cx="1473224" cy="369332"/>
+          </a:xfrm>
+          <a:prstGeom prst="rect">
+            <a:avLst/>
+          </a:prstGeom>
+          <a:noFill/>
+          <a:ln w="28575">
+            <a:solidFill>
+              <a:schemeClr val="bg1">
+                <a:lumMod val="50000"/>
+              </a:schemeClr>
+            </a:solidFill>
+          </a:ln>
+        </p:spPr>
+        <p:txBody>
+          <a:bodyPr wrap="none" rtlCol="0">
+            <a:spAutoFit/>
+          </a:bodyPr>
+          <a:lstStyle>
+            <a:defPPr>
+              <a:defRPr lang="en-US"/>
+            </a:defPPr>
+          </a:lstStyle>
+          <a:p>
+            <a:r>
+              <a:rPr lang="en-GB" dirty="0"/>
+              <a:t>Start retained</a:t>
+            </a:r>
+          </a:p>
+        </p:txBody>
+      </p:sp>
+      <p:sp>
+        <p:nvSpPr>
+          <p:cNvPr id="23" name="TextBox 22">
+            <a:extLst>
+              <a:ext uri="{FF2B5EF4-FFF2-40B4-BE49-F238E27FC236}">
+                <a16:creationId xmlns:a16="http://schemas.microsoft.com/office/drawing/2014/main" id="{78E50847-F987-4A4D-9CA0-AD8FCA4B9ED8}"/>
+              </a:ext>
+            </a:extLst>
+          </p:cNvPr>
+          <p:cNvSpPr txBox="1"/>
+          <p:nvPr/>
+        </p:nvSpPr>
+        <p:spPr>
+          <a:xfrm>
+            <a:off x="6996916" y="5732585"/>
+            <a:ext cx="1449756" cy="369332"/>
+          </a:xfrm>
+          <a:prstGeom prst="rect">
+            <a:avLst/>
+          </a:prstGeom>
+          <a:noFill/>
+          <a:ln w="28575">
+            <a:solidFill>
+              <a:schemeClr val="bg1">
+                <a:lumMod val="50000"/>
+              </a:schemeClr>
+            </a:solidFill>
+          </a:ln>
+        </p:spPr>
+        <p:txBody>
+          <a:bodyPr wrap="none" rtlCol="0">
+            <a:spAutoFit/>
+          </a:bodyPr>
+          <a:lstStyle>
+            <a:defPPr>
+              <a:defRPr lang="en-US"/>
+            </a:defPPr>
+          </a:lstStyle>
+          <a:p>
+            <a:r>
+              <a:rPr lang="en-GB" dirty="0"/>
+              <a:t>Stop retained</a:t>
+            </a:r>
+          </a:p>
+        </p:txBody>
+      </p:sp>
+      <p:sp>
+        <p:nvSpPr>
+          <p:cNvPr id="24" name="TextBox 23">
+            <a:extLst>
+              <a:ext uri="{FF2B5EF4-FFF2-40B4-BE49-F238E27FC236}">
+                <a16:creationId xmlns:a16="http://schemas.microsoft.com/office/drawing/2014/main" id="{1602E4DE-8CEB-5A4A-9C91-328EAF4D7CE8}"/>
+              </a:ext>
+            </a:extLst>
+          </p:cNvPr>
+          <p:cNvSpPr txBox="1"/>
+          <p:nvPr/>
+        </p:nvSpPr>
+        <p:spPr>
+          <a:xfrm>
+            <a:off x="2990793" y="3647796"/>
+            <a:ext cx="1195327" cy="369332"/>
+          </a:xfrm>
+          <a:prstGeom prst="rect">
+            <a:avLst/>
+          </a:prstGeom>
+          <a:noFill/>
+          <a:ln w="38100">
+            <a:solidFill>
+              <a:srgbClr val="00B050"/>
+            </a:solidFill>
+          </a:ln>
+        </p:spPr>
+        <p:txBody>
+          <a:bodyPr wrap="none" rtlCol="0">
+            <a:spAutoFit/>
+          </a:bodyPr>
+          <a:lstStyle>
+            <a:defPPr>
+              <a:defRPr lang="en-US"/>
+            </a:defPPr>
+          </a:lstStyle>
+          <a:p>
+            <a:r>
+              <a:rPr lang="en-GB" dirty="0"/>
+              <a:t>Regulatory</a:t>
+            </a:r>
+          </a:p>
+        </p:txBody>
+      </p:sp>
+      <p:sp>
+        <p:nvSpPr>
+          <p:cNvPr id="25" name="TextBox 24">
+            <a:extLst>
+              <a:ext uri="{FF2B5EF4-FFF2-40B4-BE49-F238E27FC236}">
+                <a16:creationId xmlns:a16="http://schemas.microsoft.com/office/drawing/2014/main" id="{C12A9312-240E-4D41-90D6-9FE507E65AE5}"/>
+              </a:ext>
+            </a:extLst>
+          </p:cNvPr>
+          <p:cNvSpPr txBox="1"/>
+          <p:nvPr/>
+        </p:nvSpPr>
+        <p:spPr>
+          <a:xfrm>
+            <a:off x="7973928" y="473469"/>
+            <a:ext cx="644344" cy="369332"/>
+          </a:xfrm>
+          <a:prstGeom prst="rect">
+            <a:avLst/>
+          </a:prstGeom>
+          <a:noFill/>
+          <a:ln w="28575">
+            <a:solidFill>
+              <a:schemeClr val="bg1">
+                <a:lumMod val="50000"/>
+              </a:schemeClr>
+            </a:solidFill>
+          </a:ln>
+        </p:spPr>
+        <p:txBody>
+          <a:bodyPr wrap="none" rtlCol="0">
+            <a:spAutoFit/>
+          </a:bodyPr>
+          <a:lstStyle/>
+          <a:p>
+            <a:r>
+              <a:rPr lang="en-GB" dirty="0"/>
+              <a:t>SNPs</a:t>
+            </a:r>
+          </a:p>
+        </p:txBody>
+      </p:sp>
+      <p:sp>
+        <p:nvSpPr>
+          <p:cNvPr id="26" name="Rectangle 25">
+            <a:extLst>
+              <a:ext uri="{FF2B5EF4-FFF2-40B4-BE49-F238E27FC236}">
+                <a16:creationId xmlns:a16="http://schemas.microsoft.com/office/drawing/2014/main" id="{933BB636-0737-904A-B5A6-C2CA37D86C89}"/>
+              </a:ext>
+            </a:extLst>
+          </p:cNvPr>
+          <p:cNvSpPr/>
+          <p:nvPr/>
+        </p:nvSpPr>
+        <p:spPr>
+          <a:xfrm>
+            <a:off x="6985705" y="2384136"/>
+            <a:ext cx="900000" cy="432000"/>
+          </a:xfrm>
+          <a:prstGeom prst="rect">
+            <a:avLst/>
+          </a:prstGeom>
+          <a:noFill/>
+          <a:ln w="38100">
+            <a:solidFill>
+              <a:schemeClr val="bg1">
+                <a:lumMod val="50000"/>
+              </a:schemeClr>
+            </a:solidFill>
+          </a:ln>
+        </p:spPr>
+        <p:txBody>
+          <a:bodyPr wrap="square" rtlCol="0">
+            <a:spAutoFit/>
+          </a:bodyPr>
+          <a:lstStyle/>
+          <a:p>
+            <a:endParaRPr lang="en-GB" dirty="0">
+              <a:solidFill>
+                <a:schemeClr val="tx1"/>
+              </a:solidFill>
+            </a:endParaRPr>
+          </a:p>
+        </p:txBody>
+      </p:sp>
+      <p:sp>
+        <p:nvSpPr>
+          <p:cNvPr id="27" name="Rectangle 26">
+            <a:extLst>
+              <a:ext uri="{FF2B5EF4-FFF2-40B4-BE49-F238E27FC236}">
+                <a16:creationId xmlns:a16="http://schemas.microsoft.com/office/drawing/2014/main" id="{DF86C6EE-FFC0-DB4C-AE1A-1402525E2E7C}"/>
+              </a:ext>
+            </a:extLst>
+          </p:cNvPr>
+          <p:cNvSpPr/>
+          <p:nvPr/>
+        </p:nvSpPr>
+        <p:spPr>
+          <a:xfrm>
+            <a:off x="4764000" y="2384136"/>
+            <a:ext cx="1332000" cy="432000"/>
+          </a:xfrm>
+          <a:prstGeom prst="rect">
+            <a:avLst/>
+          </a:prstGeom>
+          <a:noFill/>
+          <a:ln w="38100">
+            <a:solidFill>
+              <a:schemeClr val="bg1">
+                <a:lumMod val="50000"/>
+              </a:schemeClr>
+            </a:solidFill>
+          </a:ln>
+        </p:spPr>
+        <p:txBody>
+          <a:bodyPr wrap="square" rtlCol="0">
+            <a:spAutoFit/>
+          </a:bodyPr>
+          <a:lstStyle/>
+          <a:p>
+            <a:endParaRPr lang="en-GB">
+              <a:solidFill>
+                <a:schemeClr val="tx1"/>
+              </a:solidFill>
+            </a:endParaRPr>
+          </a:p>
+        </p:txBody>
+      </p:sp>
+      <p:sp>
+        <p:nvSpPr>
+          <p:cNvPr id="28" name="Rectangle 27">
+            <a:extLst>
+              <a:ext uri="{FF2B5EF4-FFF2-40B4-BE49-F238E27FC236}">
+                <a16:creationId xmlns:a16="http://schemas.microsoft.com/office/drawing/2014/main" id="{79037EA4-61AF-8B48-A7E6-C3866B382C03}"/>
+              </a:ext>
+            </a:extLst>
+          </p:cNvPr>
+          <p:cNvSpPr/>
+          <p:nvPr/>
+        </p:nvSpPr>
+        <p:spPr>
+          <a:xfrm>
+            <a:off x="8433745" y="3618566"/>
+            <a:ext cx="990000" cy="432000"/>
+          </a:xfrm>
+          <a:prstGeom prst="rect">
+            <a:avLst/>
+          </a:prstGeom>
+          <a:noFill/>
+          <a:ln w="38100">
+            <a:solidFill>
+              <a:schemeClr val="bg1">
+                <a:lumMod val="50000"/>
+              </a:schemeClr>
+            </a:solidFill>
+          </a:ln>
+        </p:spPr>
+        <p:txBody>
+          <a:bodyPr wrap="square" rtlCol="0">
+            <a:spAutoFit/>
+          </a:bodyPr>
+          <a:lstStyle/>
+          <a:p>
+            <a:endParaRPr lang="en-GB">
+              <a:solidFill>
+                <a:schemeClr val="tx1"/>
+              </a:solidFill>
+            </a:endParaRPr>
+          </a:p>
+        </p:txBody>
+      </p:sp>
+      <p:sp>
+        <p:nvSpPr>
+          <p:cNvPr id="29" name="Rectangle 28">
+            <a:extLst>
+              <a:ext uri="{FF2B5EF4-FFF2-40B4-BE49-F238E27FC236}">
+                <a16:creationId xmlns:a16="http://schemas.microsoft.com/office/drawing/2014/main" id="{61D24DC1-9FBE-FD46-9B99-FDCC3B38E74E}"/>
+              </a:ext>
+            </a:extLst>
+          </p:cNvPr>
+          <p:cNvSpPr/>
+          <p:nvPr/>
+        </p:nvSpPr>
+        <p:spPr>
+          <a:xfrm>
+            <a:off x="5485277" y="3617530"/>
+            <a:ext cx="640354" cy="432000"/>
+          </a:xfrm>
+          <a:prstGeom prst="rect">
+            <a:avLst/>
+          </a:prstGeom>
+          <a:noFill/>
+          <a:ln w="38100">
+            <a:solidFill>
+              <a:schemeClr val="bg1">
+                <a:lumMod val="50000"/>
+              </a:schemeClr>
+            </a:solidFill>
+          </a:ln>
+        </p:spPr>
+        <p:txBody>
+          <a:bodyPr wrap="square" rtlCol="0">
+            <a:spAutoFit/>
+          </a:bodyPr>
+          <a:lstStyle/>
+          <a:p>
+            <a:endParaRPr lang="en-GB">
+              <a:solidFill>
+                <a:schemeClr val="tx1"/>
+              </a:solidFill>
+            </a:endParaRPr>
+          </a:p>
+        </p:txBody>
+      </p:sp>
+      <p:sp>
+        <p:nvSpPr>
+          <p:cNvPr id="30" name="Rectangle 29">
+            <a:extLst>
+              <a:ext uri="{FF2B5EF4-FFF2-40B4-BE49-F238E27FC236}">
+                <a16:creationId xmlns:a16="http://schemas.microsoft.com/office/drawing/2014/main" id="{26055A58-E733-424E-9DD4-28017451C366}"/>
+              </a:ext>
+            </a:extLst>
+          </p:cNvPr>
+          <p:cNvSpPr/>
+          <p:nvPr/>
+        </p:nvSpPr>
+        <p:spPr>
+          <a:xfrm>
+            <a:off x="4439369" y="3615458"/>
+            <a:ext cx="827413" cy="432000"/>
+          </a:xfrm>
+          <a:prstGeom prst="rect">
+            <a:avLst/>
+          </a:prstGeom>
+          <a:noFill/>
+          <a:ln w="38100">
+            <a:solidFill>
+              <a:schemeClr val="bg1">
+                <a:lumMod val="50000"/>
+              </a:schemeClr>
+            </a:solidFill>
+          </a:ln>
+        </p:spPr>
+        <p:txBody>
+          <a:bodyPr wrap="square" rtlCol="0">
+            <a:spAutoFit/>
+          </a:bodyPr>
+          <a:lstStyle/>
+          <a:p>
+            <a:endParaRPr lang="en-GB">
+              <a:solidFill>
+                <a:schemeClr val="tx1"/>
+              </a:solidFill>
+            </a:endParaRPr>
+          </a:p>
+        </p:txBody>
+      </p:sp>
+      <p:sp>
+        <p:nvSpPr>
+          <p:cNvPr id="31" name="Rectangle 30">
+            <a:extLst>
+              <a:ext uri="{FF2B5EF4-FFF2-40B4-BE49-F238E27FC236}">
+                <a16:creationId xmlns:a16="http://schemas.microsoft.com/office/drawing/2014/main" id="{823DA4AB-BE4A-9C4A-8ECE-B71FA606B98A}"/>
+              </a:ext>
+            </a:extLst>
+          </p:cNvPr>
+          <p:cNvSpPr/>
+          <p:nvPr/>
+        </p:nvSpPr>
+        <p:spPr>
+          <a:xfrm>
+            <a:off x="2951234" y="3618581"/>
+            <a:ext cx="1263927" cy="432000"/>
+          </a:xfrm>
+          <a:prstGeom prst="rect">
+            <a:avLst/>
+          </a:prstGeom>
+          <a:noFill/>
+          <a:ln w="38100">
+            <a:solidFill>
+              <a:schemeClr val="bg1">
+                <a:lumMod val="50000"/>
+              </a:schemeClr>
+            </a:solidFill>
+          </a:ln>
+        </p:spPr>
+        <p:txBody>
+          <a:bodyPr wrap="square" rtlCol="0">
+            <a:spAutoFit/>
+          </a:bodyPr>
+          <a:lstStyle/>
+          <a:p>
+            <a:endParaRPr lang="en-GB">
+              <a:solidFill>
+                <a:schemeClr val="tx1"/>
+              </a:solidFill>
+            </a:endParaRPr>
+          </a:p>
+        </p:txBody>
+      </p:sp>
+      <p:sp>
+        <p:nvSpPr>
+          <p:cNvPr id="32" name="Rectangle 31">
+            <a:extLst>
+              <a:ext uri="{FF2B5EF4-FFF2-40B4-BE49-F238E27FC236}">
+                <a16:creationId xmlns:a16="http://schemas.microsoft.com/office/drawing/2014/main" id="{DF0AA0F3-E5F6-B045-85B1-8EB455C6C68B}"/>
+              </a:ext>
+            </a:extLst>
+          </p:cNvPr>
+          <p:cNvSpPr/>
+          <p:nvPr/>
+        </p:nvSpPr>
+        <p:spPr>
+          <a:xfrm>
+            <a:off x="1544309" y="3615458"/>
+            <a:ext cx="1182717" cy="432000"/>
+          </a:xfrm>
+          <a:prstGeom prst="rect">
+            <a:avLst/>
+          </a:prstGeom>
+          <a:noFill/>
+          <a:ln w="38100">
+            <a:solidFill>
+              <a:schemeClr val="bg1">
+                <a:lumMod val="50000"/>
+              </a:schemeClr>
+            </a:solidFill>
+          </a:ln>
+        </p:spPr>
+        <p:txBody>
+          <a:bodyPr wrap="square" rtlCol="0">
+            <a:spAutoFit/>
+          </a:bodyPr>
+          <a:lstStyle/>
+          <a:p>
+            <a:endParaRPr lang="en-GB">
+              <a:solidFill>
+                <a:schemeClr val="tx1"/>
+              </a:solidFill>
+            </a:endParaRPr>
+          </a:p>
+        </p:txBody>
+      </p:sp>
+      <p:sp>
+        <p:nvSpPr>
+          <p:cNvPr id="33" name="Rectangle 32">
+            <a:extLst>
+              <a:ext uri="{FF2B5EF4-FFF2-40B4-BE49-F238E27FC236}">
+                <a16:creationId xmlns:a16="http://schemas.microsoft.com/office/drawing/2014/main" id="{2884A971-9041-5D47-9F5C-8A63B727183A}"/>
+              </a:ext>
+            </a:extLst>
+          </p:cNvPr>
+          <p:cNvSpPr/>
+          <p:nvPr/>
+        </p:nvSpPr>
+        <p:spPr>
+          <a:xfrm>
+            <a:off x="136029" y="3611314"/>
+            <a:ext cx="1182717" cy="432000"/>
+          </a:xfrm>
+          <a:prstGeom prst="rect">
+            <a:avLst/>
+          </a:prstGeom>
+          <a:noFill/>
+          <a:ln w="38100">
+            <a:solidFill>
+              <a:schemeClr val="bg1">
+                <a:lumMod val="50000"/>
+              </a:schemeClr>
+            </a:solidFill>
+          </a:ln>
+        </p:spPr>
+        <p:txBody>
+          <a:bodyPr wrap="square" rtlCol="0">
+            <a:spAutoFit/>
+          </a:bodyPr>
+          <a:lstStyle/>
+          <a:p>
+            <a:endParaRPr lang="en-GB">
+              <a:solidFill>
+                <a:schemeClr val="tx1"/>
+              </a:solidFill>
+            </a:endParaRPr>
+          </a:p>
+        </p:txBody>
+      </p:sp>
+      <p:sp>
+        <p:nvSpPr>
+          <p:cNvPr id="34" name="Rectangle 33">
+            <a:extLst>
+              <a:ext uri="{FF2B5EF4-FFF2-40B4-BE49-F238E27FC236}">
+                <a16:creationId xmlns:a16="http://schemas.microsoft.com/office/drawing/2014/main" id="{59614A9E-5C72-B34D-A342-DBC6A088B5DA}"/>
+              </a:ext>
+            </a:extLst>
+          </p:cNvPr>
+          <p:cNvSpPr/>
+          <p:nvPr/>
+        </p:nvSpPr>
+        <p:spPr>
+          <a:xfrm>
+            <a:off x="67061" y="4667586"/>
+            <a:ext cx="1182717" cy="432000"/>
+          </a:xfrm>
+          <a:prstGeom prst="rect">
+            <a:avLst/>
+          </a:prstGeom>
+          <a:noFill/>
+          <a:ln w="38100">
+            <a:solidFill>
+              <a:schemeClr val="bg1">
+                <a:lumMod val="50000"/>
+              </a:schemeClr>
+            </a:solidFill>
+          </a:ln>
+        </p:spPr>
+        <p:txBody>
+          <a:bodyPr wrap="square" rtlCol="0">
+            <a:spAutoFit/>
+          </a:bodyPr>
+          <a:lstStyle/>
+          <a:p>
+            <a:endParaRPr lang="en-GB">
+              <a:solidFill>
+                <a:schemeClr val="tx1"/>
+              </a:solidFill>
+            </a:endParaRPr>
+          </a:p>
+        </p:txBody>
+      </p:sp>
+      <p:sp>
+        <p:nvSpPr>
+          <p:cNvPr id="35" name="Rectangle 34">
+            <a:extLst>
+              <a:ext uri="{FF2B5EF4-FFF2-40B4-BE49-F238E27FC236}">
+                <a16:creationId xmlns:a16="http://schemas.microsoft.com/office/drawing/2014/main" id="{608CF914-9F5C-9F46-8007-EBAC81E7F3D6}"/>
+              </a:ext>
+            </a:extLst>
+          </p:cNvPr>
+          <p:cNvSpPr/>
+          <p:nvPr/>
+        </p:nvSpPr>
+        <p:spPr>
+          <a:xfrm>
+            <a:off x="1384059" y="4675372"/>
+            <a:ext cx="1458000" cy="432000"/>
+          </a:xfrm>
+          <a:prstGeom prst="rect">
+            <a:avLst/>
+          </a:prstGeom>
+          <a:noFill/>
+          <a:ln w="38100">
+            <a:solidFill>
+              <a:schemeClr val="bg1">
+                <a:lumMod val="50000"/>
+              </a:schemeClr>
+            </a:solidFill>
+          </a:ln>
+        </p:spPr>
+        <p:txBody>
+          <a:bodyPr wrap="square" rtlCol="0">
+            <a:spAutoFit/>
+          </a:bodyPr>
+          <a:lstStyle/>
+          <a:p>
+            <a:endParaRPr lang="en-GB">
+              <a:solidFill>
+                <a:schemeClr val="tx1"/>
+              </a:solidFill>
+            </a:endParaRPr>
+          </a:p>
+        </p:txBody>
+      </p:sp>
+      <p:sp>
+        <p:nvSpPr>
+          <p:cNvPr id="36" name="Rectangle 35">
+            <a:extLst>
+              <a:ext uri="{FF2B5EF4-FFF2-40B4-BE49-F238E27FC236}">
+                <a16:creationId xmlns:a16="http://schemas.microsoft.com/office/drawing/2014/main" id="{10F8ABA2-134C-E244-8335-33CBB1B6DBB1}"/>
+              </a:ext>
+            </a:extLst>
+          </p:cNvPr>
+          <p:cNvSpPr/>
+          <p:nvPr/>
+        </p:nvSpPr>
+        <p:spPr>
+          <a:xfrm>
+            <a:off x="4450520" y="4673014"/>
+            <a:ext cx="810000" cy="432000"/>
+          </a:xfrm>
+          <a:prstGeom prst="rect">
+            <a:avLst/>
+          </a:prstGeom>
+          <a:noFill/>
+          <a:ln w="38100">
+            <a:solidFill>
+              <a:schemeClr val="bg1">
+                <a:lumMod val="50000"/>
+              </a:schemeClr>
+            </a:solidFill>
+          </a:ln>
+        </p:spPr>
+        <p:txBody>
+          <a:bodyPr wrap="square" rtlCol="0">
+            <a:spAutoFit/>
+          </a:bodyPr>
+          <a:lstStyle/>
+          <a:p>
+            <a:endParaRPr lang="en-GB">
+              <a:solidFill>
+                <a:schemeClr val="tx1"/>
+              </a:solidFill>
+            </a:endParaRPr>
+          </a:p>
+        </p:txBody>
+      </p:sp>
+      <p:sp>
+        <p:nvSpPr>
+          <p:cNvPr id="37" name="Rectangle 36">
+            <a:extLst>
+              <a:ext uri="{FF2B5EF4-FFF2-40B4-BE49-F238E27FC236}">
+                <a16:creationId xmlns:a16="http://schemas.microsoft.com/office/drawing/2014/main" id="{88343E1A-BF83-D141-8A71-5D3584DB9CA6}"/>
+              </a:ext>
+            </a:extLst>
+          </p:cNvPr>
+          <p:cNvSpPr/>
+          <p:nvPr/>
+        </p:nvSpPr>
+        <p:spPr>
+          <a:xfrm>
+            <a:off x="9045143" y="4678737"/>
+            <a:ext cx="1893600" cy="432000"/>
+          </a:xfrm>
+          <a:prstGeom prst="rect">
+            <a:avLst/>
+          </a:prstGeom>
+          <a:noFill/>
+          <a:ln w="38100">
+            <a:solidFill>
+              <a:schemeClr val="bg1">
+                <a:lumMod val="50000"/>
+              </a:schemeClr>
+            </a:solidFill>
+          </a:ln>
+        </p:spPr>
+        <p:txBody>
+          <a:bodyPr wrap="square" rtlCol="0">
+            <a:spAutoFit/>
+          </a:bodyPr>
+          <a:lstStyle/>
+          <a:p>
+            <a:endParaRPr lang="en-GB">
+              <a:solidFill>
+                <a:schemeClr val="tx1"/>
+              </a:solidFill>
+            </a:endParaRPr>
+          </a:p>
+        </p:txBody>
+      </p:sp>
+      <p:sp>
+        <p:nvSpPr>
+          <p:cNvPr id="38" name="Rectangle 37">
+            <a:extLst>
+              <a:ext uri="{FF2B5EF4-FFF2-40B4-BE49-F238E27FC236}">
+                <a16:creationId xmlns:a16="http://schemas.microsoft.com/office/drawing/2014/main" id="{A311E0EE-C5FB-C44B-B644-B5E857CB8852}"/>
+              </a:ext>
+            </a:extLst>
+          </p:cNvPr>
+          <p:cNvSpPr/>
+          <p:nvPr/>
+        </p:nvSpPr>
+        <p:spPr>
+          <a:xfrm>
+            <a:off x="8702933" y="5712402"/>
+            <a:ext cx="3391200" cy="432000"/>
+          </a:xfrm>
+          <a:prstGeom prst="rect">
+            <a:avLst/>
+          </a:prstGeom>
+          <a:noFill/>
+          <a:ln w="38100">
+            <a:solidFill>
+              <a:schemeClr val="bg1">
+                <a:lumMod val="50000"/>
+              </a:schemeClr>
+            </a:solidFill>
+          </a:ln>
+        </p:spPr>
+        <p:txBody>
+          <a:bodyPr wrap="square" rtlCol="0">
+            <a:spAutoFit/>
+          </a:bodyPr>
+          <a:lstStyle/>
+          <a:p>
+            <a:endParaRPr lang="en-GB">
+              <a:solidFill>
+                <a:schemeClr val="tx1"/>
+              </a:solidFill>
+            </a:endParaRPr>
+          </a:p>
+        </p:txBody>
+      </p:sp>
+      <p:cxnSp>
+        <p:nvCxnSpPr>
+          <p:cNvPr id="40" name="Straight Arrow Connector 39">
+            <a:extLst>
+              <a:ext uri="{FF2B5EF4-FFF2-40B4-BE49-F238E27FC236}">
+                <a16:creationId xmlns:a16="http://schemas.microsoft.com/office/drawing/2014/main" id="{41BB7706-71AF-AA48-94EC-BCDC698FD46C}"/>
+              </a:ext>
+            </a:extLst>
+          </p:cNvPr>
+          <p:cNvCxnSpPr>
+            <a:stCxn id="2" idx="2"/>
+            <a:endCxn id="5" idx="0"/>
+          </p:cNvCxnSpPr>
+          <p:nvPr/>
+        </p:nvCxnSpPr>
+        <p:spPr>
+          <a:xfrm flipH="1">
+            <a:off x="2824876" y="842801"/>
+            <a:ext cx="973344" cy="479499"/>
+          </a:xfrm>
+          <a:prstGeom prst="straightConnector1">
+            <a:avLst/>
+          </a:prstGeom>
+          <a:ln w="19050">
+            <a:solidFill>
+              <a:schemeClr val="tx1"/>
+            </a:solidFill>
+            <a:tailEnd type="triangle"/>
+          </a:ln>
+        </p:spPr>
+        <p:style>
+          <a:lnRef idx="1">
+            <a:schemeClr val="accent1"/>
+          </a:lnRef>
+          <a:fillRef idx="0">
+            <a:schemeClr val="accent1"/>
+          </a:fillRef>
+          <a:effectRef idx="0">
+            <a:schemeClr val="accent1"/>
+          </a:effectRef>
+          <a:fontRef idx="minor">
+            <a:schemeClr val="tx1"/>
+          </a:fontRef>
+        </p:style>
+      </p:cxnSp>
+      <p:cxnSp>
+        <p:nvCxnSpPr>
+          <p:cNvPr id="42" name="Straight Arrow Connector 41">
+            <a:extLst>
+              <a:ext uri="{FF2B5EF4-FFF2-40B4-BE49-F238E27FC236}">
+                <a16:creationId xmlns:a16="http://schemas.microsoft.com/office/drawing/2014/main" id="{AD6D7D03-3A91-5A48-8C4A-8EDE3E1E867B}"/>
+              </a:ext>
+            </a:extLst>
+          </p:cNvPr>
+          <p:cNvCxnSpPr>
+            <a:stCxn id="2" idx="2"/>
+            <a:endCxn id="6" idx="0"/>
+          </p:cNvCxnSpPr>
+          <p:nvPr/>
+        </p:nvCxnSpPr>
+        <p:spPr>
+          <a:xfrm>
+            <a:off x="3798220" y="842801"/>
+            <a:ext cx="953498" cy="450739"/>
+          </a:xfrm>
+          <a:prstGeom prst="straightConnector1">
+            <a:avLst/>
+          </a:prstGeom>
+          <a:ln w="19050">
+            <a:solidFill>
+              <a:schemeClr val="tx1"/>
+            </a:solidFill>
+            <a:tailEnd type="triangle"/>
+          </a:ln>
+        </p:spPr>
+        <p:style>
+          <a:lnRef idx="1">
+            <a:schemeClr val="accent1"/>
+          </a:lnRef>
+          <a:fillRef idx="0">
+            <a:schemeClr val="accent1"/>
+          </a:fillRef>
+          <a:effectRef idx="0">
+            <a:schemeClr val="accent1"/>
+          </a:effectRef>
+          <a:fontRef idx="minor">
+            <a:schemeClr val="tx1"/>
+          </a:fontRef>
+        </p:style>
+      </p:cxnSp>
+      <p:cxnSp>
+        <p:nvCxnSpPr>
+          <p:cNvPr id="44" name="Straight Arrow Connector 43">
+            <a:extLst>
+              <a:ext uri="{FF2B5EF4-FFF2-40B4-BE49-F238E27FC236}">
+                <a16:creationId xmlns:a16="http://schemas.microsoft.com/office/drawing/2014/main" id="{237EC9B3-3F62-A940-9921-F4A4179B9D21}"/>
+              </a:ext>
+            </a:extLst>
+          </p:cNvPr>
+          <p:cNvCxnSpPr>
+            <a:stCxn id="5" idx="2"/>
+            <a:endCxn id="27" idx="0"/>
+          </p:cNvCxnSpPr>
+          <p:nvPr/>
+        </p:nvCxnSpPr>
+        <p:spPr>
+          <a:xfrm>
+            <a:off x="2824876" y="1691632"/>
+            <a:ext cx="2605124" cy="692504"/>
+          </a:xfrm>
+          <a:prstGeom prst="straightConnector1">
+            <a:avLst/>
+          </a:prstGeom>
+          <a:ln w="19050">
+            <a:solidFill>
+              <a:schemeClr val="tx1"/>
+            </a:solidFill>
+            <a:tailEnd type="triangle"/>
+          </a:ln>
+        </p:spPr>
+        <p:style>
+          <a:lnRef idx="1">
+            <a:schemeClr val="accent1"/>
+          </a:lnRef>
+          <a:fillRef idx="0">
+            <a:schemeClr val="accent1"/>
+          </a:fillRef>
+          <a:effectRef idx="0">
+            <a:schemeClr val="accent1"/>
+          </a:effectRef>
+          <a:fontRef idx="minor">
+            <a:schemeClr val="tx1"/>
+          </a:fontRef>
+        </p:style>
+      </p:cxnSp>
+      <p:cxnSp>
+        <p:nvCxnSpPr>
+          <p:cNvPr id="46" name="Straight Arrow Connector 45">
+            <a:extLst>
+              <a:ext uri="{FF2B5EF4-FFF2-40B4-BE49-F238E27FC236}">
+                <a16:creationId xmlns:a16="http://schemas.microsoft.com/office/drawing/2014/main" id="{E8CC5513-CBB8-964F-AEC0-0F54C57E5A95}"/>
+              </a:ext>
+            </a:extLst>
+          </p:cNvPr>
+          <p:cNvCxnSpPr>
+            <a:stCxn id="6" idx="2"/>
+            <a:endCxn id="27" idx="0"/>
+          </p:cNvCxnSpPr>
+          <p:nvPr/>
+        </p:nvCxnSpPr>
+        <p:spPr>
+          <a:xfrm>
+            <a:off x="4751718" y="1662872"/>
+            <a:ext cx="678282" cy="721264"/>
+          </a:xfrm>
+          <a:prstGeom prst="straightConnector1">
+            <a:avLst/>
+          </a:prstGeom>
+          <a:ln w="19050">
+            <a:solidFill>
+              <a:schemeClr val="tx1"/>
+            </a:solidFill>
+            <a:tailEnd type="triangle"/>
+          </a:ln>
+        </p:spPr>
+        <p:style>
+          <a:lnRef idx="1">
+            <a:schemeClr val="accent1"/>
+          </a:lnRef>
+          <a:fillRef idx="0">
+            <a:schemeClr val="accent1"/>
+          </a:fillRef>
+          <a:effectRef idx="0">
+            <a:schemeClr val="accent1"/>
+          </a:effectRef>
+          <a:fontRef idx="minor">
+            <a:schemeClr val="tx1"/>
+          </a:fontRef>
+        </p:style>
+      </p:cxnSp>
+      <p:cxnSp>
+        <p:nvCxnSpPr>
+          <p:cNvPr id="48" name="Straight Arrow Connector 47">
+            <a:extLst>
+              <a:ext uri="{FF2B5EF4-FFF2-40B4-BE49-F238E27FC236}">
+                <a16:creationId xmlns:a16="http://schemas.microsoft.com/office/drawing/2014/main" id="{A40A9A53-5B83-1741-8B38-7DFD7397D2B6}"/>
+              </a:ext>
+            </a:extLst>
+          </p:cNvPr>
+          <p:cNvCxnSpPr>
+            <a:stCxn id="5" idx="2"/>
+            <a:endCxn id="26" idx="0"/>
+          </p:cNvCxnSpPr>
+          <p:nvPr/>
+        </p:nvCxnSpPr>
+        <p:spPr>
+          <a:xfrm>
+            <a:off x="2824876" y="1691632"/>
+            <a:ext cx="4610829" cy="692504"/>
+          </a:xfrm>
+          <a:prstGeom prst="straightConnector1">
+            <a:avLst/>
+          </a:prstGeom>
+          <a:ln w="19050">
+            <a:solidFill>
+              <a:schemeClr val="tx1"/>
+            </a:solidFill>
+            <a:tailEnd type="triangle"/>
+          </a:ln>
+        </p:spPr>
+        <p:style>
+          <a:lnRef idx="1">
+            <a:schemeClr val="accent1"/>
+          </a:lnRef>
+          <a:fillRef idx="0">
+            <a:schemeClr val="accent1"/>
+          </a:fillRef>
+          <a:effectRef idx="0">
+            <a:schemeClr val="accent1"/>
+          </a:effectRef>
+          <a:fontRef idx="minor">
+            <a:schemeClr val="tx1"/>
+          </a:fontRef>
+        </p:style>
+      </p:cxnSp>
+      <p:cxnSp>
+        <p:nvCxnSpPr>
+          <p:cNvPr id="50" name="Straight Arrow Connector 49">
+            <a:extLst>
+              <a:ext uri="{FF2B5EF4-FFF2-40B4-BE49-F238E27FC236}">
+                <a16:creationId xmlns:a16="http://schemas.microsoft.com/office/drawing/2014/main" id="{7F6E8486-8545-6E45-9943-AE028AA2D5EA}"/>
+              </a:ext>
+            </a:extLst>
+          </p:cNvPr>
+          <p:cNvCxnSpPr>
+            <a:stCxn id="6" idx="2"/>
+            <a:endCxn id="26" idx="0"/>
+          </p:cNvCxnSpPr>
+          <p:nvPr/>
+        </p:nvCxnSpPr>
+        <p:spPr>
+          <a:xfrm>
+            <a:off x="4751718" y="1662872"/>
+            <a:ext cx="2683987" cy="721264"/>
+          </a:xfrm>
+          <a:prstGeom prst="straightConnector1">
+            <a:avLst/>
+          </a:prstGeom>
+          <a:ln w="19050">
+            <a:solidFill>
+              <a:schemeClr val="tx1"/>
+            </a:solidFill>
+            <a:tailEnd type="triangle"/>
+          </a:ln>
+        </p:spPr>
+        <p:style>
+          <a:lnRef idx="1">
+            <a:schemeClr val="accent1"/>
+          </a:lnRef>
+          <a:fillRef idx="0">
+            <a:schemeClr val="accent1"/>
+          </a:fillRef>
+          <a:effectRef idx="0">
+            <a:schemeClr val="accent1"/>
+          </a:effectRef>
+          <a:fontRef idx="minor">
+            <a:schemeClr val="tx1"/>
+          </a:fontRef>
+        </p:style>
+      </p:cxnSp>
+      <p:cxnSp>
+        <p:nvCxnSpPr>
+          <p:cNvPr id="52" name="Straight Arrow Connector 51">
+            <a:extLst>
+              <a:ext uri="{FF2B5EF4-FFF2-40B4-BE49-F238E27FC236}">
+                <a16:creationId xmlns:a16="http://schemas.microsoft.com/office/drawing/2014/main" id="{625E47E0-A447-E04E-8EE3-A700B6B3DCCB}"/>
+              </a:ext>
+            </a:extLst>
+          </p:cNvPr>
+          <p:cNvCxnSpPr>
+            <a:stCxn id="25" idx="2"/>
+            <a:endCxn id="27" idx="0"/>
+          </p:cNvCxnSpPr>
+          <p:nvPr/>
+        </p:nvCxnSpPr>
+        <p:spPr>
+          <a:xfrm flipH="1">
+            <a:off x="5430000" y="842801"/>
+            <a:ext cx="2866100" cy="1541335"/>
+          </a:xfrm>
+          <a:prstGeom prst="straightConnector1">
+            <a:avLst/>
+          </a:prstGeom>
+          <a:ln w="19050">
+            <a:solidFill>
+              <a:schemeClr val="tx1"/>
+            </a:solidFill>
+            <a:tailEnd type="triangle"/>
+          </a:ln>
+        </p:spPr>
+        <p:style>
+          <a:lnRef idx="1">
+            <a:schemeClr val="accent1"/>
+          </a:lnRef>
+          <a:fillRef idx="0">
+            <a:schemeClr val="accent1"/>
+          </a:fillRef>
+          <a:effectRef idx="0">
+            <a:schemeClr val="accent1"/>
+          </a:effectRef>
+          <a:fontRef idx="minor">
+            <a:schemeClr val="tx1"/>
+          </a:fontRef>
+        </p:style>
+      </p:cxnSp>
+      <p:cxnSp>
+        <p:nvCxnSpPr>
+          <p:cNvPr id="54" name="Straight Arrow Connector 53">
+            <a:extLst>
+              <a:ext uri="{FF2B5EF4-FFF2-40B4-BE49-F238E27FC236}">
+                <a16:creationId xmlns:a16="http://schemas.microsoft.com/office/drawing/2014/main" id="{DF7EB152-3A71-614C-B81A-0B37ED0A0318}"/>
+              </a:ext>
+            </a:extLst>
+          </p:cNvPr>
+          <p:cNvCxnSpPr>
+            <a:stCxn id="25" idx="2"/>
+            <a:endCxn id="26" idx="0"/>
+          </p:cNvCxnSpPr>
+          <p:nvPr/>
+        </p:nvCxnSpPr>
+        <p:spPr>
+          <a:xfrm flipH="1">
+            <a:off x="7435705" y="842801"/>
+            <a:ext cx="860395" cy="1541335"/>
+          </a:xfrm>
+          <a:prstGeom prst="straightConnector1">
+            <a:avLst/>
+          </a:prstGeom>
+          <a:ln w="19050">
+            <a:solidFill>
+              <a:schemeClr val="tx1"/>
+            </a:solidFill>
+            <a:tailEnd type="triangle"/>
+          </a:ln>
+        </p:spPr>
+        <p:style>
+          <a:lnRef idx="1">
+            <a:schemeClr val="accent1"/>
+          </a:lnRef>
+          <a:fillRef idx="0">
+            <a:schemeClr val="accent1"/>
+          </a:fillRef>
+          <a:effectRef idx="0">
+            <a:schemeClr val="accent1"/>
+          </a:effectRef>
+          <a:fontRef idx="minor">
+            <a:schemeClr val="tx1"/>
+          </a:fontRef>
+        </p:style>
+      </p:cxnSp>
+      <p:cxnSp>
+        <p:nvCxnSpPr>
+          <p:cNvPr id="56" name="Straight Arrow Connector 55">
+            <a:extLst>
+              <a:ext uri="{FF2B5EF4-FFF2-40B4-BE49-F238E27FC236}">
+                <a16:creationId xmlns:a16="http://schemas.microsoft.com/office/drawing/2014/main" id="{C554A7E5-22EA-A640-A6C9-7F11AD9BB0DD}"/>
+              </a:ext>
+            </a:extLst>
+          </p:cNvPr>
+          <p:cNvCxnSpPr>
+            <a:stCxn id="27" idx="2"/>
+            <a:endCxn id="33" idx="0"/>
+          </p:cNvCxnSpPr>
+          <p:nvPr/>
+        </p:nvCxnSpPr>
+        <p:spPr>
+          <a:xfrm flipH="1">
+            <a:off x="727388" y="2816136"/>
+            <a:ext cx="4702612" cy="795178"/>
+          </a:xfrm>
+          <a:prstGeom prst="straightConnector1">
+            <a:avLst/>
+          </a:prstGeom>
+          <a:ln w="19050">
+            <a:solidFill>
+              <a:schemeClr val="tx1"/>
+            </a:solidFill>
+            <a:tailEnd type="triangle"/>
+          </a:ln>
+        </p:spPr>
+        <p:style>
+          <a:lnRef idx="1">
+            <a:schemeClr val="accent1"/>
+          </a:lnRef>
+          <a:fillRef idx="0">
+            <a:schemeClr val="accent1"/>
+          </a:fillRef>
+          <a:effectRef idx="0">
+            <a:schemeClr val="accent1"/>
+          </a:effectRef>
+          <a:fontRef idx="minor">
+            <a:schemeClr val="tx1"/>
+          </a:fontRef>
+        </p:style>
+      </p:cxnSp>
+      <p:cxnSp>
+        <p:nvCxnSpPr>
+          <p:cNvPr id="58" name="Straight Arrow Connector 57">
+            <a:extLst>
+              <a:ext uri="{FF2B5EF4-FFF2-40B4-BE49-F238E27FC236}">
+                <a16:creationId xmlns:a16="http://schemas.microsoft.com/office/drawing/2014/main" id="{C4A3422E-2D34-6A4A-9681-B57D761C8AA9}"/>
+              </a:ext>
+            </a:extLst>
+          </p:cNvPr>
+          <p:cNvCxnSpPr>
+            <a:stCxn id="27" idx="2"/>
+            <a:endCxn id="32" idx="0"/>
+          </p:cNvCxnSpPr>
+          <p:nvPr/>
+        </p:nvCxnSpPr>
+        <p:spPr>
+          <a:xfrm flipH="1">
+            <a:off x="2135668" y="2816136"/>
+            <a:ext cx="3294332" cy="799322"/>
+          </a:xfrm>
+          <a:prstGeom prst="straightConnector1">
+            <a:avLst/>
+          </a:prstGeom>
+          <a:ln w="19050">
+            <a:solidFill>
+              <a:schemeClr val="tx1"/>
+            </a:solidFill>
+            <a:tailEnd type="triangle"/>
+          </a:ln>
+        </p:spPr>
+        <p:style>
+          <a:lnRef idx="1">
+            <a:schemeClr val="accent1"/>
+          </a:lnRef>
+          <a:fillRef idx="0">
+            <a:schemeClr val="accent1"/>
+          </a:fillRef>
+          <a:effectRef idx="0">
+            <a:schemeClr val="accent1"/>
+          </a:effectRef>
+          <a:fontRef idx="minor">
+            <a:schemeClr val="tx1"/>
+          </a:fontRef>
+        </p:style>
+      </p:cxnSp>
+      <p:cxnSp>
+        <p:nvCxnSpPr>
+          <p:cNvPr id="60" name="Straight Arrow Connector 59">
+            <a:extLst>
+              <a:ext uri="{FF2B5EF4-FFF2-40B4-BE49-F238E27FC236}">
+                <a16:creationId xmlns:a16="http://schemas.microsoft.com/office/drawing/2014/main" id="{4384E438-8385-6D4B-B092-B95F0F2F980F}"/>
+              </a:ext>
+            </a:extLst>
+          </p:cNvPr>
+          <p:cNvCxnSpPr>
+            <a:stCxn id="27" idx="2"/>
+            <a:endCxn id="31" idx="0"/>
+          </p:cNvCxnSpPr>
+          <p:nvPr/>
+        </p:nvCxnSpPr>
+        <p:spPr>
+          <a:xfrm flipH="1">
+            <a:off x="3583198" y="2816136"/>
+            <a:ext cx="1846802" cy="802445"/>
+          </a:xfrm>
+          <a:prstGeom prst="straightConnector1">
+            <a:avLst/>
+          </a:prstGeom>
+          <a:ln w="19050">
+            <a:solidFill>
+              <a:schemeClr val="tx1"/>
+            </a:solidFill>
+            <a:tailEnd type="triangle"/>
+          </a:ln>
+        </p:spPr>
+        <p:style>
+          <a:lnRef idx="1">
+            <a:schemeClr val="accent1"/>
+          </a:lnRef>
+          <a:fillRef idx="0">
+            <a:schemeClr val="accent1"/>
+          </a:fillRef>
+          <a:effectRef idx="0">
+            <a:schemeClr val="accent1"/>
+          </a:effectRef>
+          <a:fontRef idx="minor">
+            <a:schemeClr val="tx1"/>
+          </a:fontRef>
+        </p:style>
+      </p:cxnSp>
+      <p:cxnSp>
+        <p:nvCxnSpPr>
+          <p:cNvPr id="62" name="Straight Arrow Connector 61">
+            <a:extLst>
+              <a:ext uri="{FF2B5EF4-FFF2-40B4-BE49-F238E27FC236}">
+                <a16:creationId xmlns:a16="http://schemas.microsoft.com/office/drawing/2014/main" id="{BC2FF72C-6417-7846-A7C6-AE8CA4BE1CDB}"/>
+              </a:ext>
+            </a:extLst>
+          </p:cNvPr>
+          <p:cNvCxnSpPr>
+            <a:stCxn id="27" idx="2"/>
+            <a:endCxn id="30" idx="0"/>
+          </p:cNvCxnSpPr>
+          <p:nvPr/>
+        </p:nvCxnSpPr>
+        <p:spPr>
+          <a:xfrm flipH="1">
+            <a:off x="4853076" y="2816136"/>
+            <a:ext cx="576924" cy="799322"/>
+          </a:xfrm>
+          <a:prstGeom prst="straightConnector1">
+            <a:avLst/>
+          </a:prstGeom>
+          <a:ln w="19050">
+            <a:solidFill>
+              <a:schemeClr val="tx1"/>
+            </a:solidFill>
+            <a:tailEnd type="triangle"/>
+          </a:ln>
+        </p:spPr>
+        <p:style>
+          <a:lnRef idx="1">
+            <a:schemeClr val="accent1"/>
+          </a:lnRef>
+          <a:fillRef idx="0">
+            <a:schemeClr val="accent1"/>
+          </a:fillRef>
+          <a:effectRef idx="0">
+            <a:schemeClr val="accent1"/>
+          </a:effectRef>
+          <a:fontRef idx="minor">
+            <a:schemeClr val="tx1"/>
+          </a:fontRef>
+        </p:style>
+      </p:cxnSp>
+      <p:cxnSp>
+        <p:nvCxnSpPr>
+          <p:cNvPr id="64" name="Straight Arrow Connector 63">
+            <a:extLst>
+              <a:ext uri="{FF2B5EF4-FFF2-40B4-BE49-F238E27FC236}">
+                <a16:creationId xmlns:a16="http://schemas.microsoft.com/office/drawing/2014/main" id="{A315FD2F-9574-CE45-A694-A16216627B8E}"/>
+              </a:ext>
+            </a:extLst>
+          </p:cNvPr>
+          <p:cNvCxnSpPr>
+            <a:stCxn id="27" idx="2"/>
+            <a:endCxn id="29" idx="0"/>
+          </p:cNvCxnSpPr>
+          <p:nvPr/>
+        </p:nvCxnSpPr>
+        <p:spPr>
+          <a:xfrm>
+            <a:off x="5430000" y="2816136"/>
+            <a:ext cx="375454" cy="801394"/>
+          </a:xfrm>
+          <a:prstGeom prst="straightConnector1">
+            <a:avLst/>
+          </a:prstGeom>
+          <a:ln w="19050">
+            <a:solidFill>
+              <a:schemeClr val="tx1"/>
+            </a:solidFill>
+            <a:tailEnd type="triangle"/>
+          </a:ln>
+        </p:spPr>
+        <p:style>
+          <a:lnRef idx="1">
+            <a:schemeClr val="accent1"/>
+          </a:lnRef>
+          <a:fillRef idx="0">
+            <a:schemeClr val="accent1"/>
+          </a:fillRef>
+          <a:effectRef idx="0">
+            <a:schemeClr val="accent1"/>
+          </a:effectRef>
+          <a:fontRef idx="minor">
+            <a:schemeClr val="tx1"/>
+          </a:fontRef>
+        </p:style>
+      </p:cxnSp>
+      <p:cxnSp>
+        <p:nvCxnSpPr>
+          <p:cNvPr id="66" name="Straight Arrow Connector 65">
+            <a:extLst>
+              <a:ext uri="{FF2B5EF4-FFF2-40B4-BE49-F238E27FC236}">
+                <a16:creationId xmlns:a16="http://schemas.microsoft.com/office/drawing/2014/main" id="{FD4009BA-A1CF-5B4E-BAC5-5F016992F289}"/>
+              </a:ext>
+            </a:extLst>
+          </p:cNvPr>
+          <p:cNvCxnSpPr>
+            <a:stCxn id="26" idx="2"/>
+            <a:endCxn id="8" idx="0"/>
+          </p:cNvCxnSpPr>
+          <p:nvPr/>
+        </p:nvCxnSpPr>
+        <p:spPr>
+          <a:xfrm>
+            <a:off x="7435705" y="2816136"/>
+            <a:ext cx="144105" cy="831660"/>
+          </a:xfrm>
+          <a:prstGeom prst="straightConnector1">
+            <a:avLst/>
+          </a:prstGeom>
+          <a:ln w="19050">
+            <a:solidFill>
+              <a:schemeClr val="tx1"/>
+            </a:solidFill>
+            <a:tailEnd type="triangle"/>
+          </a:ln>
+        </p:spPr>
+        <p:style>
+          <a:lnRef idx="1">
+            <a:schemeClr val="accent1"/>
+          </a:lnRef>
+          <a:fillRef idx="0">
+            <a:schemeClr val="accent1"/>
+          </a:fillRef>
+          <a:effectRef idx="0">
+            <a:schemeClr val="accent1"/>
+          </a:effectRef>
+          <a:fontRef idx="minor">
+            <a:schemeClr val="tx1"/>
+          </a:fontRef>
+        </p:style>
+      </p:cxnSp>
+      <p:cxnSp>
+        <p:nvCxnSpPr>
+          <p:cNvPr id="68" name="Straight Arrow Connector 67">
+            <a:extLst>
+              <a:ext uri="{FF2B5EF4-FFF2-40B4-BE49-F238E27FC236}">
+                <a16:creationId xmlns:a16="http://schemas.microsoft.com/office/drawing/2014/main" id="{334F66C2-49ED-2842-9DDA-0A5DC9D2EFF2}"/>
+              </a:ext>
+            </a:extLst>
+          </p:cNvPr>
+          <p:cNvCxnSpPr>
+            <a:stCxn id="26" idx="2"/>
+            <a:endCxn id="28" idx="0"/>
+          </p:cNvCxnSpPr>
+          <p:nvPr/>
+        </p:nvCxnSpPr>
+        <p:spPr>
+          <a:xfrm>
+            <a:off x="7435705" y="2816136"/>
+            <a:ext cx="1493040" cy="802430"/>
+          </a:xfrm>
+          <a:prstGeom prst="straightConnector1">
+            <a:avLst/>
+          </a:prstGeom>
+          <a:ln w="19050">
+            <a:solidFill>
+              <a:schemeClr val="tx1"/>
+            </a:solidFill>
+            <a:tailEnd type="triangle"/>
+          </a:ln>
+        </p:spPr>
+        <p:style>
+          <a:lnRef idx="1">
+            <a:schemeClr val="accent1"/>
+          </a:lnRef>
+          <a:fillRef idx="0">
+            <a:schemeClr val="accent1"/>
+          </a:fillRef>
+          <a:effectRef idx="0">
+            <a:schemeClr val="accent1"/>
+          </a:effectRef>
+          <a:fontRef idx="minor">
+            <a:schemeClr val="tx1"/>
+          </a:fontRef>
+        </p:style>
+      </p:cxnSp>
+      <p:cxnSp>
+        <p:nvCxnSpPr>
+          <p:cNvPr id="70" name="Straight Arrow Connector 69">
+            <a:extLst>
+              <a:ext uri="{FF2B5EF4-FFF2-40B4-BE49-F238E27FC236}">
+                <a16:creationId xmlns:a16="http://schemas.microsoft.com/office/drawing/2014/main" id="{E97378F1-FB3F-8244-A4AD-FF45A74516CD}"/>
+              </a:ext>
+            </a:extLst>
+          </p:cNvPr>
+          <p:cNvCxnSpPr>
+            <a:stCxn id="33" idx="2"/>
+            <a:endCxn id="34" idx="0"/>
+          </p:cNvCxnSpPr>
+          <p:nvPr/>
+        </p:nvCxnSpPr>
+        <p:spPr>
+          <a:xfrm flipH="1">
+            <a:off x="658420" y="4043314"/>
+            <a:ext cx="68968" cy="624272"/>
+          </a:xfrm>
+          <a:prstGeom prst="straightConnector1">
+            <a:avLst/>
+          </a:prstGeom>
+          <a:ln w="19050">
+            <a:solidFill>
+              <a:schemeClr val="tx1"/>
+            </a:solidFill>
+            <a:tailEnd type="triangle"/>
+          </a:ln>
+        </p:spPr>
+        <p:style>
+          <a:lnRef idx="1">
+            <a:schemeClr val="accent1"/>
+          </a:lnRef>
+          <a:fillRef idx="0">
+            <a:schemeClr val="accent1"/>
+          </a:fillRef>
+          <a:effectRef idx="0">
+            <a:schemeClr val="accent1"/>
+          </a:effectRef>
+          <a:fontRef idx="minor">
+            <a:schemeClr val="tx1"/>
+          </a:fontRef>
+        </p:style>
+      </p:cxnSp>
+      <p:cxnSp>
+        <p:nvCxnSpPr>
+          <p:cNvPr id="72" name="Straight Arrow Connector 71">
+            <a:extLst>
+              <a:ext uri="{FF2B5EF4-FFF2-40B4-BE49-F238E27FC236}">
+                <a16:creationId xmlns:a16="http://schemas.microsoft.com/office/drawing/2014/main" id="{5705F367-64D7-E040-89E4-A2F7DB3F4715}"/>
+              </a:ext>
+            </a:extLst>
+          </p:cNvPr>
+          <p:cNvCxnSpPr>
+            <a:stCxn id="33" idx="2"/>
+            <a:endCxn id="35" idx="0"/>
+          </p:cNvCxnSpPr>
+          <p:nvPr/>
+        </p:nvCxnSpPr>
+        <p:spPr>
+          <a:xfrm>
+            <a:off x="727388" y="4043314"/>
+            <a:ext cx="1385671" cy="632058"/>
+          </a:xfrm>
+          <a:prstGeom prst="straightConnector1">
+            <a:avLst/>
+          </a:prstGeom>
+          <a:ln w="19050">
+            <a:solidFill>
+              <a:schemeClr val="tx1"/>
+            </a:solidFill>
+            <a:tailEnd type="triangle"/>
+          </a:ln>
+        </p:spPr>
+        <p:style>
+          <a:lnRef idx="1">
+            <a:schemeClr val="accent1"/>
+          </a:lnRef>
+          <a:fillRef idx="0">
+            <a:schemeClr val="accent1"/>
+          </a:fillRef>
+          <a:effectRef idx="0">
+            <a:schemeClr val="accent1"/>
+          </a:effectRef>
+          <a:fontRef idx="minor">
+            <a:schemeClr val="tx1"/>
+          </a:fontRef>
+        </p:style>
+      </p:cxnSp>
+      <p:cxnSp>
+        <p:nvCxnSpPr>
+          <p:cNvPr id="74" name="Straight Arrow Connector 73">
+            <a:extLst>
+              <a:ext uri="{FF2B5EF4-FFF2-40B4-BE49-F238E27FC236}">
+                <a16:creationId xmlns:a16="http://schemas.microsoft.com/office/drawing/2014/main" id="{282280F7-76E7-7E4D-B624-31796A727743}"/>
+              </a:ext>
+            </a:extLst>
+          </p:cNvPr>
+          <p:cNvCxnSpPr>
+            <a:stCxn id="30" idx="2"/>
+            <a:endCxn id="36" idx="0"/>
+          </p:cNvCxnSpPr>
+          <p:nvPr/>
+        </p:nvCxnSpPr>
+        <p:spPr>
+          <a:xfrm>
+            <a:off x="4853076" y="4047458"/>
+            <a:ext cx="2444" cy="625556"/>
+          </a:xfrm>
+          <a:prstGeom prst="straightConnector1">
+            <a:avLst/>
+          </a:prstGeom>
+          <a:ln w="19050">
+            <a:solidFill>
+              <a:schemeClr val="tx1"/>
+            </a:solidFill>
+            <a:tailEnd type="triangle"/>
+          </a:ln>
+        </p:spPr>
+        <p:style>
+          <a:lnRef idx="1">
+            <a:schemeClr val="accent1"/>
+          </a:lnRef>
+          <a:fillRef idx="0">
+            <a:schemeClr val="accent1"/>
+          </a:fillRef>
+          <a:effectRef idx="0">
+            <a:schemeClr val="accent1"/>
+          </a:effectRef>
+          <a:fontRef idx="minor">
+            <a:schemeClr val="tx1"/>
+          </a:fontRef>
+        </p:style>
+      </p:cxnSp>
+      <p:cxnSp>
+        <p:nvCxnSpPr>
+          <p:cNvPr id="76" name="Straight Arrow Connector 75">
+            <a:extLst>
+              <a:ext uri="{FF2B5EF4-FFF2-40B4-BE49-F238E27FC236}">
+                <a16:creationId xmlns:a16="http://schemas.microsoft.com/office/drawing/2014/main" id="{24000D80-A4DA-7845-9760-8F89A1E4FDFD}"/>
+              </a:ext>
+            </a:extLst>
+          </p:cNvPr>
+          <p:cNvCxnSpPr>
+            <a:stCxn id="28" idx="2"/>
+            <a:endCxn id="16" idx="0"/>
+          </p:cNvCxnSpPr>
+          <p:nvPr/>
+        </p:nvCxnSpPr>
+        <p:spPr>
+          <a:xfrm flipH="1">
+            <a:off x="7973928" y="4050566"/>
+            <a:ext cx="954817" cy="656140"/>
+          </a:xfrm>
+          <a:prstGeom prst="straightConnector1">
+            <a:avLst/>
+          </a:prstGeom>
+          <a:ln w="19050">
+            <a:solidFill>
+              <a:schemeClr val="tx1"/>
+            </a:solidFill>
+            <a:tailEnd type="triangle"/>
+          </a:ln>
+        </p:spPr>
+        <p:style>
+          <a:lnRef idx="1">
+            <a:schemeClr val="accent1"/>
+          </a:lnRef>
+          <a:fillRef idx="0">
+            <a:schemeClr val="accent1"/>
+          </a:fillRef>
+          <a:effectRef idx="0">
+            <a:schemeClr val="accent1"/>
+          </a:effectRef>
+          <a:fontRef idx="minor">
+            <a:schemeClr val="tx1"/>
+          </a:fontRef>
+        </p:style>
+      </p:cxnSp>
+      <p:cxnSp>
+        <p:nvCxnSpPr>
+          <p:cNvPr id="78" name="Straight Arrow Connector 77">
+            <a:extLst>
+              <a:ext uri="{FF2B5EF4-FFF2-40B4-BE49-F238E27FC236}">
+                <a16:creationId xmlns:a16="http://schemas.microsoft.com/office/drawing/2014/main" id="{F0EB8DE9-9BAE-4A4E-8E93-3664CCC74B41}"/>
+              </a:ext>
+            </a:extLst>
+          </p:cNvPr>
+          <p:cNvCxnSpPr>
+            <a:stCxn id="28" idx="2"/>
+            <a:endCxn id="37" idx="0"/>
+          </p:cNvCxnSpPr>
+          <p:nvPr/>
+        </p:nvCxnSpPr>
+        <p:spPr>
+          <a:xfrm>
+            <a:off x="8928745" y="4050566"/>
+            <a:ext cx="1063198" cy="628171"/>
+          </a:xfrm>
+          <a:prstGeom prst="straightConnector1">
+            <a:avLst/>
+          </a:prstGeom>
+          <a:ln w="19050">
+            <a:solidFill>
+              <a:schemeClr val="tx1"/>
+            </a:solidFill>
+            <a:tailEnd type="triangle"/>
+          </a:ln>
+        </p:spPr>
+        <p:style>
+          <a:lnRef idx="1">
+            <a:schemeClr val="accent1"/>
+          </a:lnRef>
+          <a:fillRef idx="0">
+            <a:schemeClr val="accent1"/>
+          </a:fillRef>
+          <a:effectRef idx="0">
+            <a:schemeClr val="accent1"/>
+          </a:effectRef>
+          <a:fontRef idx="minor">
+            <a:schemeClr val="tx1"/>
+          </a:fontRef>
+        </p:style>
+      </p:cxnSp>
+      <p:cxnSp>
+        <p:nvCxnSpPr>
+          <p:cNvPr id="80" name="Straight Arrow Connector 79">
+            <a:extLst>
+              <a:ext uri="{FF2B5EF4-FFF2-40B4-BE49-F238E27FC236}">
+                <a16:creationId xmlns:a16="http://schemas.microsoft.com/office/drawing/2014/main" id="{4791FF8B-222C-5E41-9792-2579F2A48E77}"/>
+              </a:ext>
+            </a:extLst>
+          </p:cNvPr>
+          <p:cNvCxnSpPr>
+            <a:stCxn id="16" idx="2"/>
+            <a:endCxn id="22" idx="0"/>
+          </p:cNvCxnSpPr>
+          <p:nvPr/>
+        </p:nvCxnSpPr>
+        <p:spPr>
+          <a:xfrm flipH="1">
+            <a:off x="6100864" y="5076038"/>
+            <a:ext cx="1873064" cy="643089"/>
+          </a:xfrm>
+          <a:prstGeom prst="straightConnector1">
+            <a:avLst/>
+          </a:prstGeom>
+          <a:ln w="19050">
+            <a:solidFill>
+              <a:schemeClr val="tx1"/>
+            </a:solidFill>
+            <a:tailEnd type="triangle"/>
+          </a:ln>
+        </p:spPr>
+        <p:style>
+          <a:lnRef idx="1">
+            <a:schemeClr val="accent1"/>
+          </a:lnRef>
+          <a:fillRef idx="0">
+            <a:schemeClr val="accent1"/>
+          </a:fillRef>
+          <a:effectRef idx="0">
+            <a:schemeClr val="accent1"/>
+          </a:effectRef>
+          <a:fontRef idx="minor">
+            <a:schemeClr val="tx1"/>
+          </a:fontRef>
+        </p:style>
+      </p:cxnSp>
+      <p:cxnSp>
+        <p:nvCxnSpPr>
+          <p:cNvPr id="82" name="Straight Arrow Connector 81">
+            <a:extLst>
+              <a:ext uri="{FF2B5EF4-FFF2-40B4-BE49-F238E27FC236}">
+                <a16:creationId xmlns:a16="http://schemas.microsoft.com/office/drawing/2014/main" id="{39CA2D96-742E-E847-8151-1BFDB0A1F741}"/>
+              </a:ext>
+            </a:extLst>
+          </p:cNvPr>
+          <p:cNvCxnSpPr>
+            <a:stCxn id="16" idx="2"/>
+            <a:endCxn id="23" idx="0"/>
+          </p:cNvCxnSpPr>
+          <p:nvPr/>
+        </p:nvCxnSpPr>
+        <p:spPr>
+          <a:xfrm flipH="1">
+            <a:off x="7721794" y="5076038"/>
+            <a:ext cx="252134" cy="656547"/>
+          </a:xfrm>
+          <a:prstGeom prst="straightConnector1">
+            <a:avLst/>
+          </a:prstGeom>
+          <a:ln w="19050">
+            <a:solidFill>
+              <a:schemeClr val="tx1"/>
+            </a:solidFill>
+            <a:tailEnd type="triangle"/>
+          </a:ln>
+        </p:spPr>
+        <p:style>
+          <a:lnRef idx="1">
+            <a:schemeClr val="accent1"/>
+          </a:lnRef>
+          <a:fillRef idx="0">
+            <a:schemeClr val="accent1"/>
+          </a:fillRef>
+          <a:effectRef idx="0">
+            <a:schemeClr val="accent1"/>
+          </a:effectRef>
+          <a:fontRef idx="minor">
+            <a:schemeClr val="tx1"/>
+          </a:fontRef>
+        </p:style>
+      </p:cxnSp>
+      <p:cxnSp>
+        <p:nvCxnSpPr>
+          <p:cNvPr id="84" name="Straight Arrow Connector 83">
+            <a:extLst>
+              <a:ext uri="{FF2B5EF4-FFF2-40B4-BE49-F238E27FC236}">
+                <a16:creationId xmlns:a16="http://schemas.microsoft.com/office/drawing/2014/main" id="{1621E3A7-B44F-4648-BB1E-23DECDDE42C3}"/>
+              </a:ext>
+            </a:extLst>
+          </p:cNvPr>
+          <p:cNvCxnSpPr>
+            <a:stCxn id="37" idx="2"/>
+          </p:cNvCxnSpPr>
+          <p:nvPr/>
+        </p:nvCxnSpPr>
+        <p:spPr>
+          <a:xfrm flipH="1">
+            <a:off x="9195018" y="5110737"/>
+            <a:ext cx="796925" cy="601665"/>
+          </a:xfrm>
+          <a:prstGeom prst="straightConnector1">
+            <a:avLst/>
+          </a:prstGeom>
+          <a:ln w="19050">
+            <a:solidFill>
+              <a:schemeClr val="tx1"/>
+            </a:solidFill>
+            <a:tailEnd type="triangle"/>
+          </a:ln>
+        </p:spPr>
+        <p:style>
+          <a:lnRef idx="1">
+            <a:schemeClr val="accent1"/>
+          </a:lnRef>
+          <a:fillRef idx="0">
+            <a:schemeClr val="accent1"/>
+          </a:fillRef>
+          <a:effectRef idx="0">
+            <a:schemeClr val="accent1"/>
+          </a:effectRef>
+          <a:fontRef idx="minor">
+            <a:schemeClr val="tx1"/>
+          </a:fontRef>
+        </p:style>
+      </p:cxnSp>
+      <p:cxnSp>
+        <p:nvCxnSpPr>
+          <p:cNvPr id="88" name="Straight Arrow Connector 87">
+            <a:extLst>
+              <a:ext uri="{FF2B5EF4-FFF2-40B4-BE49-F238E27FC236}">
+                <a16:creationId xmlns:a16="http://schemas.microsoft.com/office/drawing/2014/main" id="{DD3C231F-B17F-EA48-8B90-AD40C5F43B13}"/>
+              </a:ext>
+            </a:extLst>
+          </p:cNvPr>
+          <p:cNvCxnSpPr>
+            <a:stCxn id="37" idx="2"/>
+          </p:cNvCxnSpPr>
+          <p:nvPr/>
+        </p:nvCxnSpPr>
+        <p:spPr>
+          <a:xfrm>
+            <a:off x="9991943" y="5110737"/>
+            <a:ext cx="1438885" cy="601665"/>
+          </a:xfrm>
+          <a:prstGeom prst="straightConnector1">
+            <a:avLst/>
+          </a:prstGeom>
+          <a:ln w="19050">
+            <a:solidFill>
+              <a:schemeClr val="tx1"/>
+            </a:solidFill>
+            <a:tailEnd type="triangle"/>
+          </a:ln>
+        </p:spPr>
+        <p:style>
+          <a:lnRef idx="1">
+            <a:schemeClr val="accent1"/>
+          </a:lnRef>
+          <a:fillRef idx="0">
+            <a:schemeClr val="accent1"/>
+          </a:fillRef>
+          <a:effectRef idx="0">
+            <a:schemeClr val="accent1"/>
+          </a:effectRef>
+          <a:fontRef idx="minor">
+            <a:schemeClr val="tx1"/>
+          </a:fontRef>
+        </p:style>
+      </p:cxnSp>
+      <p:cxnSp>
+        <p:nvCxnSpPr>
+          <p:cNvPr id="90" name="Straight Arrow Connector 89">
+            <a:extLst>
+              <a:ext uri="{FF2B5EF4-FFF2-40B4-BE49-F238E27FC236}">
+                <a16:creationId xmlns:a16="http://schemas.microsoft.com/office/drawing/2014/main" id="{2EF754E2-CFA4-F743-8EE7-B782EA6EC148}"/>
+              </a:ext>
+            </a:extLst>
+          </p:cNvPr>
+          <p:cNvCxnSpPr>
+            <a:stCxn id="37" idx="2"/>
+          </p:cNvCxnSpPr>
+          <p:nvPr/>
+        </p:nvCxnSpPr>
+        <p:spPr>
+          <a:xfrm>
+            <a:off x="9991943" y="5110737"/>
+            <a:ext cx="222574" cy="608390"/>
+          </a:xfrm>
+          <a:prstGeom prst="straightConnector1">
+            <a:avLst/>
+          </a:prstGeom>
+          <a:ln w="19050">
+            <a:solidFill>
+              <a:schemeClr val="tx1"/>
+            </a:solidFill>
+            <a:tailEnd type="triangle"/>
+          </a:ln>
+        </p:spPr>
+        <p:style>
+          <a:lnRef idx="1">
+            <a:schemeClr val="accent1"/>
+          </a:lnRef>
+          <a:fillRef idx="0">
+            <a:schemeClr val="accent1"/>
+          </a:fillRef>
+          <a:effectRef idx="0">
+            <a:schemeClr val="accent1"/>
+          </a:effectRef>
+          <a:fontRef idx="minor">
+            <a:schemeClr val="tx1"/>
+          </a:fontRef>
+        </p:style>
+      </p:cxnSp>
+      <p:cxnSp>
+        <p:nvCxnSpPr>
+          <p:cNvPr id="92" name="Straight Arrow Connector 91">
+            <a:extLst>
+              <a:ext uri="{FF2B5EF4-FFF2-40B4-BE49-F238E27FC236}">
+                <a16:creationId xmlns:a16="http://schemas.microsoft.com/office/drawing/2014/main" id="{E9CB090B-751E-0544-89C4-FE243B03CA75}"/>
+              </a:ext>
+            </a:extLst>
+          </p:cNvPr>
+          <p:cNvCxnSpPr>
+            <a:cxnSpLocks/>
+            <a:stCxn id="37" idx="2"/>
+            <a:endCxn id="23" idx="0"/>
+          </p:cNvCxnSpPr>
+          <p:nvPr/>
+        </p:nvCxnSpPr>
+        <p:spPr>
+          <a:xfrm flipH="1">
+            <a:off x="7721794" y="5110737"/>
+            <a:ext cx="2270149" cy="621848"/>
+          </a:xfrm>
+          <a:prstGeom prst="straightConnector1">
+            <a:avLst/>
+          </a:prstGeom>
+          <a:ln w="19050">
+            <a:solidFill>
+              <a:schemeClr val="tx1"/>
+            </a:solidFill>
+            <a:tailEnd type="triangle"/>
+          </a:ln>
+        </p:spPr>
+        <p:style>
+          <a:lnRef idx="1">
+            <a:schemeClr val="accent1"/>
+          </a:lnRef>
+          <a:fillRef idx="0">
+            <a:schemeClr val="accent1"/>
+          </a:fillRef>
+          <a:effectRef idx="0">
+            <a:schemeClr val="accent1"/>
+          </a:effectRef>
+          <a:fontRef idx="minor">
+            <a:schemeClr val="tx1"/>
+          </a:fontRef>
+        </p:style>
+      </p:cxnSp>
+      <p:cxnSp>
+        <p:nvCxnSpPr>
+          <p:cNvPr id="95" name="Straight Arrow Connector 94">
+            <a:extLst>
+              <a:ext uri="{FF2B5EF4-FFF2-40B4-BE49-F238E27FC236}">
+                <a16:creationId xmlns:a16="http://schemas.microsoft.com/office/drawing/2014/main" id="{5840A8FF-C145-A842-8C1A-418F14A9E249}"/>
+              </a:ext>
+            </a:extLst>
+          </p:cNvPr>
+          <p:cNvCxnSpPr>
+            <a:cxnSpLocks/>
+            <a:stCxn id="8" idx="2"/>
+            <a:endCxn id="37" idx="0"/>
+          </p:cNvCxnSpPr>
+          <p:nvPr/>
+        </p:nvCxnSpPr>
+        <p:spPr>
+          <a:xfrm>
+            <a:off x="7579810" y="4017128"/>
+            <a:ext cx="2412133" cy="661609"/>
+          </a:xfrm>
+          <a:prstGeom prst="straightConnector1">
+            <a:avLst/>
+          </a:prstGeom>
+          <a:ln w="19050">
+            <a:solidFill>
+              <a:schemeClr val="tx1"/>
+            </a:solidFill>
+            <a:tailEnd type="triangle"/>
+          </a:ln>
+        </p:spPr>
+        <p:style>
+          <a:lnRef idx="1">
+            <a:schemeClr val="accent1"/>
+          </a:lnRef>
+          <a:fillRef idx="0">
+            <a:schemeClr val="accent1"/>
+          </a:fillRef>
+          <a:effectRef idx="0">
+            <a:schemeClr val="accent1"/>
+          </a:effectRef>
+          <a:fontRef idx="minor">
+            <a:schemeClr val="tx1"/>
+          </a:fontRef>
+        </p:style>
+      </p:cxnSp>
+    </p:spTree>
+    <p:extLst>
+      <p:ext uri="{BB962C8B-B14F-4D97-AF65-F5344CB8AC3E}">
+        <p14:creationId xmlns:p14="http://schemas.microsoft.com/office/powerpoint/2010/main" val="32899026"/>
+      </p:ext>
+    </p:extLst>
+  </p:cSld>
+  <p:clrMapOvr>
+    <a:masterClrMapping/>
+  </p:clrMapOvr>
+</p:sld>
+</file>
+
+<file path=ppt/slides/slide4.xml><?xml version="1.0" encoding="utf-8"?>
+<p:sld xmlns:a="http://schemas.openxmlformats.org/drawingml/2006/main" xmlns:r="http://schemas.openxmlformats.org/officeDocument/2006/relationships" xmlns:p="http://schemas.openxmlformats.org/presentationml/2006/main">
+  <p:cSld>
+    <p:spTree>
+      <p:nvGrpSpPr>
+        <p:cNvPr id="1" name=""/>
+        <p:cNvGrpSpPr/>
+        <p:nvPr/>
+      </p:nvGrpSpPr>
+      <p:grpSpPr>
+        <a:xfrm>
+          <a:off x="0" y="0"/>
+          <a:ext cx="0" cy="0"/>
+          <a:chOff x="0" y="0"/>
+          <a:chExt cx="0" cy="0"/>
+        </a:xfrm>
+      </p:grpSpPr>
+      <p:pic>
+        <p:nvPicPr>
+          <p:cNvPr id="5" name="Picture 4">
+            <a:extLst>
+              <a:ext uri="{FF2B5EF4-FFF2-40B4-BE49-F238E27FC236}">
+                <a16:creationId xmlns:a16="http://schemas.microsoft.com/office/drawing/2014/main" id="{74F67FED-0BFB-CB4E-913B-B8B586FA21C8}"/>
+              </a:ext>
+            </a:extLst>
+          </p:cNvPr>
+          <p:cNvPicPr>
+            <a:picLocks noChangeAspect="1"/>
+          </p:cNvPicPr>
+          <p:nvPr/>
+        </p:nvPicPr>
+        <p:blipFill>
+          <a:blip r:embed="rId2"/>
+          <a:stretch>
+            <a:fillRect/>
+          </a:stretch>
+        </p:blipFill>
+        <p:spPr>
+          <a:xfrm>
+            <a:off x="0" y="0"/>
+            <a:ext cx="5142857" cy="3600000"/>
+          </a:xfrm>
+          <a:prstGeom prst="rect">
+            <a:avLst/>
+          </a:prstGeom>
+        </p:spPr>
+      </p:pic>
+      <p:pic>
+        <p:nvPicPr>
+          <p:cNvPr id="7" name="Picture 6">
+            <a:extLst>
+              <a:ext uri="{FF2B5EF4-FFF2-40B4-BE49-F238E27FC236}">
+                <a16:creationId xmlns:a16="http://schemas.microsoft.com/office/drawing/2014/main" id="{792FC3BD-B8C6-EF4E-9710-55F9E857488B}"/>
+              </a:ext>
+            </a:extLst>
+          </p:cNvPr>
+          <p:cNvPicPr>
+            <a:picLocks noChangeAspect="1"/>
+          </p:cNvPicPr>
+          <p:nvPr/>
+        </p:nvPicPr>
+        <p:blipFill>
+          <a:blip r:embed="rId3"/>
+          <a:stretch>
+            <a:fillRect/>
+          </a:stretch>
+        </p:blipFill>
+        <p:spPr>
+          <a:xfrm>
+            <a:off x="7049143" y="0"/>
+            <a:ext cx="5142857" cy="3600000"/>
+          </a:xfrm>
+          <a:prstGeom prst="rect">
+            <a:avLst/>
+          </a:prstGeom>
+        </p:spPr>
+      </p:pic>
+      <p:pic>
+        <p:nvPicPr>
+          <p:cNvPr id="3" name="Picture 2">
+            <a:extLst>
+              <a:ext uri="{FF2B5EF4-FFF2-40B4-BE49-F238E27FC236}">
+                <a16:creationId xmlns:a16="http://schemas.microsoft.com/office/drawing/2014/main" id="{910E5C3F-73E8-9145-8127-BCED947F141C}"/>
+              </a:ext>
+            </a:extLst>
+          </p:cNvPr>
+          <p:cNvPicPr>
+            <a:picLocks noChangeAspect="1"/>
+          </p:cNvPicPr>
+          <p:nvPr/>
+        </p:nvPicPr>
+        <p:blipFill>
+          <a:blip r:embed="rId4"/>
+          <a:stretch>
+            <a:fillRect/>
+          </a:stretch>
+        </p:blipFill>
+        <p:spPr>
+          <a:xfrm>
+            <a:off x="4477714" y="3258000"/>
+            <a:ext cx="5142857" cy="3600000"/>
+          </a:xfrm>
+          <a:prstGeom prst="rect">
+            <a:avLst/>
+          </a:prstGeom>
+        </p:spPr>
+      </p:pic>
+    </p:spTree>
+    <p:extLst>
+      <p:ext uri="{BB962C8B-B14F-4D97-AF65-F5344CB8AC3E}">
+        <p14:creationId xmlns:p14="http://schemas.microsoft.com/office/powerpoint/2010/main" val="2364491408"/>
+      </p:ext>
+    </p:extLst>
+  </p:cSld>
+  <p:clrMapOvr>
+    <a:masterClrMapping/>
+  </p:clrMapOvr>
+</p:sld>
+</file>
+
+<file path=ppt/slides/slide5.xml><?xml version="1.0" encoding="utf-8"?>
+<p:sld xmlns:a="http://schemas.openxmlformats.org/drawingml/2006/main" xmlns:r="http://schemas.openxmlformats.org/officeDocument/2006/relationships" xmlns:p="http://schemas.openxmlformats.org/presentationml/2006/main">
+  <p:cSld>
+    <p:spTree>
+      <p:nvGrpSpPr>
+        <p:cNvPr id="1" name=""/>
+        <p:cNvGrpSpPr/>
+        <p:nvPr/>
+      </p:nvGrpSpPr>
+      <p:grpSpPr>
+        <a:xfrm>
+          <a:off x="0" y="0"/>
+          <a:ext cx="0" cy="0"/>
+          <a:chOff x="0" y="0"/>
+          <a:chExt cx="0" cy="0"/>
+        </a:xfrm>
+      </p:grpSpPr>
+      <p:pic>
+        <p:nvPicPr>
+          <p:cNvPr id="5" name="Picture 4">
+            <a:extLst>
+              <a:ext uri="{FF2B5EF4-FFF2-40B4-BE49-F238E27FC236}">
+                <a16:creationId xmlns:a16="http://schemas.microsoft.com/office/drawing/2014/main" id="{DAF6CD1B-C711-254F-A0D6-714C177E51D4}"/>
+              </a:ext>
+            </a:extLst>
+          </p:cNvPr>
+          <p:cNvPicPr>
+            <a:picLocks noChangeAspect="1"/>
+          </p:cNvPicPr>
+          <p:nvPr/>
+        </p:nvPicPr>
+        <p:blipFill>
+          <a:blip r:embed="rId2"/>
+          <a:stretch>
+            <a:fillRect/>
+          </a:stretch>
+        </p:blipFill>
+        <p:spPr>
+          <a:xfrm>
+            <a:off x="0" y="0"/>
+            <a:ext cx="5142857" cy="3600000"/>
+          </a:xfrm>
+          <a:prstGeom prst="rect">
+            <a:avLst/>
+          </a:prstGeom>
+        </p:spPr>
+      </p:pic>
+      <p:pic>
+        <p:nvPicPr>
+          <p:cNvPr id="7" name="Picture 6">
+            <a:extLst>
+              <a:ext uri="{FF2B5EF4-FFF2-40B4-BE49-F238E27FC236}">
+                <a16:creationId xmlns:a16="http://schemas.microsoft.com/office/drawing/2014/main" id="{0C6D7FF9-2595-3B46-9840-AA5FC42C448E}"/>
+              </a:ext>
+            </a:extLst>
+          </p:cNvPr>
+          <p:cNvPicPr>
+            <a:picLocks noChangeAspect="1"/>
+          </p:cNvPicPr>
+          <p:nvPr/>
+        </p:nvPicPr>
+        <p:blipFill>
+          <a:blip r:embed="rId3"/>
+          <a:stretch>
+            <a:fillRect/>
+          </a:stretch>
+        </p:blipFill>
+        <p:spPr>
+          <a:xfrm>
+            <a:off x="7049143" y="0"/>
+            <a:ext cx="5142857" cy="3600000"/>
+          </a:xfrm>
+          <a:prstGeom prst="rect">
+            <a:avLst/>
+          </a:prstGeom>
+        </p:spPr>
+      </p:pic>
+      <p:pic>
+        <p:nvPicPr>
+          <p:cNvPr id="3" name="Picture 2">
+            <a:extLst>
+              <a:ext uri="{FF2B5EF4-FFF2-40B4-BE49-F238E27FC236}">
+                <a16:creationId xmlns:a16="http://schemas.microsoft.com/office/drawing/2014/main" id="{A625FFD8-0A81-054D-A15B-41223CB7091F}"/>
+              </a:ext>
+            </a:extLst>
+          </p:cNvPr>
+          <p:cNvPicPr>
+            <a:picLocks noChangeAspect="1"/>
+          </p:cNvPicPr>
+          <p:nvPr/>
+        </p:nvPicPr>
+        <p:blipFill>
+          <a:blip r:embed="rId4"/>
+          <a:stretch>
+            <a:fillRect/>
+          </a:stretch>
+        </p:blipFill>
+        <p:spPr>
+          <a:xfrm>
+            <a:off x="3524571" y="3258000"/>
+            <a:ext cx="5142857" cy="3600000"/>
+          </a:xfrm>
+          <a:prstGeom prst="rect">
+            <a:avLst/>
+          </a:prstGeom>
+        </p:spPr>
+      </p:pic>
+    </p:spTree>
+    <p:extLst>
+      <p:ext uri="{BB962C8B-B14F-4D97-AF65-F5344CB8AC3E}">
+        <p14:creationId xmlns:p14="http://schemas.microsoft.com/office/powerpoint/2010/main" val="2553243230"/>
+      </p:ext>
+    </p:extLst>
+  </p:cSld>
+  <p:clrMapOvr>
+    <a:masterClrMapping/>
+  </p:clrMapOvr>
+</p:sld>
+</file>
+
+<file path=ppt/slides/slide6.xml><?xml version="1.0" encoding="utf-8"?>
+<p:sld xmlns:a="http://schemas.openxmlformats.org/drawingml/2006/main" xmlns:r="http://schemas.openxmlformats.org/officeDocument/2006/relationships" xmlns:p="http://schemas.openxmlformats.org/presentationml/2006/main">
+  <p:cSld>
+    <p:spTree>
+      <p:nvGrpSpPr>
+        <p:cNvPr id="1" name=""/>
+        <p:cNvGrpSpPr/>
+        <p:nvPr/>
+      </p:nvGrpSpPr>
+      <p:grpSpPr>
+        <a:xfrm>
+          <a:off x="0" y="0"/>
+          <a:ext cx="0" cy="0"/>
+          <a:chOff x="0" y="0"/>
+          <a:chExt cx="0" cy="0"/>
+        </a:xfrm>
+      </p:grpSpPr>
+      <p:sp>
+        <p:nvSpPr>
+          <p:cNvPr id="2" name="Rectangle 1">
+            <a:extLst>
+              <a:ext uri="{FF2B5EF4-FFF2-40B4-BE49-F238E27FC236}">
+                <a16:creationId xmlns:a16="http://schemas.microsoft.com/office/drawing/2014/main" id="{BB1D6925-4CD7-C545-B456-6B1095D358BE}"/>
+              </a:ext>
+            </a:extLst>
+          </p:cNvPr>
+          <p:cNvSpPr/>
+          <p:nvPr/>
+        </p:nvSpPr>
+        <p:spPr>
+          <a:xfrm>
+            <a:off x="293914" y="329977"/>
+            <a:ext cx="6096000" cy="646331"/>
+          </a:xfrm>
+          <a:prstGeom prst="rect">
+            <a:avLst/>
+          </a:prstGeom>
+        </p:spPr>
+        <p:txBody>
+          <a:bodyPr>
+            <a:spAutoFit/>
+          </a:bodyPr>
+          <a:lstStyle/>
+          <a:p>
+            <a:r>
+              <a:rPr lang="en-US" dirty="0">
+                <a:solidFill>
+                  <a:srgbClr val="000000"/>
+                </a:solidFill>
+                <a:latin typeface="Cambria" panose="02040503050406030204" pitchFamily="18" charset="0"/>
+              </a:rPr>
+              <a:t>if biased gene conversion is common, the SFS might differ depending on whether the ancestral allele was A,C,G or T.</a:t>
+            </a:r>
+            <a:endParaRPr lang="en-GB" dirty="0"/>
+          </a:p>
+        </p:txBody>
+      </p:sp>
+    </p:spTree>
+    <p:extLst>
+      <p:ext uri="{BB962C8B-B14F-4D97-AF65-F5344CB8AC3E}">
+        <p14:creationId xmlns:p14="http://schemas.microsoft.com/office/powerpoint/2010/main" val="3167113446"/>
+      </p:ext>
+    </p:extLst>
+  </p:cSld>
+  <p:clrMapOvr>
+    <a:masterClrMapping/>
+  </p:clrMapOvr>
+</p:sld>
+</file>
+
+<file path=ppt/slides/slide7.xml><?xml version="1.0" encoding="utf-8"?>
+<p:sld xmlns:a="http://schemas.openxmlformats.org/drawingml/2006/main" xmlns:r="http://schemas.openxmlformats.org/officeDocument/2006/relationships" xmlns:p="http://schemas.openxmlformats.org/presentationml/2006/main">
+  <p:cSld>
+    <p:spTree>
+      <p:nvGrpSpPr>
+        <p:cNvPr id="1" name=""/>
+        <p:cNvGrpSpPr/>
+        <p:nvPr/>
+      </p:nvGrpSpPr>
+      <p:grpSpPr>
+        <a:xfrm>
+          <a:off x="0" y="0"/>
+          <a:ext cx="0" cy="0"/>
+          <a:chOff x="0" y="0"/>
+          <a:chExt cx="0" cy="0"/>
+        </a:xfrm>
+      </p:grpSpPr>
       <p:graphicFrame>
         <p:nvGraphicFramePr>
           <p:cNvPr id="3" name="Table 2">
@@ -9664,76 +12765,6 @@
     <p:extLst>
       <p:ext uri="{BB962C8B-B14F-4D97-AF65-F5344CB8AC3E}">
         <p14:creationId xmlns:p14="http://schemas.microsoft.com/office/powerpoint/2010/main" val="2046394355"/>
-      </p:ext>
-    </p:extLst>
-  </p:cSld>
-  <p:clrMapOvr>
-    <a:masterClrMapping/>
-  </p:clrMapOvr>
-</p:sld>
-</file>
-
-<file path=ppt/slides/slide4.xml><?xml version="1.0" encoding="utf-8"?>
-<p:sld xmlns:a="http://schemas.openxmlformats.org/drawingml/2006/main" xmlns:r="http://schemas.openxmlformats.org/officeDocument/2006/relationships" xmlns:p="http://schemas.openxmlformats.org/presentationml/2006/main">
-  <p:cSld>
-    <p:spTree>
-      <p:nvGrpSpPr>
-        <p:cNvPr id="1" name=""/>
-        <p:cNvGrpSpPr/>
-        <p:nvPr/>
-      </p:nvGrpSpPr>
-      <p:grpSpPr>
-        <a:xfrm>
-          <a:off x="0" y="0"/>
-          <a:ext cx="0" cy="0"/>
-          <a:chOff x="0" y="0"/>
-          <a:chExt cx="0" cy="0"/>
-        </a:xfrm>
-      </p:grpSpPr>
-      <p:sp>
-        <p:nvSpPr>
-          <p:cNvPr id="2" name="Rectangle 1">
-            <a:extLst>
-              <a:ext uri="{FF2B5EF4-FFF2-40B4-BE49-F238E27FC236}">
-                <a16:creationId xmlns:a16="http://schemas.microsoft.com/office/drawing/2014/main" id="{BB1D6925-4CD7-C545-B456-6B1095D358BE}"/>
-              </a:ext>
-            </a:extLst>
-          </p:cNvPr>
-          <p:cNvSpPr/>
-          <p:nvPr/>
-        </p:nvSpPr>
-        <p:spPr>
-          <a:xfrm>
-            <a:off x="293914" y="329977"/>
-            <a:ext cx="6096000" cy="646331"/>
-          </a:xfrm>
-          <a:prstGeom prst="rect">
-            <a:avLst/>
-          </a:prstGeom>
-        </p:spPr>
-        <p:txBody>
-          <a:bodyPr>
-            <a:spAutoFit/>
-          </a:bodyPr>
-          <a:lstStyle/>
-          <a:p>
-            <a:r>
-              <a:rPr lang="en-US" dirty="0">
-                <a:solidFill>
-                  <a:srgbClr val="000000"/>
-                </a:solidFill>
-                <a:latin typeface="Cambria" panose="02040503050406030204" pitchFamily="18" charset="0"/>
-              </a:rPr>
-              <a:t>if biased gene conversion is common, the SFS might differ depending on whether the ancestral allele was A,C,G or T.</a:t>
-            </a:r>
-            <a:endParaRPr lang="en-GB" dirty="0"/>
-          </a:p>
-        </p:txBody>
-      </p:sp>
-    </p:spTree>
-    <p:extLst>
-      <p:ext uri="{BB962C8B-B14F-4D97-AF65-F5344CB8AC3E}">
-        <p14:creationId xmlns:p14="http://schemas.microsoft.com/office/powerpoint/2010/main" val="3167113446"/>
       </p:ext>
     </p:extLst>
   </p:cSld>

</xml_diff>

<commit_message>
minor fixes for meeting 20201013
</commit_message>
<xml_diff>
--- a/short_genetic_variants/docs/short_indels_v05.pptx
+++ b/short_genetic_variants/docs/short_indels_v05.pptx
@@ -5,28 +5,26 @@
     <p:sldMasterId id="2147483648" r:id="rId1"/>
   </p:sldMasterIdLst>
   <p:notesMasterIdLst>
-    <p:notesMasterId r:id="rId21"/>
+    <p:notesMasterId r:id="rId19"/>
   </p:notesMasterIdLst>
   <p:sldIdLst>
     <p:sldId id="256" r:id="rId2"/>
     <p:sldId id="257" r:id="rId3"/>
-    <p:sldId id="260" r:id="rId4"/>
-    <p:sldId id="263" r:id="rId5"/>
-    <p:sldId id="264" r:id="rId6"/>
-    <p:sldId id="267" r:id="rId7"/>
-    <p:sldId id="268" r:id="rId8"/>
-    <p:sldId id="266" r:id="rId9"/>
-    <p:sldId id="269" r:id="rId10"/>
-    <p:sldId id="270" r:id="rId11"/>
-    <p:sldId id="271" r:id="rId12"/>
-    <p:sldId id="273" r:id="rId13"/>
-    <p:sldId id="259" r:id="rId14"/>
-    <p:sldId id="274" r:id="rId15"/>
-    <p:sldId id="275" r:id="rId16"/>
-    <p:sldId id="276" r:id="rId17"/>
-    <p:sldId id="277" r:id="rId18"/>
-    <p:sldId id="278" r:id="rId19"/>
-    <p:sldId id="258" r:id="rId20"/>
+    <p:sldId id="279" r:id="rId4"/>
+    <p:sldId id="289" r:id="rId5"/>
+    <p:sldId id="280" r:id="rId6"/>
+    <p:sldId id="260" r:id="rId7"/>
+    <p:sldId id="281" r:id="rId8"/>
+    <p:sldId id="288" r:id="rId9"/>
+    <p:sldId id="284" r:id="rId10"/>
+    <p:sldId id="285" r:id="rId11"/>
+    <p:sldId id="286" r:id="rId12"/>
+    <p:sldId id="287" r:id="rId13"/>
+    <p:sldId id="282" r:id="rId14"/>
+    <p:sldId id="283" r:id="rId15"/>
+    <p:sldId id="263" r:id="rId16"/>
+    <p:sldId id="273" r:id="rId17"/>
+    <p:sldId id="258" r:id="rId18"/>
   </p:sldIdLst>
   <p:sldSz cx="12192000" cy="6858000"/>
   <p:notesSz cx="6858000" cy="9144000"/>
@@ -215,7 +213,7 @@
           <a:p>
             <a:fld id="{ADC703C6-BB32-1847-9BA4-6A93FF920BED}" type="datetimeFigureOut">
               <a:rPr lang="en-GB" smtClean="0"/>
-              <a:t>24/09/2020</a:t>
+              <a:t>13/10/2020</a:t>
             </a:fld>
             <a:endParaRPr lang="en-GB"/>
           </a:p>
@@ -632,7 +630,7 @@
           <a:p>
             <a:fld id="{5C316670-22DA-CE45-BF19-C0B19D676291}" type="datetimeFigureOut">
               <a:rPr lang="en-GB" smtClean="0"/>
-              <a:t>24/09/2020</a:t>
+              <a:t>13/10/2020</a:t>
             </a:fld>
             <a:endParaRPr lang="en-GB"/>
           </a:p>
@@ -832,7 +830,7 @@
           <a:p>
             <a:fld id="{5C316670-22DA-CE45-BF19-C0B19D676291}" type="datetimeFigureOut">
               <a:rPr lang="en-GB" smtClean="0"/>
-              <a:t>24/09/2020</a:t>
+              <a:t>13/10/2020</a:t>
             </a:fld>
             <a:endParaRPr lang="en-GB"/>
           </a:p>
@@ -1042,7 +1040,7 @@
           <a:p>
             <a:fld id="{5C316670-22DA-CE45-BF19-C0B19D676291}" type="datetimeFigureOut">
               <a:rPr lang="en-GB" smtClean="0"/>
-              <a:t>24/09/2020</a:t>
+              <a:t>13/10/2020</a:t>
             </a:fld>
             <a:endParaRPr lang="en-GB"/>
           </a:p>
@@ -1242,7 +1240,7 @@
           <a:p>
             <a:fld id="{5C316670-22DA-CE45-BF19-C0B19D676291}" type="datetimeFigureOut">
               <a:rPr lang="en-GB" smtClean="0"/>
-              <a:t>24/09/2020</a:t>
+              <a:t>13/10/2020</a:t>
             </a:fld>
             <a:endParaRPr lang="en-GB"/>
           </a:p>
@@ -1518,7 +1516,7 @@
           <a:p>
             <a:fld id="{5C316670-22DA-CE45-BF19-C0B19D676291}" type="datetimeFigureOut">
               <a:rPr lang="en-GB" smtClean="0"/>
-              <a:t>24/09/2020</a:t>
+              <a:t>13/10/2020</a:t>
             </a:fld>
             <a:endParaRPr lang="en-GB"/>
           </a:p>
@@ -1786,7 +1784,7 @@
           <a:p>
             <a:fld id="{5C316670-22DA-CE45-BF19-C0B19D676291}" type="datetimeFigureOut">
               <a:rPr lang="en-GB" smtClean="0"/>
-              <a:t>24/09/2020</a:t>
+              <a:t>13/10/2020</a:t>
             </a:fld>
             <a:endParaRPr lang="en-GB"/>
           </a:p>
@@ -2201,7 +2199,7 @@
           <a:p>
             <a:fld id="{5C316670-22DA-CE45-BF19-C0B19D676291}" type="datetimeFigureOut">
               <a:rPr lang="en-GB" smtClean="0"/>
-              <a:t>24/09/2020</a:t>
+              <a:t>13/10/2020</a:t>
             </a:fld>
             <a:endParaRPr lang="en-GB"/>
           </a:p>
@@ -2343,7 +2341,7 @@
           <a:p>
             <a:fld id="{5C316670-22DA-CE45-BF19-C0B19D676291}" type="datetimeFigureOut">
               <a:rPr lang="en-GB" smtClean="0"/>
-              <a:t>24/09/2020</a:t>
+              <a:t>13/10/2020</a:t>
             </a:fld>
             <a:endParaRPr lang="en-GB"/>
           </a:p>
@@ -2456,7 +2454,7 @@
           <a:p>
             <a:fld id="{5C316670-22DA-CE45-BF19-C0B19D676291}" type="datetimeFigureOut">
               <a:rPr lang="en-GB" smtClean="0"/>
-              <a:t>24/09/2020</a:t>
+              <a:t>13/10/2020</a:t>
             </a:fld>
             <a:endParaRPr lang="en-GB"/>
           </a:p>
@@ -2769,7 +2767,7 @@
           <a:p>
             <a:fld id="{5C316670-22DA-CE45-BF19-C0B19D676291}" type="datetimeFigureOut">
               <a:rPr lang="en-GB" smtClean="0"/>
-              <a:t>24/09/2020</a:t>
+              <a:t>13/10/2020</a:t>
             </a:fld>
             <a:endParaRPr lang="en-GB"/>
           </a:p>
@@ -3058,7 +3056,7 @@
           <a:p>
             <a:fld id="{5C316670-22DA-CE45-BF19-C0B19D676291}" type="datetimeFigureOut">
               <a:rPr lang="en-GB" smtClean="0"/>
-              <a:t>24/09/2020</a:t>
+              <a:t>13/10/2020</a:t>
             </a:fld>
             <a:endParaRPr lang="en-GB"/>
           </a:p>
@@ -3301,7 +3299,7 @@
           <a:p>
             <a:fld id="{5C316670-22DA-CE45-BF19-C0B19D676291}" type="datetimeFigureOut">
               <a:rPr lang="en-GB" smtClean="0"/>
-              <a:t>24/09/2020</a:t>
+              <a:t>13/10/2020</a:t>
             </a:fld>
             <a:endParaRPr lang="en-GB"/>
           </a:p>
@@ -3778,12 +3776,50 @@
           <a:chExt cx="0" cy="0"/>
         </a:xfrm>
       </p:grpSpPr>
+      <p:sp>
+        <p:nvSpPr>
+          <p:cNvPr id="4" name="Rectangle 3">
+            <a:extLst>
+              <a:ext uri="{FF2B5EF4-FFF2-40B4-BE49-F238E27FC236}">
+                <a16:creationId xmlns:a16="http://schemas.microsoft.com/office/drawing/2014/main" id="{DC1F7A85-BFDD-2B4E-95CF-48A4E6A38BB9}"/>
+              </a:ext>
+            </a:extLst>
+          </p:cNvPr>
+          <p:cNvSpPr/>
+          <p:nvPr/>
+        </p:nvSpPr>
+        <p:spPr>
+          <a:xfrm>
+            <a:off x="98961" y="275503"/>
+            <a:ext cx="6445354" cy="369332"/>
+          </a:xfrm>
+          <a:prstGeom prst="rect">
+            <a:avLst/>
+          </a:prstGeom>
+        </p:spPr>
+        <p:txBody>
+          <a:bodyPr wrap="none">
+            <a:spAutoFit/>
+          </a:bodyPr>
+          <a:lstStyle/>
+          <a:p>
+            <a:pPr marL="342900" indent="-342900">
+              <a:buFont typeface="+mj-lt"/>
+              <a:buAutoNum type="arabicPeriod" startAt="2"/>
+            </a:pPr>
+            <a:r>
+              <a:rPr lang="en-GB" dirty="0"/>
+              <a:t>Unfolded allele frequency spectra – GC-biased gene conversion</a:t>
+            </a:r>
+          </a:p>
+        </p:txBody>
+      </p:sp>
       <p:pic>
         <p:nvPicPr>
-          <p:cNvPr id="3" name="Picture 2">
-            <a:extLst>
-              <a:ext uri="{FF2B5EF4-FFF2-40B4-BE49-F238E27FC236}">
-                <a16:creationId xmlns:a16="http://schemas.microsoft.com/office/drawing/2014/main" id="{0CF88408-8C98-BC4C-AD52-0A39B59D64EA}"/>
+          <p:cNvPr id="9" name="Picture 8">
+            <a:extLst>
+              <a:ext uri="{FF2B5EF4-FFF2-40B4-BE49-F238E27FC236}">
+                <a16:creationId xmlns:a16="http://schemas.microsoft.com/office/drawing/2014/main" id="{69043ECE-7A64-CF4A-AA87-6C855DA468A4}"/>
               </a:ext>
             </a:extLst>
           </p:cNvPr>
@@ -3800,18 +3836,96 @@
         </p:blipFill>
         <p:spPr>
           <a:xfrm>
-            <a:off x="1524000" y="228600"/>
-            <a:ext cx="9144000" cy="6400800"/>
+            <a:off x="491688" y="756453"/>
+            <a:ext cx="8427384" cy="5826044"/>
           </a:xfrm>
           <a:prstGeom prst="rect">
             <a:avLst/>
           </a:prstGeom>
         </p:spPr>
       </p:pic>
+      <p:sp>
+        <p:nvSpPr>
+          <p:cNvPr id="2" name="TextBox 1">
+            <a:extLst>
+              <a:ext uri="{FF2B5EF4-FFF2-40B4-BE49-F238E27FC236}">
+                <a16:creationId xmlns:a16="http://schemas.microsoft.com/office/drawing/2014/main" id="{458150BD-4CC3-9447-B871-CB6D7606935B}"/>
+              </a:ext>
+            </a:extLst>
+          </p:cNvPr>
+          <p:cNvSpPr txBox="1"/>
+          <p:nvPr/>
+        </p:nvSpPr>
+        <p:spPr>
+          <a:xfrm>
+            <a:off x="9262753" y="1650670"/>
+            <a:ext cx="2437559" cy="1200329"/>
+          </a:xfrm>
+          <a:prstGeom prst="rect">
+            <a:avLst/>
+          </a:prstGeom>
+          <a:noFill/>
+        </p:spPr>
+        <p:txBody>
+          <a:bodyPr wrap="square" rtlCol="0">
+            <a:spAutoFit/>
+          </a:bodyPr>
+          <a:lstStyle/>
+          <a:p>
+            <a:r>
+              <a:rPr lang="en-GB" dirty="0"/>
+              <a:t>U-norm = normalised U statistic as in Katzman et al 2011 and Lachance and </a:t>
+            </a:r>
+            <a:r>
+              <a:rPr lang="en-GB" dirty="0" err="1"/>
+              <a:t>Tishkoff</a:t>
+            </a:r>
+            <a:r>
+              <a:rPr lang="en-GB" dirty="0"/>
+              <a:t> 2014</a:t>
+            </a:r>
+          </a:p>
+        </p:txBody>
+      </p:sp>
+      <p:sp>
+        <p:nvSpPr>
+          <p:cNvPr id="3" name="TextBox 2">
+            <a:extLst>
+              <a:ext uri="{FF2B5EF4-FFF2-40B4-BE49-F238E27FC236}">
+                <a16:creationId xmlns:a16="http://schemas.microsoft.com/office/drawing/2014/main" id="{550BD33E-58D7-0741-8504-BFFD6014C21A}"/>
+              </a:ext>
+            </a:extLst>
+          </p:cNvPr>
+          <p:cNvSpPr txBox="1"/>
+          <p:nvPr/>
+        </p:nvSpPr>
+        <p:spPr>
+          <a:xfrm>
+            <a:off x="9229288" y="756453"/>
+            <a:ext cx="2365812" cy="646331"/>
+          </a:xfrm>
+          <a:prstGeom prst="rect">
+            <a:avLst/>
+          </a:prstGeom>
+          <a:noFill/>
+        </p:spPr>
+        <p:txBody>
+          <a:bodyPr wrap="square" rtlCol="0">
+            <a:spAutoFit/>
+          </a:bodyPr>
+          <a:lstStyle/>
+          <a:p>
+            <a:r>
+              <a:rPr lang="en-GB" dirty="0"/>
+              <a:t>CZA WAVE LEFT just as an example</a:t>
+            </a:r>
+          </a:p>
+        </p:txBody>
+      </p:sp>
     </p:spTree>
     <p:extLst>
       <p:ext uri="{BB962C8B-B14F-4D97-AF65-F5344CB8AC3E}">
-        <p14:creationId xmlns:p14="http://schemas.microsoft.com/office/powerpoint/2010/main" val="1384299117"/>
+        <p14:creationId xmlns:p14="http://schemas.microsoft.com/office/powerpoint/2010/main" val="3270889417"/>
       </p:ext>
     </p:extLst>
   </p:cSld>
@@ -3838,12 +3952,50 @@
           <a:chExt cx="0" cy="0"/>
         </a:xfrm>
       </p:grpSpPr>
+      <p:sp>
+        <p:nvSpPr>
+          <p:cNvPr id="4" name="Rectangle 3">
+            <a:extLst>
+              <a:ext uri="{FF2B5EF4-FFF2-40B4-BE49-F238E27FC236}">
+                <a16:creationId xmlns:a16="http://schemas.microsoft.com/office/drawing/2014/main" id="{DC1F7A85-BFDD-2B4E-95CF-48A4E6A38BB9}"/>
+              </a:ext>
+            </a:extLst>
+          </p:cNvPr>
+          <p:cNvSpPr/>
+          <p:nvPr/>
+        </p:nvSpPr>
+        <p:spPr>
+          <a:xfrm>
+            <a:off x="98961" y="275503"/>
+            <a:ext cx="6445354" cy="369332"/>
+          </a:xfrm>
+          <a:prstGeom prst="rect">
+            <a:avLst/>
+          </a:prstGeom>
+        </p:spPr>
+        <p:txBody>
+          <a:bodyPr wrap="none">
+            <a:spAutoFit/>
+          </a:bodyPr>
+          <a:lstStyle/>
+          <a:p>
+            <a:pPr marL="342900" indent="-342900">
+              <a:buFont typeface="+mj-lt"/>
+              <a:buAutoNum type="arabicPeriod" startAt="2"/>
+            </a:pPr>
+            <a:r>
+              <a:rPr lang="en-GB" dirty="0"/>
+              <a:t>Unfolded allele frequency spectra – GC-biased gene conversion</a:t>
+            </a:r>
+          </a:p>
+        </p:txBody>
+      </p:sp>
       <p:pic>
         <p:nvPicPr>
-          <p:cNvPr id="3" name="Picture 2">
-            <a:extLst>
-              <a:ext uri="{FF2B5EF4-FFF2-40B4-BE49-F238E27FC236}">
-                <a16:creationId xmlns:a16="http://schemas.microsoft.com/office/drawing/2014/main" id="{9EFC94F0-A59F-1B44-B3EE-BA486D9C867C}"/>
+          <p:cNvPr id="6" name="Picture 5">
+            <a:extLst>
+              <a:ext uri="{FF2B5EF4-FFF2-40B4-BE49-F238E27FC236}">
+                <a16:creationId xmlns:a16="http://schemas.microsoft.com/office/drawing/2014/main" id="{3000D2E1-1630-054B-A24B-A58D03B0B038}"/>
               </a:ext>
             </a:extLst>
           </p:cNvPr>
@@ -3860,18 +4012,88 @@
         </p:blipFill>
         <p:spPr>
           <a:xfrm>
-            <a:off x="1524000" y="228600"/>
-            <a:ext cx="9144000" cy="6400800"/>
+            <a:off x="2438400" y="947057"/>
+            <a:ext cx="7315200" cy="5486400"/>
           </a:xfrm>
           <a:prstGeom prst="rect">
             <a:avLst/>
           </a:prstGeom>
         </p:spPr>
       </p:pic>
+      <p:sp>
+        <p:nvSpPr>
+          <p:cNvPr id="8" name="TextBox 7">
+            <a:extLst>
+              <a:ext uri="{FF2B5EF4-FFF2-40B4-BE49-F238E27FC236}">
+                <a16:creationId xmlns:a16="http://schemas.microsoft.com/office/drawing/2014/main" id="{549006E0-3445-244F-AF3A-C7CE30FAA9EE}"/>
+              </a:ext>
+            </a:extLst>
+          </p:cNvPr>
+          <p:cNvSpPr txBox="1"/>
+          <p:nvPr/>
+        </p:nvSpPr>
+        <p:spPr>
+          <a:xfrm>
+            <a:off x="10036252" y="947057"/>
+            <a:ext cx="1283108" cy="369332"/>
+          </a:xfrm>
+          <a:prstGeom prst="rect">
+            <a:avLst/>
+          </a:prstGeom>
+          <a:noFill/>
+        </p:spPr>
+        <p:txBody>
+          <a:bodyPr wrap="none" rtlCol="0">
+            <a:spAutoFit/>
+          </a:bodyPr>
+          <a:lstStyle/>
+          <a:p>
+            <a:r>
+              <a:rPr lang="en-GB" dirty="0"/>
+              <a:t>D: WS &gt; SW</a:t>
+            </a:r>
+          </a:p>
+        </p:txBody>
+      </p:sp>
+      <p:sp>
+        <p:nvSpPr>
+          <p:cNvPr id="10" name="TextBox 9">
+            <a:extLst>
+              <a:ext uri="{FF2B5EF4-FFF2-40B4-BE49-F238E27FC236}">
+                <a16:creationId xmlns:a16="http://schemas.microsoft.com/office/drawing/2014/main" id="{506C40C7-83A5-3444-B560-7340BCAACFA6}"/>
+              </a:ext>
+            </a:extLst>
+          </p:cNvPr>
+          <p:cNvSpPr txBox="1"/>
+          <p:nvPr/>
+        </p:nvSpPr>
+        <p:spPr>
+          <a:xfrm>
+            <a:off x="10034649" y="1576449"/>
+            <a:ext cx="1284711" cy="369332"/>
+          </a:xfrm>
+          <a:prstGeom prst="rect">
+            <a:avLst/>
+          </a:prstGeom>
+          <a:noFill/>
+        </p:spPr>
+        <p:txBody>
+          <a:bodyPr wrap="none" rtlCol="0">
+            <a:spAutoFit/>
+          </a:bodyPr>
+          <a:lstStyle/>
+          <a:p>
+            <a:r>
+              <a:rPr lang="en-GB" dirty="0"/>
+              <a:t>H: WS &lt; SW</a:t>
+            </a:r>
+          </a:p>
+        </p:txBody>
+      </p:sp>
     </p:spTree>
     <p:extLst>
       <p:ext uri="{BB962C8B-B14F-4D97-AF65-F5344CB8AC3E}">
-        <p14:creationId xmlns:p14="http://schemas.microsoft.com/office/powerpoint/2010/main" val="1995899823"/>
+        <p14:creationId xmlns:p14="http://schemas.microsoft.com/office/powerpoint/2010/main" val="208821612"/>
       </p:ext>
     </p:extLst>
   </p:cSld>
@@ -3898,6 +4120,619 @@
           <a:chExt cx="0" cy="0"/>
         </a:xfrm>
       </p:grpSpPr>
+      <p:sp>
+        <p:nvSpPr>
+          <p:cNvPr id="4" name="Rectangle 3">
+            <a:extLst>
+              <a:ext uri="{FF2B5EF4-FFF2-40B4-BE49-F238E27FC236}">
+                <a16:creationId xmlns:a16="http://schemas.microsoft.com/office/drawing/2014/main" id="{DC1F7A85-BFDD-2B4E-95CF-48A4E6A38BB9}"/>
+              </a:ext>
+            </a:extLst>
+          </p:cNvPr>
+          <p:cNvSpPr/>
+          <p:nvPr/>
+        </p:nvSpPr>
+        <p:spPr>
+          <a:xfrm>
+            <a:off x="98961" y="275503"/>
+            <a:ext cx="6445354" cy="369332"/>
+          </a:xfrm>
+          <a:prstGeom prst="rect">
+            <a:avLst/>
+          </a:prstGeom>
+        </p:spPr>
+        <p:txBody>
+          <a:bodyPr wrap="none">
+            <a:spAutoFit/>
+          </a:bodyPr>
+          <a:lstStyle/>
+          <a:p>
+            <a:pPr marL="342900" indent="-342900">
+              <a:buFont typeface="+mj-lt"/>
+              <a:buAutoNum type="arabicPeriod" startAt="2"/>
+            </a:pPr>
+            <a:r>
+              <a:rPr lang="en-GB" dirty="0"/>
+              <a:t>Unfolded allele frequency spectra – GC-biased gene conversion</a:t>
+            </a:r>
+          </a:p>
+        </p:txBody>
+      </p:sp>
+      <p:pic>
+        <p:nvPicPr>
+          <p:cNvPr id="3" name="Picture 2">
+            <a:extLst>
+              <a:ext uri="{FF2B5EF4-FFF2-40B4-BE49-F238E27FC236}">
+                <a16:creationId xmlns:a16="http://schemas.microsoft.com/office/drawing/2014/main" id="{542ECCC4-9991-5A4B-BE8F-4DF3FDE9AD6F}"/>
+              </a:ext>
+            </a:extLst>
+          </p:cNvPr>
+          <p:cNvPicPr>
+            <a:picLocks noChangeAspect="1"/>
+          </p:cNvPicPr>
+          <p:nvPr/>
+        </p:nvPicPr>
+        <p:blipFill>
+          <a:blip r:embed="rId2"/>
+          <a:stretch>
+            <a:fillRect/>
+          </a:stretch>
+        </p:blipFill>
+        <p:spPr>
+          <a:xfrm>
+            <a:off x="2438400" y="965469"/>
+            <a:ext cx="7315200" cy="5486400"/>
+          </a:xfrm>
+          <a:prstGeom prst="rect">
+            <a:avLst/>
+          </a:prstGeom>
+        </p:spPr>
+      </p:pic>
+      <p:sp>
+        <p:nvSpPr>
+          <p:cNvPr id="12" name="TextBox 11">
+            <a:extLst>
+              <a:ext uri="{FF2B5EF4-FFF2-40B4-BE49-F238E27FC236}">
+                <a16:creationId xmlns:a16="http://schemas.microsoft.com/office/drawing/2014/main" id="{4CF0A7E2-7219-064D-81A9-D0E5544DF609}"/>
+              </a:ext>
+            </a:extLst>
+          </p:cNvPr>
+          <p:cNvSpPr txBox="1"/>
+          <p:nvPr/>
+        </p:nvSpPr>
+        <p:spPr>
+          <a:xfrm>
+            <a:off x="10036252" y="947057"/>
+            <a:ext cx="2010872" cy="369332"/>
+          </a:xfrm>
+          <a:prstGeom prst="rect">
+            <a:avLst/>
+          </a:prstGeom>
+          <a:noFill/>
+        </p:spPr>
+        <p:txBody>
+          <a:bodyPr wrap="none" rtlCol="0">
+            <a:spAutoFit/>
+          </a:bodyPr>
+          <a:lstStyle/>
+          <a:p>
+            <a:r>
+              <a:rPr lang="en-GB" dirty="0"/>
+              <a:t>D: WS &gt; SW WW SS</a:t>
+            </a:r>
+          </a:p>
+        </p:txBody>
+      </p:sp>
+      <p:sp>
+        <p:nvSpPr>
+          <p:cNvPr id="13" name="TextBox 12">
+            <a:extLst>
+              <a:ext uri="{FF2B5EF4-FFF2-40B4-BE49-F238E27FC236}">
+                <a16:creationId xmlns:a16="http://schemas.microsoft.com/office/drawing/2014/main" id="{12AF3A3E-32D4-1847-99EE-89D1662D5A7D}"/>
+              </a:ext>
+            </a:extLst>
+          </p:cNvPr>
+          <p:cNvSpPr txBox="1"/>
+          <p:nvPr/>
+        </p:nvSpPr>
+        <p:spPr>
+          <a:xfrm>
+            <a:off x="10034649" y="1576449"/>
+            <a:ext cx="2012474" cy="369332"/>
+          </a:xfrm>
+          <a:prstGeom prst="rect">
+            <a:avLst/>
+          </a:prstGeom>
+          <a:noFill/>
+        </p:spPr>
+        <p:txBody>
+          <a:bodyPr wrap="none" rtlCol="0">
+            <a:spAutoFit/>
+          </a:bodyPr>
+          <a:lstStyle/>
+          <a:p>
+            <a:r>
+              <a:rPr lang="en-GB" dirty="0"/>
+              <a:t>H: WS &lt; SW WW SS</a:t>
+            </a:r>
+          </a:p>
+        </p:txBody>
+      </p:sp>
+    </p:spTree>
+    <p:extLst>
+      <p:ext uri="{BB962C8B-B14F-4D97-AF65-F5344CB8AC3E}">
+        <p14:creationId xmlns:p14="http://schemas.microsoft.com/office/powerpoint/2010/main" val="1622903340"/>
+      </p:ext>
+    </p:extLst>
+  </p:cSld>
+  <p:clrMapOvr>
+    <a:masterClrMapping/>
+  </p:clrMapOvr>
+</p:sld>
+</file>
+
+<file path=ppt/slides/slide13.xml><?xml version="1.0" encoding="utf-8"?>
+<p:sld xmlns:a="http://schemas.openxmlformats.org/drawingml/2006/main" xmlns:r="http://schemas.openxmlformats.org/officeDocument/2006/relationships" xmlns:p="http://schemas.openxmlformats.org/presentationml/2006/main">
+  <p:cSld>
+    <p:spTree>
+      <p:nvGrpSpPr>
+        <p:cNvPr id="1" name=""/>
+        <p:cNvGrpSpPr/>
+        <p:nvPr/>
+      </p:nvGrpSpPr>
+      <p:grpSpPr>
+        <a:xfrm>
+          <a:off x="0" y="0"/>
+          <a:ext cx="0" cy="0"/>
+          <a:chOff x="0" y="0"/>
+          <a:chExt cx="0" cy="0"/>
+        </a:xfrm>
+      </p:grpSpPr>
+      <p:sp>
+        <p:nvSpPr>
+          <p:cNvPr id="2" name="Rectangle 1">
+            <a:extLst>
+              <a:ext uri="{FF2B5EF4-FFF2-40B4-BE49-F238E27FC236}">
+                <a16:creationId xmlns:a16="http://schemas.microsoft.com/office/drawing/2014/main" id="{EFF69540-C873-6F4F-A991-FF56BB0616DD}"/>
+              </a:ext>
+            </a:extLst>
+          </p:cNvPr>
+          <p:cNvSpPr/>
+          <p:nvPr/>
+        </p:nvSpPr>
+        <p:spPr>
+          <a:xfrm>
+            <a:off x="98961" y="275503"/>
+            <a:ext cx="1922321" cy="369332"/>
+          </a:xfrm>
+          <a:prstGeom prst="rect">
+            <a:avLst/>
+          </a:prstGeom>
+        </p:spPr>
+        <p:txBody>
+          <a:bodyPr wrap="none">
+            <a:spAutoFit/>
+          </a:bodyPr>
+          <a:lstStyle/>
+          <a:p>
+            <a:pPr marL="342900" indent="-342900">
+              <a:buFont typeface="+mj-lt"/>
+              <a:buAutoNum type="arabicPeriod" startAt="3"/>
+            </a:pPr>
+            <a:r>
+              <a:rPr lang="en-GB" dirty="0"/>
+              <a:t>Outlier sharing</a:t>
+            </a:r>
+          </a:p>
+        </p:txBody>
+      </p:sp>
+      <p:pic>
+        <p:nvPicPr>
+          <p:cNvPr id="4" name="Picture 3">
+            <a:extLst>
+              <a:ext uri="{FF2B5EF4-FFF2-40B4-BE49-F238E27FC236}">
+                <a16:creationId xmlns:a16="http://schemas.microsoft.com/office/drawing/2014/main" id="{E964C428-453D-D44B-84BC-13CD9EDF513D}"/>
+              </a:ext>
+            </a:extLst>
+          </p:cNvPr>
+          <p:cNvPicPr>
+            <a:picLocks noChangeAspect="1"/>
+          </p:cNvPicPr>
+          <p:nvPr/>
+        </p:nvPicPr>
+        <p:blipFill>
+          <a:blip r:embed="rId2"/>
+          <a:stretch>
+            <a:fillRect/>
+          </a:stretch>
+        </p:blipFill>
+        <p:spPr>
+          <a:xfrm>
+            <a:off x="2271000" y="644835"/>
+            <a:ext cx="7650000" cy="6120000"/>
+          </a:xfrm>
+          <a:prstGeom prst="rect">
+            <a:avLst/>
+          </a:prstGeom>
+        </p:spPr>
+      </p:pic>
+    </p:spTree>
+    <p:extLst>
+      <p:ext uri="{BB962C8B-B14F-4D97-AF65-F5344CB8AC3E}">
+        <p14:creationId xmlns:p14="http://schemas.microsoft.com/office/powerpoint/2010/main" val="42571011"/>
+      </p:ext>
+    </p:extLst>
+  </p:cSld>
+  <p:clrMapOvr>
+    <a:masterClrMapping/>
+  </p:clrMapOvr>
+</p:sld>
+</file>
+
+<file path=ppt/slides/slide14.xml><?xml version="1.0" encoding="utf-8"?>
+<p:sld xmlns:a="http://schemas.openxmlformats.org/drawingml/2006/main" xmlns:r="http://schemas.openxmlformats.org/officeDocument/2006/relationships" xmlns:p="http://schemas.openxmlformats.org/presentationml/2006/main">
+  <p:cSld>
+    <p:spTree>
+      <p:nvGrpSpPr>
+        <p:cNvPr id="1" name=""/>
+        <p:cNvGrpSpPr/>
+        <p:nvPr/>
+      </p:nvGrpSpPr>
+      <p:grpSpPr>
+        <a:xfrm>
+          <a:off x="0" y="0"/>
+          <a:ext cx="0" cy="0"/>
+          <a:chOff x="0" y="0"/>
+          <a:chExt cx="0" cy="0"/>
+        </a:xfrm>
+      </p:grpSpPr>
+      <p:sp>
+        <p:nvSpPr>
+          <p:cNvPr id="2" name="Rectangle 1">
+            <a:extLst>
+              <a:ext uri="{FF2B5EF4-FFF2-40B4-BE49-F238E27FC236}">
+                <a16:creationId xmlns:a16="http://schemas.microsoft.com/office/drawing/2014/main" id="{DC46A8EA-F3D6-4046-98E6-049E88BC4E63}"/>
+              </a:ext>
+            </a:extLst>
+          </p:cNvPr>
+          <p:cNvSpPr/>
+          <p:nvPr/>
+        </p:nvSpPr>
+        <p:spPr>
+          <a:xfrm>
+            <a:off x="98961" y="275503"/>
+            <a:ext cx="3505511" cy="369332"/>
+          </a:xfrm>
+          <a:prstGeom prst="rect">
+            <a:avLst/>
+          </a:prstGeom>
+        </p:spPr>
+        <p:txBody>
+          <a:bodyPr wrap="none">
+            <a:spAutoFit/>
+          </a:bodyPr>
+          <a:lstStyle/>
+          <a:p>
+            <a:pPr marL="342900" indent="-342900">
+              <a:buFont typeface="+mj-lt"/>
+              <a:buAutoNum type="arabicPeriod" startAt="4"/>
+            </a:pPr>
+            <a:r>
+              <a:rPr lang="en-GB" dirty="0"/>
+              <a:t>Distribution of cline parameters</a:t>
+            </a:r>
+          </a:p>
+        </p:txBody>
+      </p:sp>
+      <p:pic>
+        <p:nvPicPr>
+          <p:cNvPr id="3" name="Picture 2">
+            <a:extLst>
+              <a:ext uri="{FF2B5EF4-FFF2-40B4-BE49-F238E27FC236}">
+                <a16:creationId xmlns:a16="http://schemas.microsoft.com/office/drawing/2014/main" id="{7BD92EC2-F5C0-1140-B54A-AF340A609981}"/>
+              </a:ext>
+            </a:extLst>
+          </p:cNvPr>
+          <p:cNvPicPr>
+            <a:picLocks noChangeAspect="1"/>
+          </p:cNvPicPr>
+          <p:nvPr/>
+        </p:nvPicPr>
+        <p:blipFill>
+          <a:blip r:embed="rId2"/>
+          <a:stretch>
+            <a:fillRect/>
+          </a:stretch>
+        </p:blipFill>
+        <p:spPr>
+          <a:xfrm>
+            <a:off x="2238857" y="1079792"/>
+            <a:ext cx="7714286" cy="5400000"/>
+          </a:xfrm>
+          <a:prstGeom prst="rect">
+            <a:avLst/>
+          </a:prstGeom>
+        </p:spPr>
+      </p:pic>
+    </p:spTree>
+    <p:extLst>
+      <p:ext uri="{BB962C8B-B14F-4D97-AF65-F5344CB8AC3E}">
+        <p14:creationId xmlns:p14="http://schemas.microsoft.com/office/powerpoint/2010/main" val="73255765"/>
+      </p:ext>
+    </p:extLst>
+  </p:cSld>
+  <p:clrMapOvr>
+    <a:masterClrMapping/>
+  </p:clrMapOvr>
+</p:sld>
+</file>
+
+<file path=ppt/slides/slide15.xml><?xml version="1.0" encoding="utf-8"?>
+<p:sld xmlns:a="http://schemas.openxmlformats.org/drawingml/2006/main" xmlns:r="http://schemas.openxmlformats.org/officeDocument/2006/relationships" xmlns:p="http://schemas.openxmlformats.org/presentationml/2006/main">
+  <p:cSld>
+    <p:spTree>
+      <p:nvGrpSpPr>
+        <p:cNvPr id="1" name=""/>
+        <p:cNvGrpSpPr/>
+        <p:nvPr/>
+      </p:nvGrpSpPr>
+      <p:grpSpPr>
+        <a:xfrm>
+          <a:off x="0" y="0"/>
+          <a:ext cx="0" cy="0"/>
+          <a:chOff x="0" y="0"/>
+          <a:chExt cx="0" cy="0"/>
+        </a:xfrm>
+      </p:grpSpPr>
+      <p:sp>
+        <p:nvSpPr>
+          <p:cNvPr id="2" name="Rectangle 1">
+            <a:extLst>
+              <a:ext uri="{FF2B5EF4-FFF2-40B4-BE49-F238E27FC236}">
+                <a16:creationId xmlns:a16="http://schemas.microsoft.com/office/drawing/2014/main" id="{9C8CC98B-E053-2749-8A2B-8B289C42020E}"/>
+              </a:ext>
+            </a:extLst>
+          </p:cNvPr>
+          <p:cNvSpPr/>
+          <p:nvPr/>
+        </p:nvSpPr>
+        <p:spPr>
+          <a:xfrm>
+            <a:off x="407670" y="925473"/>
+            <a:ext cx="8622030" cy="3539430"/>
+          </a:xfrm>
+          <a:prstGeom prst="rect">
+            <a:avLst/>
+          </a:prstGeom>
+        </p:spPr>
+        <p:txBody>
+          <a:bodyPr wrap="square">
+            <a:spAutoFit/>
+          </a:bodyPr>
+          <a:lstStyle/>
+          <a:p>
+            <a:r>
+              <a:rPr lang="en-US" sz="1600" dirty="0">
+                <a:solidFill>
+                  <a:srgbClr val="000000"/>
+                </a:solidFill>
+                <a:latin typeface="Cambria" panose="02040503050406030204" pitchFamily="18" charset="0"/>
+              </a:rPr>
+              <a:t>1. between different categories of INDELs (e.g., coding INDELs vs non-coding INDELs) and SNPs (e.g., synonymous SNPs vs non-synonymous SNPs).</a:t>
+            </a:r>
+          </a:p>
+          <a:p>
+            <a:br>
+              <a:rPr lang="en-US" sz="1600" dirty="0">
+                <a:solidFill>
+                  <a:srgbClr val="000000"/>
+                </a:solidFill>
+                <a:latin typeface="Cambria" panose="02040503050406030204" pitchFamily="18" charset="0"/>
+              </a:rPr>
+            </a:br>
+            <a:endParaRPr lang="en-US" sz="1600" dirty="0">
+              <a:solidFill>
+                <a:srgbClr val="000000"/>
+              </a:solidFill>
+              <a:latin typeface="Cambria" panose="02040503050406030204" pitchFamily="18" charset="0"/>
+            </a:endParaRPr>
+          </a:p>
+          <a:p>
+            <a:r>
+              <a:rPr lang="en-US" sz="1600" dirty="0">
+                <a:solidFill>
+                  <a:srgbClr val="000000"/>
+                </a:solidFill>
+                <a:latin typeface="Cambria" panose="02040503050406030204" pitchFamily="18" charset="0"/>
+              </a:rPr>
+              <a:t>2. between INDELs and SNPs of the same category of annotation (e.g., coding INDELs vs coding SNPs).</a:t>
+            </a:r>
+          </a:p>
+          <a:p>
+            <a:br>
+              <a:rPr lang="en-US" sz="1600" dirty="0">
+                <a:solidFill>
+                  <a:srgbClr val="000000"/>
+                </a:solidFill>
+                <a:latin typeface="Cambria" panose="02040503050406030204" pitchFamily="18" charset="0"/>
+              </a:rPr>
+            </a:br>
+            <a:endParaRPr lang="en-US" sz="1600" dirty="0">
+              <a:solidFill>
+                <a:srgbClr val="000000"/>
+              </a:solidFill>
+              <a:latin typeface="Cambria" panose="02040503050406030204" pitchFamily="18" charset="0"/>
+            </a:endParaRPr>
+          </a:p>
+          <a:p>
+            <a:r>
+              <a:rPr lang="en-US" sz="1600" dirty="0">
+                <a:solidFill>
+                  <a:srgbClr val="000000"/>
+                </a:solidFill>
+                <a:latin typeface="Cambria" panose="02040503050406030204" pitchFamily="18" charset="0"/>
+              </a:rPr>
+              <a:t>3. between different categories of deletions and insertions (e.g., coding deletions vs non-coding deletions, frameshift insertions vs inframe insertions).</a:t>
+            </a:r>
+          </a:p>
+          <a:p>
+            <a:br>
+              <a:rPr lang="en-US" sz="1600" dirty="0">
+                <a:solidFill>
+                  <a:srgbClr val="000000"/>
+                </a:solidFill>
+                <a:latin typeface="Cambria" panose="02040503050406030204" pitchFamily="18" charset="0"/>
+              </a:rPr>
+            </a:br>
+            <a:endParaRPr lang="en-US" sz="1600" dirty="0">
+              <a:solidFill>
+                <a:srgbClr val="000000"/>
+              </a:solidFill>
+              <a:latin typeface="Cambria" panose="02040503050406030204" pitchFamily="18" charset="0"/>
+            </a:endParaRPr>
+          </a:p>
+          <a:p>
+            <a:r>
+              <a:rPr lang="en-US" sz="1600" dirty="0">
+                <a:solidFill>
+                  <a:srgbClr val="000000"/>
+                </a:solidFill>
+                <a:latin typeface="Cambria" panose="02040503050406030204" pitchFamily="18" charset="0"/>
+              </a:rPr>
+              <a:t>4. between deletions and insertions of the same category of annotation (e.g., non-coding deletions vs non-coding insertions).</a:t>
+            </a:r>
+            <a:endParaRPr lang="en-US" sz="1600" b="0" i="0" u="none" strike="noStrike" dirty="0">
+              <a:solidFill>
+                <a:srgbClr val="000000"/>
+              </a:solidFill>
+              <a:effectLst/>
+              <a:latin typeface="Cambria" panose="02040503050406030204" pitchFamily="18" charset="0"/>
+            </a:endParaRPr>
+          </a:p>
+        </p:txBody>
+      </p:sp>
+      <p:sp>
+        <p:nvSpPr>
+          <p:cNvPr id="4" name="TextBox 3">
+            <a:extLst>
+              <a:ext uri="{FF2B5EF4-FFF2-40B4-BE49-F238E27FC236}">
+                <a16:creationId xmlns:a16="http://schemas.microsoft.com/office/drawing/2014/main" id="{63C4FCB4-DEF2-714B-87DE-62695168382E}"/>
+              </a:ext>
+            </a:extLst>
+          </p:cNvPr>
+          <p:cNvSpPr txBox="1"/>
+          <p:nvPr/>
+        </p:nvSpPr>
+        <p:spPr>
+          <a:xfrm>
+            <a:off x="407670" y="308610"/>
+            <a:ext cx="3473002" cy="369332"/>
+          </a:xfrm>
+          <a:prstGeom prst="rect">
+            <a:avLst/>
+          </a:prstGeom>
+        </p:spPr>
+        <p:txBody>
+          <a:bodyPr>
+            <a:spAutoFit/>
+          </a:bodyPr>
+          <a:lstStyle>
+            <a:defPPr>
+              <a:defRPr lang="en-US"/>
+            </a:defPPr>
+            <a:lvl1pPr>
+              <a:defRPr>
+                <a:solidFill>
+                  <a:srgbClr val="000000"/>
+                </a:solidFill>
+                <a:latin typeface="Cambria" panose="02040503050406030204" pitchFamily="18" charset="0"/>
+              </a:defRPr>
+            </a:lvl1pPr>
+          </a:lstStyle>
+          <a:p>
+            <a:r>
+              <a:rPr lang="en-GB" dirty="0"/>
+              <a:t>For each island and each ecotype:</a:t>
+            </a:r>
+          </a:p>
+        </p:txBody>
+      </p:sp>
+      <p:sp>
+        <p:nvSpPr>
+          <p:cNvPr id="5" name="TextBox 4">
+            <a:extLst>
+              <a:ext uri="{FF2B5EF4-FFF2-40B4-BE49-F238E27FC236}">
+                <a16:creationId xmlns:a16="http://schemas.microsoft.com/office/drawing/2014/main" id="{F8EC594D-06B1-0749-B854-DA1020A65F07}"/>
+              </a:ext>
+            </a:extLst>
+          </p:cNvPr>
+          <p:cNvSpPr txBox="1"/>
+          <p:nvPr/>
+        </p:nvSpPr>
+        <p:spPr>
+          <a:xfrm>
+            <a:off x="407670" y="5563195"/>
+            <a:ext cx="3473002" cy="369332"/>
+          </a:xfrm>
+          <a:prstGeom prst="rect">
+            <a:avLst/>
+          </a:prstGeom>
+        </p:spPr>
+        <p:txBody>
+          <a:bodyPr>
+            <a:spAutoFit/>
+          </a:bodyPr>
+          <a:lstStyle>
+            <a:defPPr>
+              <a:defRPr lang="en-US"/>
+            </a:defPPr>
+            <a:lvl1pPr>
+              <a:defRPr>
+                <a:solidFill>
+                  <a:srgbClr val="000000"/>
+                </a:solidFill>
+                <a:latin typeface="Cambria" panose="02040503050406030204" pitchFamily="18" charset="0"/>
+              </a:defRPr>
+            </a:lvl1pPr>
+          </a:lstStyle>
+          <a:p>
+            <a:r>
+              <a:rPr lang="en-GB" dirty="0"/>
+              <a:t>And then also between ecotypes.</a:t>
+            </a:r>
+          </a:p>
+        </p:txBody>
+      </p:sp>
+    </p:spTree>
+    <p:extLst>
+      <p:ext uri="{BB962C8B-B14F-4D97-AF65-F5344CB8AC3E}">
+        <p14:creationId xmlns:p14="http://schemas.microsoft.com/office/powerpoint/2010/main" val="79112516"/>
+      </p:ext>
+    </p:extLst>
+  </p:cSld>
+  <p:clrMapOvr>
+    <a:masterClrMapping/>
+  </p:clrMapOvr>
+</p:sld>
+</file>
+
+<file path=ppt/slides/slide16.xml><?xml version="1.0" encoding="utf-8"?>
+<p:sld xmlns:a="http://schemas.openxmlformats.org/drawingml/2006/main" xmlns:r="http://schemas.openxmlformats.org/officeDocument/2006/relationships" xmlns:p="http://schemas.openxmlformats.org/presentationml/2006/main">
+  <p:cSld>
+    <p:spTree>
+      <p:nvGrpSpPr>
+        <p:cNvPr id="1" name=""/>
+        <p:cNvGrpSpPr/>
+        <p:nvPr/>
+      </p:nvGrpSpPr>
+      <p:grpSpPr>
+        <a:xfrm>
+          <a:off x="0" y="0"/>
+          <a:ext cx="0" cy="0"/>
+          <a:chOff x="0" y="0"/>
+          <a:chExt cx="0" cy="0"/>
+        </a:xfrm>
+      </p:grpSpPr>
       <p:pic>
         <p:nvPicPr>
           <p:cNvPr id="3" name="Picture 2">
@@ -3928,8 +4763,8 @@
           </a:prstGeom>
         </p:spPr>
       </p:pic>
-      <mc:AlternateContent xmlns:mc="http://schemas.openxmlformats.org/markup-compatibility/2006">
-        <mc:Choice xmlns:a14="http://schemas.microsoft.com/office/drawing/2010/main" Requires="a14">
+      <mc:AlternateContent xmlns:mc="http://schemas.openxmlformats.org/markup-compatibility/2006" xmlns:a14="http://schemas.microsoft.com/office/drawing/2010/main">
+        <mc:Choice Requires="a14">
           <p:sp>
             <p:nvSpPr>
               <p:cNvPr id="4" name="TextBox 3">
@@ -3958,6 +4793,7 @@
               </a:bodyPr>
               <a:lstStyle/>
               <a:p>
+                <a:pPr/>
                 <a14:m>
                   <m:oMathPara xmlns:m="http://schemas.openxmlformats.org/officeDocument/2006/math">
                     <m:oMathParaPr>
@@ -4079,7 +4915,7 @@
             </p:txBody>
           </p:sp>
         </mc:Choice>
-        <mc:Fallback>
+        <mc:Fallback xmlns="">
           <p:sp>
             <p:nvSpPr>
               <p:cNvPr id="4" name="TextBox 3">
@@ -4124,8 +4960,8 @@
           </p:sp>
         </mc:Fallback>
       </mc:AlternateContent>
-      <mc:AlternateContent xmlns:mc="http://schemas.openxmlformats.org/markup-compatibility/2006">
-        <mc:Choice xmlns:a14="http://schemas.microsoft.com/office/drawing/2010/main" Requires="a14">
+      <mc:AlternateContent xmlns:mc="http://schemas.openxmlformats.org/markup-compatibility/2006" xmlns:a14="http://schemas.microsoft.com/office/drawing/2010/main">
+        <mc:Choice Requires="a14">
           <p:sp>
             <p:nvSpPr>
               <p:cNvPr id="5" name="TextBox 4">
@@ -4154,6 +4990,7 @@
               </a:bodyPr>
               <a:lstStyle/>
               <a:p>
+                <a:pPr/>
                 <a14:m>
                   <m:oMathPara xmlns:m="http://schemas.openxmlformats.org/officeDocument/2006/math">
                     <m:oMathParaPr>
@@ -4286,7 +5123,7 @@
             </p:txBody>
           </p:sp>
         </mc:Choice>
-        <mc:Fallback>
+        <mc:Fallback xmlns="">
           <p:sp>
             <p:nvSpPr>
               <p:cNvPr id="5" name="TextBox 4">
@@ -4331,8 +5168,8 @@
           </p:sp>
         </mc:Fallback>
       </mc:AlternateContent>
-      <mc:AlternateContent xmlns:mc="http://schemas.openxmlformats.org/markup-compatibility/2006">
-        <mc:Choice xmlns:a14="http://schemas.microsoft.com/office/drawing/2010/main" Requires="a14">
+      <mc:AlternateContent xmlns:mc="http://schemas.openxmlformats.org/markup-compatibility/2006" xmlns:a14="http://schemas.microsoft.com/office/drawing/2010/main">
+        <mc:Choice Requires="a14">
           <p:sp>
             <p:nvSpPr>
               <p:cNvPr id="6" name="TextBox 5">
@@ -4361,6 +5198,7 @@
               </a:bodyPr>
               <a:lstStyle/>
               <a:p>
+                <a:pPr/>
                 <a14:m>
                   <m:oMathPara xmlns:m="http://schemas.openxmlformats.org/officeDocument/2006/math">
                     <m:oMathParaPr>
@@ -4520,7 +5358,7 @@
             </p:txBody>
           </p:sp>
         </mc:Choice>
-        <mc:Fallback>
+        <mc:Fallback xmlns="">
           <p:sp>
             <p:nvSpPr>
               <p:cNvPr id="6" name="TextBox 5">
@@ -4680,8 +5518,8 @@
           </a:p>
         </p:txBody>
       </p:sp>
-      <mc:AlternateContent xmlns:mc="http://schemas.openxmlformats.org/markup-compatibility/2006">
-        <mc:Choice xmlns:a14="http://schemas.microsoft.com/office/drawing/2010/main" Requires="a14">
+      <mc:AlternateContent xmlns:mc="http://schemas.openxmlformats.org/markup-compatibility/2006" xmlns:a14="http://schemas.microsoft.com/office/drawing/2010/main">
+        <mc:Choice Requires="a14">
           <p:sp>
             <p:nvSpPr>
               <p:cNvPr id="12" name="TextBox 11">
@@ -4710,6 +5548,7 @@
               </a:bodyPr>
               <a:lstStyle/>
               <a:p>
+                <a:pPr/>
                 <a14:m>
                   <m:oMathPara xmlns:m="http://schemas.openxmlformats.org/officeDocument/2006/math">
                     <m:oMathParaPr>
@@ -4745,7 +5584,7 @@
                         <a:rPr lang="sv-SE" i="1">
                           <a:latin typeface="Cambria Math" panose="02040503050406030204" pitchFamily="18" charset="0"/>
                         </a:rPr>
-                        <m:t>=-0.1646385</m:t>
+                        <m:t>=−0.1646385</m:t>
                       </m:r>
                     </m:oMath>
                   </m:oMathPara>
@@ -4755,7 +5594,7 @@
             </p:txBody>
           </p:sp>
         </mc:Choice>
-        <mc:Fallback>
+        <mc:Fallback xmlns="">
           <p:sp>
             <p:nvSpPr>
               <p:cNvPr id="12" name="TextBox 11">
@@ -4800,8 +5639,8 @@
           </p:sp>
         </mc:Fallback>
       </mc:AlternateContent>
-      <mc:AlternateContent xmlns:mc="http://schemas.openxmlformats.org/markup-compatibility/2006">
-        <mc:Choice xmlns:a14="http://schemas.microsoft.com/office/drawing/2010/main" Requires="a14">
+      <mc:AlternateContent xmlns:mc="http://schemas.openxmlformats.org/markup-compatibility/2006" xmlns:a14="http://schemas.microsoft.com/office/drawing/2010/main">
+        <mc:Choice Requires="a14">
           <p:sp>
             <p:nvSpPr>
               <p:cNvPr id="13" name="TextBox 12">
@@ -4830,6 +5669,7 @@
               </a:bodyPr>
               <a:lstStyle/>
               <a:p>
+                <a:pPr/>
                 <a14:m>
                   <m:oMathPara xmlns:m="http://schemas.openxmlformats.org/officeDocument/2006/math">
                     <m:oMathParaPr>
@@ -4865,7 +5705,7 @@
                         <a:rPr lang="sv-SE" i="1">
                           <a:latin typeface="Cambria Math" panose="02040503050406030204" pitchFamily="18" charset="0"/>
                         </a:rPr>
-                        <m:t>=-0.4558399</m:t>
+                        <m:t>=−0.4558399</m:t>
                       </m:r>
                     </m:oMath>
                   </m:oMathPara>
@@ -4875,7 +5715,7 @@
             </p:txBody>
           </p:sp>
         </mc:Choice>
-        <mc:Fallback>
+        <mc:Fallback xmlns="">
           <p:sp>
             <p:nvSpPr>
               <p:cNvPr id="13" name="TextBox 12">
@@ -4968,607 +5808,7 @@
 </p:sld>
 </file>
 
-<file path=ppt/slides/slide13.xml><?xml version="1.0" encoding="utf-8"?>
-<p:sld xmlns:a="http://schemas.openxmlformats.org/drawingml/2006/main" xmlns:r="http://schemas.openxmlformats.org/officeDocument/2006/relationships" xmlns:p="http://schemas.openxmlformats.org/presentationml/2006/main">
-  <p:cSld>
-    <p:spTree>
-      <p:nvGrpSpPr>
-        <p:cNvPr id="1" name=""/>
-        <p:cNvGrpSpPr/>
-        <p:nvPr/>
-      </p:nvGrpSpPr>
-      <p:grpSpPr>
-        <a:xfrm>
-          <a:off x="0" y="0"/>
-          <a:ext cx="0" cy="0"/>
-          <a:chOff x="0" y="0"/>
-          <a:chExt cx="0" cy="0"/>
-        </a:xfrm>
-      </p:grpSpPr>
-      <p:sp>
-        <p:nvSpPr>
-          <p:cNvPr id="2" name="Rectangle 1">
-            <a:extLst>
-              <a:ext uri="{FF2B5EF4-FFF2-40B4-BE49-F238E27FC236}">
-                <a16:creationId xmlns:a16="http://schemas.microsoft.com/office/drawing/2014/main" id="{BB1D6925-4CD7-C545-B456-6B1095D358BE}"/>
-              </a:ext>
-            </a:extLst>
-          </p:cNvPr>
-          <p:cNvSpPr/>
-          <p:nvPr/>
-        </p:nvSpPr>
-        <p:spPr>
-          <a:xfrm>
-            <a:off x="293914" y="329977"/>
-            <a:ext cx="6096000" cy="646331"/>
-          </a:xfrm>
-          <a:prstGeom prst="rect">
-            <a:avLst/>
-          </a:prstGeom>
-        </p:spPr>
-        <p:txBody>
-          <a:bodyPr>
-            <a:spAutoFit/>
-          </a:bodyPr>
-          <a:lstStyle/>
-          <a:p>
-            <a:r>
-              <a:rPr lang="en-US" dirty="0">
-                <a:solidFill>
-                  <a:srgbClr val="000000"/>
-                </a:solidFill>
-                <a:latin typeface="Cambria" panose="02040503050406030204" pitchFamily="18" charset="0"/>
-              </a:rPr>
-              <a:t>if biased gene conversion is common, the SFS might differ depending on whether the ancestral allele was A,C,G or T.</a:t>
-            </a:r>
-            <a:endParaRPr lang="en-GB" dirty="0"/>
-          </a:p>
-        </p:txBody>
-      </p:sp>
-      <p:pic>
-        <p:nvPicPr>
-          <p:cNvPr id="4" name="Picture 3">
-            <a:extLst>
-              <a:ext uri="{FF2B5EF4-FFF2-40B4-BE49-F238E27FC236}">
-                <a16:creationId xmlns:a16="http://schemas.microsoft.com/office/drawing/2014/main" id="{5F32BC6E-67B2-944D-8B45-D55BFCA63939}"/>
-              </a:ext>
-            </a:extLst>
-          </p:cNvPr>
-          <p:cNvPicPr>
-            <a:picLocks noChangeAspect="1"/>
-          </p:cNvPicPr>
-          <p:nvPr/>
-        </p:nvPicPr>
-        <p:blipFill>
-          <a:blip r:embed="rId2"/>
-          <a:stretch>
-            <a:fillRect/>
-          </a:stretch>
-        </p:blipFill>
-        <p:spPr>
-          <a:xfrm>
-            <a:off x="2238857" y="1128023"/>
-            <a:ext cx="7714286" cy="5400000"/>
-          </a:xfrm>
-          <a:prstGeom prst="rect">
-            <a:avLst/>
-          </a:prstGeom>
-        </p:spPr>
-      </p:pic>
-    </p:spTree>
-    <p:extLst>
-      <p:ext uri="{BB962C8B-B14F-4D97-AF65-F5344CB8AC3E}">
-        <p14:creationId xmlns:p14="http://schemas.microsoft.com/office/powerpoint/2010/main" val="3167113446"/>
-      </p:ext>
-    </p:extLst>
-  </p:cSld>
-  <p:clrMapOvr>
-    <a:masterClrMapping/>
-  </p:clrMapOvr>
-</p:sld>
-</file>
-
-<file path=ppt/slides/slide14.xml><?xml version="1.0" encoding="utf-8"?>
-<p:sld xmlns:a="http://schemas.openxmlformats.org/drawingml/2006/main" xmlns:r="http://schemas.openxmlformats.org/officeDocument/2006/relationships" xmlns:p="http://schemas.openxmlformats.org/presentationml/2006/main">
-  <p:cSld>
-    <p:spTree>
-      <p:nvGrpSpPr>
-        <p:cNvPr id="1" name=""/>
-        <p:cNvGrpSpPr/>
-        <p:nvPr/>
-      </p:nvGrpSpPr>
-      <p:grpSpPr>
-        <a:xfrm>
-          <a:off x="0" y="0"/>
-          <a:ext cx="0" cy="0"/>
-          <a:chOff x="0" y="0"/>
-          <a:chExt cx="0" cy="0"/>
-        </a:xfrm>
-      </p:grpSpPr>
-      <p:sp>
-        <p:nvSpPr>
-          <p:cNvPr id="2" name="Rectangle 1">
-            <a:extLst>
-              <a:ext uri="{FF2B5EF4-FFF2-40B4-BE49-F238E27FC236}">
-                <a16:creationId xmlns:a16="http://schemas.microsoft.com/office/drawing/2014/main" id="{BB1D6925-4CD7-C545-B456-6B1095D358BE}"/>
-              </a:ext>
-            </a:extLst>
-          </p:cNvPr>
-          <p:cNvSpPr/>
-          <p:nvPr/>
-        </p:nvSpPr>
-        <p:spPr>
-          <a:xfrm>
-            <a:off x="293914" y="329977"/>
-            <a:ext cx="6096000" cy="646331"/>
-          </a:xfrm>
-          <a:prstGeom prst="rect">
-            <a:avLst/>
-          </a:prstGeom>
-        </p:spPr>
-        <p:txBody>
-          <a:bodyPr>
-            <a:spAutoFit/>
-          </a:bodyPr>
-          <a:lstStyle/>
-          <a:p>
-            <a:r>
-              <a:rPr lang="en-US" dirty="0">
-                <a:solidFill>
-                  <a:srgbClr val="000000"/>
-                </a:solidFill>
-                <a:latin typeface="Cambria" panose="02040503050406030204" pitchFamily="18" charset="0"/>
-              </a:rPr>
-              <a:t>if biased gene conversion is common, the SFS might differ depending on whether the ancestral allele was A,C,G or T.</a:t>
-            </a:r>
-            <a:endParaRPr lang="en-GB" dirty="0"/>
-          </a:p>
-        </p:txBody>
-      </p:sp>
-      <p:pic>
-        <p:nvPicPr>
-          <p:cNvPr id="4" name="Picture 3">
-            <a:extLst>
-              <a:ext uri="{FF2B5EF4-FFF2-40B4-BE49-F238E27FC236}">
-                <a16:creationId xmlns:a16="http://schemas.microsoft.com/office/drawing/2014/main" id="{2C98591D-FFA2-2042-9555-B9A4311621F2}"/>
-              </a:ext>
-            </a:extLst>
-          </p:cNvPr>
-          <p:cNvPicPr>
-            <a:picLocks noChangeAspect="1"/>
-          </p:cNvPicPr>
-          <p:nvPr/>
-        </p:nvPicPr>
-        <p:blipFill>
-          <a:blip r:embed="rId2"/>
-          <a:stretch>
-            <a:fillRect/>
-          </a:stretch>
-        </p:blipFill>
-        <p:spPr>
-          <a:xfrm>
-            <a:off x="2238857" y="1128023"/>
-            <a:ext cx="7714286" cy="5400000"/>
-          </a:xfrm>
-          <a:prstGeom prst="rect">
-            <a:avLst/>
-          </a:prstGeom>
-        </p:spPr>
-      </p:pic>
-    </p:spTree>
-    <p:extLst>
-      <p:ext uri="{BB962C8B-B14F-4D97-AF65-F5344CB8AC3E}">
-        <p14:creationId xmlns:p14="http://schemas.microsoft.com/office/powerpoint/2010/main" val="1008170287"/>
-      </p:ext>
-    </p:extLst>
-  </p:cSld>
-  <p:clrMapOvr>
-    <a:masterClrMapping/>
-  </p:clrMapOvr>
-</p:sld>
-</file>
-
-<file path=ppt/slides/slide15.xml><?xml version="1.0" encoding="utf-8"?>
-<p:sld xmlns:a="http://schemas.openxmlformats.org/drawingml/2006/main" xmlns:r="http://schemas.openxmlformats.org/officeDocument/2006/relationships" xmlns:p="http://schemas.openxmlformats.org/presentationml/2006/main">
-  <p:cSld>
-    <p:spTree>
-      <p:nvGrpSpPr>
-        <p:cNvPr id="1" name=""/>
-        <p:cNvGrpSpPr/>
-        <p:nvPr/>
-      </p:nvGrpSpPr>
-      <p:grpSpPr>
-        <a:xfrm>
-          <a:off x="0" y="0"/>
-          <a:ext cx="0" cy="0"/>
-          <a:chOff x="0" y="0"/>
-          <a:chExt cx="0" cy="0"/>
-        </a:xfrm>
-      </p:grpSpPr>
-      <p:sp>
-        <p:nvSpPr>
-          <p:cNvPr id="2" name="Rectangle 1">
-            <a:extLst>
-              <a:ext uri="{FF2B5EF4-FFF2-40B4-BE49-F238E27FC236}">
-                <a16:creationId xmlns:a16="http://schemas.microsoft.com/office/drawing/2014/main" id="{BB1D6925-4CD7-C545-B456-6B1095D358BE}"/>
-              </a:ext>
-            </a:extLst>
-          </p:cNvPr>
-          <p:cNvSpPr/>
-          <p:nvPr/>
-        </p:nvSpPr>
-        <p:spPr>
-          <a:xfrm>
-            <a:off x="293914" y="329977"/>
-            <a:ext cx="6096000" cy="646331"/>
-          </a:xfrm>
-          <a:prstGeom prst="rect">
-            <a:avLst/>
-          </a:prstGeom>
-        </p:spPr>
-        <p:txBody>
-          <a:bodyPr>
-            <a:spAutoFit/>
-          </a:bodyPr>
-          <a:lstStyle/>
-          <a:p>
-            <a:r>
-              <a:rPr lang="en-US" dirty="0">
-                <a:solidFill>
-                  <a:srgbClr val="000000"/>
-                </a:solidFill>
-                <a:latin typeface="Cambria" panose="02040503050406030204" pitchFamily="18" charset="0"/>
-              </a:rPr>
-              <a:t>if biased gene conversion is common, the SFS might differ depending on whether the ancestral allele was A,C,G or T.</a:t>
-            </a:r>
-            <a:endParaRPr lang="en-GB" dirty="0"/>
-          </a:p>
-        </p:txBody>
-      </p:sp>
-      <p:pic>
-        <p:nvPicPr>
-          <p:cNvPr id="4" name="Picture 3">
-            <a:extLst>
-              <a:ext uri="{FF2B5EF4-FFF2-40B4-BE49-F238E27FC236}">
-                <a16:creationId xmlns:a16="http://schemas.microsoft.com/office/drawing/2014/main" id="{BF532290-A581-F946-B915-4D0BB32052B3}"/>
-              </a:ext>
-            </a:extLst>
-          </p:cNvPr>
-          <p:cNvPicPr>
-            <a:picLocks noChangeAspect="1"/>
-          </p:cNvPicPr>
-          <p:nvPr/>
-        </p:nvPicPr>
-        <p:blipFill>
-          <a:blip r:embed="rId2"/>
-          <a:stretch>
-            <a:fillRect/>
-          </a:stretch>
-        </p:blipFill>
-        <p:spPr>
-          <a:xfrm>
-            <a:off x="2532771" y="1128023"/>
-            <a:ext cx="7714286" cy="5400000"/>
-          </a:xfrm>
-          <a:prstGeom prst="rect">
-            <a:avLst/>
-          </a:prstGeom>
-        </p:spPr>
-      </p:pic>
-    </p:spTree>
-    <p:extLst>
-      <p:ext uri="{BB962C8B-B14F-4D97-AF65-F5344CB8AC3E}">
-        <p14:creationId xmlns:p14="http://schemas.microsoft.com/office/powerpoint/2010/main" val="1721776585"/>
-      </p:ext>
-    </p:extLst>
-  </p:cSld>
-  <p:clrMapOvr>
-    <a:masterClrMapping/>
-  </p:clrMapOvr>
-</p:sld>
-</file>
-
-<file path=ppt/slides/slide16.xml><?xml version="1.0" encoding="utf-8"?>
-<p:sld xmlns:a="http://schemas.openxmlformats.org/drawingml/2006/main" xmlns:r="http://schemas.openxmlformats.org/officeDocument/2006/relationships" xmlns:p="http://schemas.openxmlformats.org/presentationml/2006/main">
-  <p:cSld>
-    <p:spTree>
-      <p:nvGrpSpPr>
-        <p:cNvPr id="1" name=""/>
-        <p:cNvGrpSpPr/>
-        <p:nvPr/>
-      </p:nvGrpSpPr>
-      <p:grpSpPr>
-        <a:xfrm>
-          <a:off x="0" y="0"/>
-          <a:ext cx="0" cy="0"/>
-          <a:chOff x="0" y="0"/>
-          <a:chExt cx="0" cy="0"/>
-        </a:xfrm>
-      </p:grpSpPr>
-      <p:sp>
-        <p:nvSpPr>
-          <p:cNvPr id="2" name="Rectangle 1">
-            <a:extLst>
-              <a:ext uri="{FF2B5EF4-FFF2-40B4-BE49-F238E27FC236}">
-                <a16:creationId xmlns:a16="http://schemas.microsoft.com/office/drawing/2014/main" id="{BB1D6925-4CD7-C545-B456-6B1095D358BE}"/>
-              </a:ext>
-            </a:extLst>
-          </p:cNvPr>
-          <p:cNvSpPr/>
-          <p:nvPr/>
-        </p:nvSpPr>
-        <p:spPr>
-          <a:xfrm>
-            <a:off x="293914" y="329977"/>
-            <a:ext cx="6096000" cy="646331"/>
-          </a:xfrm>
-          <a:prstGeom prst="rect">
-            <a:avLst/>
-          </a:prstGeom>
-        </p:spPr>
-        <p:txBody>
-          <a:bodyPr>
-            <a:spAutoFit/>
-          </a:bodyPr>
-          <a:lstStyle/>
-          <a:p>
-            <a:r>
-              <a:rPr lang="en-US" dirty="0">
-                <a:solidFill>
-                  <a:srgbClr val="000000"/>
-                </a:solidFill>
-                <a:latin typeface="Cambria" panose="02040503050406030204" pitchFamily="18" charset="0"/>
-              </a:rPr>
-              <a:t>if biased gene conversion is common, the SFS might differ depending on whether the ancestral allele was A,C,G or T.</a:t>
-            </a:r>
-            <a:endParaRPr lang="en-GB" dirty="0"/>
-          </a:p>
-        </p:txBody>
-      </p:sp>
-      <p:pic>
-        <p:nvPicPr>
-          <p:cNvPr id="4" name="Picture 3">
-            <a:extLst>
-              <a:ext uri="{FF2B5EF4-FFF2-40B4-BE49-F238E27FC236}">
-                <a16:creationId xmlns:a16="http://schemas.microsoft.com/office/drawing/2014/main" id="{88169FB1-C330-794E-BE7B-BB381CF63FC9}"/>
-              </a:ext>
-            </a:extLst>
-          </p:cNvPr>
-          <p:cNvPicPr>
-            <a:picLocks noChangeAspect="1"/>
-          </p:cNvPicPr>
-          <p:nvPr/>
-        </p:nvPicPr>
-        <p:blipFill>
-          <a:blip r:embed="rId2"/>
-          <a:stretch>
-            <a:fillRect/>
-          </a:stretch>
-        </p:blipFill>
-        <p:spPr>
-          <a:xfrm>
-            <a:off x="2238857" y="1128023"/>
-            <a:ext cx="7714286" cy="5400000"/>
-          </a:xfrm>
-          <a:prstGeom prst="rect">
-            <a:avLst/>
-          </a:prstGeom>
-        </p:spPr>
-      </p:pic>
-    </p:spTree>
-    <p:extLst>
-      <p:ext uri="{BB962C8B-B14F-4D97-AF65-F5344CB8AC3E}">
-        <p14:creationId xmlns:p14="http://schemas.microsoft.com/office/powerpoint/2010/main" val="3122957420"/>
-      </p:ext>
-    </p:extLst>
-  </p:cSld>
-  <p:clrMapOvr>
-    <a:masterClrMapping/>
-  </p:clrMapOvr>
-</p:sld>
-</file>
-
 <file path=ppt/slides/slide17.xml><?xml version="1.0" encoding="utf-8"?>
-<p:sld xmlns:a="http://schemas.openxmlformats.org/drawingml/2006/main" xmlns:r="http://schemas.openxmlformats.org/officeDocument/2006/relationships" xmlns:p="http://schemas.openxmlformats.org/presentationml/2006/main">
-  <p:cSld>
-    <p:spTree>
-      <p:nvGrpSpPr>
-        <p:cNvPr id="1" name=""/>
-        <p:cNvGrpSpPr/>
-        <p:nvPr/>
-      </p:nvGrpSpPr>
-      <p:grpSpPr>
-        <a:xfrm>
-          <a:off x="0" y="0"/>
-          <a:ext cx="0" cy="0"/>
-          <a:chOff x="0" y="0"/>
-          <a:chExt cx="0" cy="0"/>
-        </a:xfrm>
-      </p:grpSpPr>
-      <p:sp>
-        <p:nvSpPr>
-          <p:cNvPr id="2" name="Rectangle 1">
-            <a:extLst>
-              <a:ext uri="{FF2B5EF4-FFF2-40B4-BE49-F238E27FC236}">
-                <a16:creationId xmlns:a16="http://schemas.microsoft.com/office/drawing/2014/main" id="{BB1D6925-4CD7-C545-B456-6B1095D358BE}"/>
-              </a:ext>
-            </a:extLst>
-          </p:cNvPr>
-          <p:cNvSpPr/>
-          <p:nvPr/>
-        </p:nvSpPr>
-        <p:spPr>
-          <a:xfrm>
-            <a:off x="293914" y="329977"/>
-            <a:ext cx="6096000" cy="646331"/>
-          </a:xfrm>
-          <a:prstGeom prst="rect">
-            <a:avLst/>
-          </a:prstGeom>
-        </p:spPr>
-        <p:txBody>
-          <a:bodyPr>
-            <a:spAutoFit/>
-          </a:bodyPr>
-          <a:lstStyle/>
-          <a:p>
-            <a:r>
-              <a:rPr lang="en-US" dirty="0">
-                <a:solidFill>
-                  <a:srgbClr val="000000"/>
-                </a:solidFill>
-                <a:latin typeface="Cambria" panose="02040503050406030204" pitchFamily="18" charset="0"/>
-              </a:rPr>
-              <a:t>if biased gene conversion is common, the SFS might differ depending on whether the ancestral allele was A,C,G or T.</a:t>
-            </a:r>
-            <a:endParaRPr lang="en-GB" dirty="0"/>
-          </a:p>
-        </p:txBody>
-      </p:sp>
-      <p:pic>
-        <p:nvPicPr>
-          <p:cNvPr id="4" name="Picture 3">
-            <a:extLst>
-              <a:ext uri="{FF2B5EF4-FFF2-40B4-BE49-F238E27FC236}">
-                <a16:creationId xmlns:a16="http://schemas.microsoft.com/office/drawing/2014/main" id="{A64CD85D-48E8-1546-B387-80EAB15D7524}"/>
-              </a:ext>
-            </a:extLst>
-          </p:cNvPr>
-          <p:cNvPicPr>
-            <a:picLocks noChangeAspect="1"/>
-          </p:cNvPicPr>
-          <p:nvPr/>
-        </p:nvPicPr>
-        <p:blipFill>
-          <a:blip r:embed="rId2"/>
-          <a:stretch>
-            <a:fillRect/>
-          </a:stretch>
-        </p:blipFill>
-        <p:spPr>
-          <a:xfrm>
-            <a:off x="2238857" y="1128023"/>
-            <a:ext cx="7714286" cy="5400000"/>
-          </a:xfrm>
-          <a:prstGeom prst="rect">
-            <a:avLst/>
-          </a:prstGeom>
-        </p:spPr>
-      </p:pic>
-    </p:spTree>
-    <p:extLst>
-      <p:ext uri="{BB962C8B-B14F-4D97-AF65-F5344CB8AC3E}">
-        <p14:creationId xmlns:p14="http://schemas.microsoft.com/office/powerpoint/2010/main" val="2381008789"/>
-      </p:ext>
-    </p:extLst>
-  </p:cSld>
-  <p:clrMapOvr>
-    <a:masterClrMapping/>
-  </p:clrMapOvr>
-</p:sld>
-</file>
-
-<file path=ppt/slides/slide18.xml><?xml version="1.0" encoding="utf-8"?>
-<p:sld xmlns:a="http://schemas.openxmlformats.org/drawingml/2006/main" xmlns:r="http://schemas.openxmlformats.org/officeDocument/2006/relationships" xmlns:p="http://schemas.openxmlformats.org/presentationml/2006/main">
-  <p:cSld>
-    <p:spTree>
-      <p:nvGrpSpPr>
-        <p:cNvPr id="1" name=""/>
-        <p:cNvGrpSpPr/>
-        <p:nvPr/>
-      </p:nvGrpSpPr>
-      <p:grpSpPr>
-        <a:xfrm>
-          <a:off x="0" y="0"/>
-          <a:ext cx="0" cy="0"/>
-          <a:chOff x="0" y="0"/>
-          <a:chExt cx="0" cy="0"/>
-        </a:xfrm>
-      </p:grpSpPr>
-      <p:sp>
-        <p:nvSpPr>
-          <p:cNvPr id="2" name="Rectangle 1">
-            <a:extLst>
-              <a:ext uri="{FF2B5EF4-FFF2-40B4-BE49-F238E27FC236}">
-                <a16:creationId xmlns:a16="http://schemas.microsoft.com/office/drawing/2014/main" id="{BB1D6925-4CD7-C545-B456-6B1095D358BE}"/>
-              </a:ext>
-            </a:extLst>
-          </p:cNvPr>
-          <p:cNvSpPr/>
-          <p:nvPr/>
-        </p:nvSpPr>
-        <p:spPr>
-          <a:xfrm>
-            <a:off x="293914" y="329977"/>
-            <a:ext cx="6096000" cy="646331"/>
-          </a:xfrm>
-          <a:prstGeom prst="rect">
-            <a:avLst/>
-          </a:prstGeom>
-        </p:spPr>
-        <p:txBody>
-          <a:bodyPr>
-            <a:spAutoFit/>
-          </a:bodyPr>
-          <a:lstStyle/>
-          <a:p>
-            <a:r>
-              <a:rPr lang="en-US" dirty="0">
-                <a:solidFill>
-                  <a:srgbClr val="000000"/>
-                </a:solidFill>
-                <a:latin typeface="Cambria" panose="02040503050406030204" pitchFamily="18" charset="0"/>
-              </a:rPr>
-              <a:t>if biased gene conversion is common, the SFS might differ depending on whether the ancestral allele was A,C,G or T.</a:t>
-            </a:r>
-            <a:endParaRPr lang="en-GB" dirty="0"/>
-          </a:p>
-        </p:txBody>
-      </p:sp>
-      <p:pic>
-        <p:nvPicPr>
-          <p:cNvPr id="4" name="Picture 3">
-            <a:extLst>
-              <a:ext uri="{FF2B5EF4-FFF2-40B4-BE49-F238E27FC236}">
-                <a16:creationId xmlns:a16="http://schemas.microsoft.com/office/drawing/2014/main" id="{8F7C4AE8-9EA8-0148-9195-388B85AB3E9A}"/>
-              </a:ext>
-            </a:extLst>
-          </p:cNvPr>
-          <p:cNvPicPr>
-            <a:picLocks noChangeAspect="1"/>
-          </p:cNvPicPr>
-          <p:nvPr/>
-        </p:nvPicPr>
-        <p:blipFill>
-          <a:blip r:embed="rId2"/>
-          <a:stretch>
-            <a:fillRect/>
-          </a:stretch>
-        </p:blipFill>
-        <p:spPr>
-          <a:xfrm>
-            <a:off x="2238857" y="1128023"/>
-            <a:ext cx="7714286" cy="5400000"/>
-          </a:xfrm>
-          <a:prstGeom prst="rect">
-            <a:avLst/>
-          </a:prstGeom>
-        </p:spPr>
-      </p:pic>
-    </p:spTree>
-    <p:extLst>
-      <p:ext uri="{BB962C8B-B14F-4D97-AF65-F5344CB8AC3E}">
-        <p14:creationId xmlns:p14="http://schemas.microsoft.com/office/powerpoint/2010/main" val="2895428468"/>
-      </p:ext>
-    </p:extLst>
-  </p:cSld>
-  <p:clrMapOvr>
-    <a:masterClrMapping/>
-  </p:clrMapOvr>
-</p:sld>
-</file>
-
-<file path=ppt/slides/slide19.xml><?xml version="1.0" encoding="utf-8"?>
 <p:sld xmlns:a="http://schemas.openxmlformats.org/drawingml/2006/main" xmlns:r="http://schemas.openxmlformats.org/officeDocument/2006/relationships" xmlns:p="http://schemas.openxmlformats.org/presentationml/2006/main">
   <p:cSld>
     <p:spTree>
@@ -11290,7 +11530,7 @@
         </p:nvSpPr>
         <p:spPr>
           <a:xfrm>
-            <a:off x="1076446" y="868101"/>
+            <a:off x="1076446" y="2898783"/>
             <a:ext cx="7862089" cy="923330"/>
           </a:xfrm>
           <a:prstGeom prst="rect">
@@ -11349,7 +11589,7 @@
         </p:nvSpPr>
         <p:spPr>
           <a:xfrm>
-            <a:off x="1250066" y="3113590"/>
+            <a:off x="1235400" y="4835512"/>
             <a:ext cx="4348050" cy="1200329"/>
           </a:xfrm>
           <a:prstGeom prst="rect">
@@ -11369,7 +11609,7 @@
             </a:pPr>
             <a:r>
               <a:rPr lang="en-GB" dirty="0"/>
-              <a:t>Clustering of (different types) markers</a:t>
+              <a:t>Clustering of INDEL and SNP markers</a:t>
             </a:r>
           </a:p>
           <a:p>
@@ -11407,7 +11647,7 @@
             </a:pPr>
             <a:r>
               <a:rPr lang="en-GB" dirty="0"/>
-              <a:t>Distributions of cline parameters</a:t>
+              <a:t>Distribution of cline parameters</a:t>
             </a:r>
           </a:p>
         </p:txBody>
@@ -11426,8 +11666,8 @@
         </p:nvSpPr>
         <p:spPr>
           <a:xfrm>
-            <a:off x="1076446" y="498769"/>
-            <a:ext cx="4195379" cy="369332"/>
+            <a:off x="1076446" y="2529451"/>
+            <a:ext cx="1734770" cy="369332"/>
           </a:xfrm>
           <a:prstGeom prst="rect">
             <a:avLst/>
@@ -11442,7 +11682,7 @@
           <a:p>
             <a:r>
               <a:rPr lang="en-GB" dirty="0"/>
-              <a:t>Original aspects of the short INDELs paper:</a:t>
+              <a:t>Original aspects:</a:t>
             </a:r>
           </a:p>
         </p:txBody>
@@ -11461,7 +11701,7 @@
         </p:nvSpPr>
         <p:spPr>
           <a:xfrm>
-            <a:off x="1091112" y="2744258"/>
+            <a:off x="1076446" y="4466180"/>
             <a:ext cx="2494273" cy="369332"/>
           </a:xfrm>
           <a:prstGeom prst="rect">
@@ -11478,6 +11718,100 @@
             <a:r>
               <a:rPr lang="en-GB" dirty="0"/>
               <a:t>INDEL-SNP comparisons:</a:t>
+            </a:r>
+          </a:p>
+        </p:txBody>
+      </p:sp>
+      <p:sp>
+        <p:nvSpPr>
+          <p:cNvPr id="6" name="TextBox 5">
+            <a:extLst>
+              <a:ext uri="{FF2B5EF4-FFF2-40B4-BE49-F238E27FC236}">
+                <a16:creationId xmlns:a16="http://schemas.microsoft.com/office/drawing/2014/main" id="{543B0593-A6DC-F34E-A425-007A4752DAE9}"/>
+              </a:ext>
+            </a:extLst>
+          </p:cNvPr>
+          <p:cNvSpPr txBox="1"/>
+          <p:nvPr/>
+        </p:nvSpPr>
+        <p:spPr>
+          <a:xfrm>
+            <a:off x="1076446" y="558140"/>
+            <a:ext cx="1190390" cy="369332"/>
+          </a:xfrm>
+          <a:prstGeom prst="rect">
+            <a:avLst/>
+          </a:prstGeom>
+          <a:noFill/>
+        </p:spPr>
+        <p:txBody>
+          <a:bodyPr wrap="none" rtlCol="0">
+            <a:spAutoFit/>
+          </a:bodyPr>
+          <a:lstStyle/>
+          <a:p>
+            <a:r>
+              <a:rPr lang="en-GB" dirty="0"/>
+              <a:t>Questions:</a:t>
+            </a:r>
+          </a:p>
+        </p:txBody>
+      </p:sp>
+      <p:sp>
+        <p:nvSpPr>
+          <p:cNvPr id="7" name="TextBox 6">
+            <a:extLst>
+              <a:ext uri="{FF2B5EF4-FFF2-40B4-BE49-F238E27FC236}">
+                <a16:creationId xmlns:a16="http://schemas.microsoft.com/office/drawing/2014/main" id="{4BF7E62C-4C37-904F-918A-997123FEB1DC}"/>
+              </a:ext>
+            </a:extLst>
+          </p:cNvPr>
+          <p:cNvSpPr txBox="1"/>
+          <p:nvPr/>
+        </p:nvSpPr>
+        <p:spPr>
+          <a:xfrm>
+            <a:off x="1076446" y="973638"/>
+            <a:ext cx="8028801" cy="923330"/>
+          </a:xfrm>
+          <a:prstGeom prst="rect">
+            <a:avLst/>
+          </a:prstGeom>
+          <a:noFill/>
+        </p:spPr>
+        <p:txBody>
+          <a:bodyPr wrap="none" rtlCol="0">
+            <a:spAutoFit/>
+          </a:bodyPr>
+          <a:lstStyle/>
+          <a:p>
+            <a:pPr marL="342900" indent="-342900">
+              <a:buFont typeface="+mj-lt"/>
+              <a:buAutoNum type="arabicPeriod"/>
+            </a:pPr>
+            <a:r>
+              <a:rPr lang="en-GB" dirty="0"/>
+              <a:t>Why are short INDELs excluded as genetic markers in studies of divergence?</a:t>
+            </a:r>
+          </a:p>
+          <a:p>
+            <a:pPr marL="342900" indent="-342900">
+              <a:buFont typeface="+mj-lt"/>
+              <a:buAutoNum type="arabicPeriod"/>
+            </a:pPr>
+            <a:r>
+              <a:rPr lang="en-GB" dirty="0"/>
+              <a:t>What is their distribution across the genome?</a:t>
+            </a:r>
+          </a:p>
+          <a:p>
+            <a:pPr marL="342900" indent="-342900">
+              <a:buFont typeface="+mj-lt"/>
+              <a:buAutoNum type="arabicPeriod"/>
+            </a:pPr>
+            <a:r>
+              <a:rPr lang="en-GB" dirty="0"/>
+              <a:t>What is the proportion of selectively neutral, deleterious and beneficial INDELs?</a:t>
             </a:r>
           </a:p>
         </p:txBody>
@@ -11514,10 +11848,78 @@
       </p:grpSpPr>
       <p:sp>
         <p:nvSpPr>
-          <p:cNvPr id="2" name="TextBox 1">
-            <a:extLst>
-              <a:ext uri="{FF2B5EF4-FFF2-40B4-BE49-F238E27FC236}">
-                <a16:creationId xmlns:a16="http://schemas.microsoft.com/office/drawing/2014/main" id="{C95969F1-B674-114B-B3E4-0FB4C9FE44A9}"/>
+          <p:cNvPr id="4" name="Rectangle 3">
+            <a:extLst>
+              <a:ext uri="{FF2B5EF4-FFF2-40B4-BE49-F238E27FC236}">
+                <a16:creationId xmlns:a16="http://schemas.microsoft.com/office/drawing/2014/main" id="{D8974372-F4A7-BC4C-8CCA-81547CB5396E}"/>
+              </a:ext>
+            </a:extLst>
+          </p:cNvPr>
+          <p:cNvSpPr/>
+          <p:nvPr/>
+        </p:nvSpPr>
+        <p:spPr>
+          <a:xfrm>
+            <a:off x="98961" y="275503"/>
+            <a:ext cx="3967305" cy="369332"/>
+          </a:xfrm>
+          <a:prstGeom prst="rect">
+            <a:avLst/>
+          </a:prstGeom>
+        </p:spPr>
+        <p:txBody>
+          <a:bodyPr wrap="none">
+            <a:spAutoFit/>
+          </a:bodyPr>
+          <a:lstStyle/>
+          <a:p>
+            <a:pPr marL="342900" indent="-342900">
+              <a:buFont typeface="+mj-lt"/>
+              <a:buAutoNum type="arabicPeriod"/>
+            </a:pPr>
+            <a:r>
+              <a:rPr lang="en-GB" dirty="0"/>
+              <a:t>Clustering of INDEL and SNP markers</a:t>
+            </a:r>
+          </a:p>
+        </p:txBody>
+      </p:sp>
+      <p:pic>
+        <p:nvPicPr>
+          <p:cNvPr id="3" name="Picture 2">
+            <a:extLst>
+              <a:ext uri="{FF2B5EF4-FFF2-40B4-BE49-F238E27FC236}">
+                <a16:creationId xmlns:a16="http://schemas.microsoft.com/office/drawing/2014/main" id="{C5CE20E1-8594-514D-B6E2-8D80DF51DB5D}"/>
+              </a:ext>
+            </a:extLst>
+          </p:cNvPr>
+          <p:cNvPicPr>
+            <a:picLocks noChangeAspect="1"/>
+          </p:cNvPicPr>
+          <p:nvPr/>
+        </p:nvPicPr>
+        <p:blipFill>
+          <a:blip r:embed="rId2"/>
+          <a:stretch>
+            <a:fillRect/>
+          </a:stretch>
+        </p:blipFill>
+        <p:spPr>
+          <a:xfrm>
+            <a:off x="6499760" y="870753"/>
+            <a:ext cx="4908058" cy="3435641"/>
+          </a:xfrm>
+          <a:prstGeom prst="rect">
+            <a:avLst/>
+          </a:prstGeom>
+        </p:spPr>
+      </p:pic>
+      <p:sp>
+        <p:nvSpPr>
+          <p:cNvPr id="7" name="TextBox 6">
+            <a:extLst>
+              <a:ext uri="{FF2B5EF4-FFF2-40B4-BE49-F238E27FC236}">
+                <a16:creationId xmlns:a16="http://schemas.microsoft.com/office/drawing/2014/main" id="{E38C5DF4-1B96-B649-B6EA-33EB7B6B2350}"/>
               </a:ext>
             </a:extLst>
           </p:cNvPr>
@@ -11526,7 +11928,408 @@
         </p:nvSpPr>
         <p:spPr>
           <a:xfrm>
-            <a:off x="3381278" y="473469"/>
+            <a:off x="312718" y="5946238"/>
+            <a:ext cx="5090556" cy="830997"/>
+          </a:xfrm>
+          <a:prstGeom prst="rect">
+            <a:avLst/>
+          </a:prstGeom>
+          <a:noFill/>
+        </p:spPr>
+        <p:txBody>
+          <a:bodyPr wrap="square" rtlCol="0">
+            <a:spAutoFit/>
+          </a:bodyPr>
+          <a:lstStyle/>
+          <a:p>
+            <a:r>
+              <a:rPr lang="en-GB" sz="1600" dirty="0"/>
+              <a:t>Dashed line = 0.2 which is obtained from the ratio of the total number of INDELs and the total number of SNPs for a given ecotype in each island</a:t>
+            </a:r>
+          </a:p>
+        </p:txBody>
+      </p:sp>
+      <p:sp>
+        <p:nvSpPr>
+          <p:cNvPr id="10" name="TextBox 9">
+            <a:extLst>
+              <a:ext uri="{FF2B5EF4-FFF2-40B4-BE49-F238E27FC236}">
+                <a16:creationId xmlns:a16="http://schemas.microsoft.com/office/drawing/2014/main" id="{CE3DF8FF-E260-D14A-BF99-24D5768791E8}"/>
+              </a:ext>
+            </a:extLst>
+          </p:cNvPr>
+          <p:cNvSpPr txBox="1"/>
+          <p:nvPr/>
+        </p:nvSpPr>
+        <p:spPr>
+          <a:xfrm>
+            <a:off x="6499760" y="4589026"/>
+            <a:ext cx="5090556" cy="646331"/>
+          </a:xfrm>
+          <a:prstGeom prst="rect">
+            <a:avLst/>
+          </a:prstGeom>
+          <a:noFill/>
+        </p:spPr>
+        <p:txBody>
+          <a:bodyPr wrap="square" rtlCol="0">
+            <a:spAutoFit/>
+          </a:bodyPr>
+          <a:lstStyle/>
+          <a:p>
+            <a:r>
+              <a:rPr lang="en-GB" dirty="0"/>
+              <a:t>Blue cloud: expected relationship given the ratio between INDEL and SNP count</a:t>
+            </a:r>
+          </a:p>
+        </p:txBody>
+      </p:sp>
+      <p:sp>
+        <p:nvSpPr>
+          <p:cNvPr id="11" name="TextBox 10">
+            <a:extLst>
+              <a:ext uri="{FF2B5EF4-FFF2-40B4-BE49-F238E27FC236}">
+                <a16:creationId xmlns:a16="http://schemas.microsoft.com/office/drawing/2014/main" id="{34614588-A544-D944-8DBF-DDAB2496F44C}"/>
+              </a:ext>
+            </a:extLst>
+          </p:cNvPr>
+          <p:cNvSpPr txBox="1"/>
+          <p:nvPr/>
+        </p:nvSpPr>
+        <p:spPr>
+          <a:xfrm>
+            <a:off x="6499761" y="5403248"/>
+            <a:ext cx="5090556" cy="646331"/>
+          </a:xfrm>
+          <a:prstGeom prst="rect">
+            <a:avLst/>
+          </a:prstGeom>
+          <a:noFill/>
+        </p:spPr>
+        <p:txBody>
+          <a:bodyPr wrap="square" rtlCol="0">
+            <a:spAutoFit/>
+          </a:bodyPr>
+          <a:lstStyle/>
+          <a:p>
+            <a:r>
+              <a:rPr lang="en-GB" dirty="0"/>
+              <a:t>Red dot: the observed relationship consists of a higher concentration of INDELs in fewer regions</a:t>
+            </a:r>
+          </a:p>
+        </p:txBody>
+      </p:sp>
+      <p:pic>
+        <p:nvPicPr>
+          <p:cNvPr id="8" name="Picture 7">
+            <a:extLst>
+              <a:ext uri="{FF2B5EF4-FFF2-40B4-BE49-F238E27FC236}">
+                <a16:creationId xmlns:a16="http://schemas.microsoft.com/office/drawing/2014/main" id="{F872F7A7-549B-1E48-82D3-071947445B32}"/>
+              </a:ext>
+            </a:extLst>
+          </p:cNvPr>
+          <p:cNvPicPr>
+            <a:picLocks noChangeAspect="1"/>
+          </p:cNvPicPr>
+          <p:nvPr/>
+        </p:nvPicPr>
+        <p:blipFill>
+          <a:blip r:embed="rId3"/>
+          <a:stretch>
+            <a:fillRect/>
+          </a:stretch>
+        </p:blipFill>
+        <p:spPr>
+          <a:xfrm>
+            <a:off x="98961" y="644835"/>
+            <a:ext cx="5304313" cy="5304313"/>
+          </a:xfrm>
+          <a:prstGeom prst="rect">
+            <a:avLst/>
+          </a:prstGeom>
+        </p:spPr>
+      </p:pic>
+    </p:spTree>
+    <p:extLst>
+      <p:ext uri="{BB962C8B-B14F-4D97-AF65-F5344CB8AC3E}">
+        <p14:creationId xmlns:p14="http://schemas.microsoft.com/office/powerpoint/2010/main" val="913445088"/>
+      </p:ext>
+    </p:extLst>
+  </p:cSld>
+  <p:clrMapOvr>
+    <a:masterClrMapping/>
+  </p:clrMapOvr>
+</p:sld>
+</file>
+
+<file path=ppt/slides/slide4.xml><?xml version="1.0" encoding="utf-8"?>
+<p:sld xmlns:a="http://schemas.openxmlformats.org/drawingml/2006/main" xmlns:r="http://schemas.openxmlformats.org/officeDocument/2006/relationships" xmlns:p="http://schemas.openxmlformats.org/presentationml/2006/main">
+  <p:cSld>
+    <p:spTree>
+      <p:nvGrpSpPr>
+        <p:cNvPr id="1" name=""/>
+        <p:cNvGrpSpPr/>
+        <p:nvPr/>
+      </p:nvGrpSpPr>
+      <p:grpSpPr>
+        <a:xfrm>
+          <a:off x="0" y="0"/>
+          <a:ext cx="0" cy="0"/>
+          <a:chOff x="0" y="0"/>
+          <a:chExt cx="0" cy="0"/>
+        </a:xfrm>
+      </p:grpSpPr>
+      <p:sp>
+        <p:nvSpPr>
+          <p:cNvPr id="4" name="Rectangle 3">
+            <a:extLst>
+              <a:ext uri="{FF2B5EF4-FFF2-40B4-BE49-F238E27FC236}">
+                <a16:creationId xmlns:a16="http://schemas.microsoft.com/office/drawing/2014/main" id="{1CBF4348-DC40-CA4B-ACAB-57858751D6CD}"/>
+              </a:ext>
+            </a:extLst>
+          </p:cNvPr>
+          <p:cNvSpPr/>
+          <p:nvPr/>
+        </p:nvSpPr>
+        <p:spPr>
+          <a:xfrm>
+            <a:off x="98961" y="275503"/>
+            <a:ext cx="3967305" cy="369332"/>
+          </a:xfrm>
+          <a:prstGeom prst="rect">
+            <a:avLst/>
+          </a:prstGeom>
+        </p:spPr>
+        <p:txBody>
+          <a:bodyPr wrap="none">
+            <a:spAutoFit/>
+          </a:bodyPr>
+          <a:lstStyle/>
+          <a:p>
+            <a:pPr marL="342900" indent="-342900">
+              <a:buFont typeface="+mj-lt"/>
+              <a:buAutoNum type="arabicPeriod"/>
+            </a:pPr>
+            <a:r>
+              <a:rPr lang="en-GB" dirty="0"/>
+              <a:t>Clustering of INDEL and SNP markers</a:t>
+            </a:r>
+          </a:p>
+        </p:txBody>
+      </p:sp>
+      <p:sp>
+        <p:nvSpPr>
+          <p:cNvPr id="5" name="TextBox 4">
+            <a:extLst>
+              <a:ext uri="{FF2B5EF4-FFF2-40B4-BE49-F238E27FC236}">
+                <a16:creationId xmlns:a16="http://schemas.microsoft.com/office/drawing/2014/main" id="{C5D6901B-CD73-394C-A99B-673BC55615F4}"/>
+              </a:ext>
+            </a:extLst>
+          </p:cNvPr>
+          <p:cNvSpPr txBox="1"/>
+          <p:nvPr/>
+        </p:nvSpPr>
+        <p:spPr>
+          <a:xfrm>
+            <a:off x="8393875" y="1188720"/>
+            <a:ext cx="2172646" cy="369332"/>
+          </a:xfrm>
+          <a:prstGeom prst="rect">
+            <a:avLst/>
+          </a:prstGeom>
+          <a:noFill/>
+        </p:spPr>
+        <p:txBody>
+          <a:bodyPr wrap="none" rtlCol="0">
+            <a:spAutoFit/>
+          </a:bodyPr>
+          <a:lstStyle/>
+          <a:p>
+            <a:r>
+              <a:rPr lang="en-GB" dirty="0"/>
+              <a:t>Variant </a:t>
+            </a:r>
+            <a:r>
+              <a:rPr lang="en-GB"/>
+              <a:t>counts with 0</a:t>
+            </a:r>
+            <a:endParaRPr lang="en-GB" dirty="0"/>
+          </a:p>
+        </p:txBody>
+      </p:sp>
+      <p:pic>
+        <p:nvPicPr>
+          <p:cNvPr id="7" name="Picture 6">
+            <a:extLst>
+              <a:ext uri="{FF2B5EF4-FFF2-40B4-BE49-F238E27FC236}">
+                <a16:creationId xmlns:a16="http://schemas.microsoft.com/office/drawing/2014/main" id="{40BC1791-BB20-DA49-9065-F3CDC728A1E4}"/>
+              </a:ext>
+            </a:extLst>
+          </p:cNvPr>
+          <p:cNvPicPr>
+            <a:picLocks noChangeAspect="1"/>
+          </p:cNvPicPr>
+          <p:nvPr/>
+        </p:nvPicPr>
+        <p:blipFill>
+          <a:blip r:embed="rId2"/>
+          <a:stretch>
+            <a:fillRect/>
+          </a:stretch>
+        </p:blipFill>
+        <p:spPr>
+          <a:xfrm>
+            <a:off x="98961" y="807720"/>
+            <a:ext cx="8294914" cy="5806440"/>
+          </a:xfrm>
+          <a:prstGeom prst="rect">
+            <a:avLst/>
+          </a:prstGeom>
+        </p:spPr>
+      </p:pic>
+    </p:spTree>
+    <p:extLst>
+      <p:ext uri="{BB962C8B-B14F-4D97-AF65-F5344CB8AC3E}">
+        <p14:creationId xmlns:p14="http://schemas.microsoft.com/office/powerpoint/2010/main" val="1229101499"/>
+      </p:ext>
+    </p:extLst>
+  </p:cSld>
+  <p:clrMapOvr>
+    <a:masterClrMapping/>
+  </p:clrMapOvr>
+</p:sld>
+</file>
+
+<file path=ppt/slides/slide5.xml><?xml version="1.0" encoding="utf-8"?>
+<p:sld xmlns:a="http://schemas.openxmlformats.org/drawingml/2006/main" xmlns:r="http://schemas.openxmlformats.org/officeDocument/2006/relationships" xmlns:p="http://schemas.openxmlformats.org/presentationml/2006/main">
+  <p:cSld>
+    <p:spTree>
+      <p:nvGrpSpPr>
+        <p:cNvPr id="1" name=""/>
+        <p:cNvGrpSpPr/>
+        <p:nvPr/>
+      </p:nvGrpSpPr>
+      <p:grpSpPr>
+        <a:xfrm>
+          <a:off x="0" y="0"/>
+          <a:ext cx="0" cy="0"/>
+          <a:chOff x="0" y="0"/>
+          <a:chExt cx="0" cy="0"/>
+        </a:xfrm>
+      </p:grpSpPr>
+      <p:sp>
+        <p:nvSpPr>
+          <p:cNvPr id="4" name="Rectangle 3">
+            <a:extLst>
+              <a:ext uri="{FF2B5EF4-FFF2-40B4-BE49-F238E27FC236}">
+                <a16:creationId xmlns:a16="http://schemas.microsoft.com/office/drawing/2014/main" id="{D8974372-F4A7-BC4C-8CCA-81547CB5396E}"/>
+              </a:ext>
+            </a:extLst>
+          </p:cNvPr>
+          <p:cNvSpPr/>
+          <p:nvPr/>
+        </p:nvSpPr>
+        <p:spPr>
+          <a:xfrm>
+            <a:off x="98961" y="275503"/>
+            <a:ext cx="3690882" cy="369332"/>
+          </a:xfrm>
+          <a:prstGeom prst="rect">
+            <a:avLst/>
+          </a:prstGeom>
+        </p:spPr>
+        <p:txBody>
+          <a:bodyPr wrap="none">
+            <a:spAutoFit/>
+          </a:bodyPr>
+          <a:lstStyle/>
+          <a:p>
+            <a:pPr marL="342900" indent="-342900">
+              <a:buFont typeface="+mj-lt"/>
+              <a:buAutoNum type="arabicPeriod" startAt="2"/>
+            </a:pPr>
+            <a:r>
+              <a:rPr lang="en-GB" dirty="0"/>
+              <a:t>Unfolded allele frequency spectra</a:t>
+            </a:r>
+          </a:p>
+        </p:txBody>
+      </p:sp>
+      <p:pic>
+        <p:nvPicPr>
+          <p:cNvPr id="8" name="Picture 7">
+            <a:extLst>
+              <a:ext uri="{FF2B5EF4-FFF2-40B4-BE49-F238E27FC236}">
+                <a16:creationId xmlns:a16="http://schemas.microsoft.com/office/drawing/2014/main" id="{7DDEF84A-A013-CD42-AB7A-EB3B5A5BF4D9}"/>
+              </a:ext>
+            </a:extLst>
+          </p:cNvPr>
+          <p:cNvPicPr>
+            <a:picLocks noChangeAspect="1"/>
+          </p:cNvPicPr>
+          <p:nvPr/>
+        </p:nvPicPr>
+        <p:blipFill>
+          <a:blip r:embed="rId2"/>
+          <a:stretch>
+            <a:fillRect/>
+          </a:stretch>
+        </p:blipFill>
+        <p:spPr>
+          <a:xfrm>
+            <a:off x="1999226" y="847013"/>
+            <a:ext cx="8193549" cy="5735484"/>
+          </a:xfrm>
+          <a:prstGeom prst="rect">
+            <a:avLst/>
+          </a:prstGeom>
+        </p:spPr>
+      </p:pic>
+    </p:spTree>
+    <p:extLst>
+      <p:ext uri="{BB962C8B-B14F-4D97-AF65-F5344CB8AC3E}">
+        <p14:creationId xmlns:p14="http://schemas.microsoft.com/office/powerpoint/2010/main" val="3873722145"/>
+      </p:ext>
+    </p:extLst>
+  </p:cSld>
+  <p:clrMapOvr>
+    <a:masterClrMapping/>
+  </p:clrMapOvr>
+</p:sld>
+</file>
+
+<file path=ppt/slides/slide6.xml><?xml version="1.0" encoding="utf-8"?>
+<p:sld xmlns:a="http://schemas.openxmlformats.org/drawingml/2006/main" xmlns:r="http://schemas.openxmlformats.org/officeDocument/2006/relationships" xmlns:p="http://schemas.openxmlformats.org/presentationml/2006/main">
+  <p:cSld>
+    <p:spTree>
+      <p:nvGrpSpPr>
+        <p:cNvPr id="1" name=""/>
+        <p:cNvGrpSpPr/>
+        <p:nvPr/>
+      </p:nvGrpSpPr>
+      <p:grpSpPr>
+        <a:xfrm>
+          <a:off x="0" y="0"/>
+          <a:ext cx="0" cy="0"/>
+          <a:chOff x="0" y="0"/>
+          <a:chExt cx="0" cy="0"/>
+        </a:xfrm>
+      </p:grpSpPr>
+      <p:sp>
+        <p:nvSpPr>
+          <p:cNvPr id="2" name="TextBox 1">
+            <a:extLst>
+              <a:ext uri="{FF2B5EF4-FFF2-40B4-BE49-F238E27FC236}">
+                <a16:creationId xmlns:a16="http://schemas.microsoft.com/office/drawing/2014/main" id="{C95969F1-B674-114B-B3E4-0FB4C9FE44A9}"/>
+              </a:ext>
+            </a:extLst>
+          </p:cNvPr>
+          <p:cNvSpPr txBox="1"/>
+          <p:nvPr/>
+        </p:nvSpPr>
+        <p:spPr>
+          <a:xfrm>
+            <a:off x="3381278" y="829719"/>
             <a:ext cx="833883" cy="369332"/>
           </a:xfrm>
           <a:prstGeom prst="rect">
@@ -11566,7 +12369,7 @@
         </p:nvSpPr>
         <p:spPr>
           <a:xfrm>
-            <a:off x="7021220" y="2417588"/>
+            <a:off x="7021220" y="2773838"/>
             <a:ext cx="835485" cy="369332"/>
           </a:xfrm>
           <a:prstGeom prst="rect">
@@ -11610,7 +12413,7 @@
         </p:nvSpPr>
         <p:spPr>
           <a:xfrm>
-            <a:off x="4793000" y="2417591"/>
+            <a:off x="4793000" y="2773841"/>
             <a:ext cx="1271182" cy="369332"/>
           </a:xfrm>
           <a:prstGeom prst="rect">
@@ -11655,7 +12458,7 @@
         </p:nvSpPr>
         <p:spPr>
           <a:xfrm>
-            <a:off x="2268473" y="1322300"/>
+            <a:off x="2268473" y="1678550"/>
             <a:ext cx="1112805" cy="369332"/>
           </a:xfrm>
           <a:prstGeom prst="rect">
@@ -11699,7 +12502,7 @@
         </p:nvSpPr>
         <p:spPr>
           <a:xfrm>
-            <a:off x="4215161" y="1293540"/>
+            <a:off x="4215161" y="1649790"/>
             <a:ext cx="1073114" cy="369332"/>
           </a:xfrm>
           <a:prstGeom prst="rect">
@@ -11743,7 +12546,7 @@
         </p:nvSpPr>
         <p:spPr>
           <a:xfrm>
-            <a:off x="8464602" y="3647796"/>
+            <a:off x="8464602" y="4004046"/>
             <a:ext cx="919162" cy="369332"/>
           </a:xfrm>
           <a:prstGeom prst="rect">
@@ -11787,7 +12590,7 @@
         </p:nvSpPr>
         <p:spPr>
           <a:xfrm>
-            <a:off x="6985705" y="3647796"/>
+            <a:off x="6985705" y="4004046"/>
             <a:ext cx="1188210" cy="369332"/>
           </a:xfrm>
           <a:prstGeom prst="rect">
@@ -11831,7 +12634,7 @@
         </p:nvSpPr>
         <p:spPr>
           <a:xfrm>
-            <a:off x="1423182" y="4701266"/>
+            <a:off x="1423182" y="5057516"/>
             <a:ext cx="1386855" cy="369332"/>
           </a:xfrm>
           <a:prstGeom prst="rect">
@@ -11871,7 +12674,7 @@
         </p:nvSpPr>
         <p:spPr>
           <a:xfrm>
-            <a:off x="106185" y="4701266"/>
+            <a:off x="106185" y="5057516"/>
             <a:ext cx="1104470" cy="369332"/>
           </a:xfrm>
           <a:prstGeom prst="rect">
@@ -11911,7 +12714,7 @@
         </p:nvSpPr>
         <p:spPr>
           <a:xfrm>
-            <a:off x="165407" y="3647796"/>
+            <a:off x="165407" y="4004046"/>
             <a:ext cx="1123962" cy="369332"/>
           </a:xfrm>
           <a:prstGeom prst="rect">
@@ -11955,7 +12758,7 @@
         </p:nvSpPr>
         <p:spPr>
           <a:xfrm>
-            <a:off x="1580056" y="3647796"/>
+            <a:off x="1580056" y="4004046"/>
             <a:ext cx="1120050" cy="369332"/>
           </a:xfrm>
           <a:prstGeom prst="rect">
@@ -11999,7 +12802,7 @@
         </p:nvSpPr>
         <p:spPr>
           <a:xfrm>
-            <a:off x="4476807" y="3647796"/>
+            <a:off x="4476807" y="4004046"/>
             <a:ext cx="759119" cy="369332"/>
           </a:xfrm>
           <a:prstGeom prst="rect">
@@ -12043,7 +12846,7 @@
         </p:nvSpPr>
         <p:spPr>
           <a:xfrm>
-            <a:off x="9081748" y="4706706"/>
+            <a:off x="9081748" y="5062956"/>
             <a:ext cx="1820883" cy="369332"/>
           </a:xfrm>
           <a:prstGeom prst="rect">
@@ -12083,7 +12886,7 @@
         </p:nvSpPr>
         <p:spPr>
           <a:xfrm>
-            <a:off x="7286432" y="4706706"/>
+            <a:off x="7286432" y="5062956"/>
             <a:ext cx="1374992" cy="369332"/>
           </a:xfrm>
           <a:prstGeom prst="rect">
@@ -12129,7 +12932,7 @@
         </p:nvSpPr>
         <p:spPr>
           <a:xfrm>
-            <a:off x="9762992" y="5742279"/>
+            <a:off x="9762992" y="6098529"/>
             <a:ext cx="1000595" cy="369332"/>
           </a:xfrm>
           <a:prstGeom prst="rect">
@@ -12169,7 +12972,7 @@
         </p:nvSpPr>
         <p:spPr>
           <a:xfrm>
-            <a:off x="4487430" y="4698920"/>
+            <a:off x="4487430" y="5055170"/>
             <a:ext cx="731290" cy="369332"/>
           </a:xfrm>
           <a:prstGeom prst="rect">
@@ -12209,7 +13012,7 @@
         </p:nvSpPr>
         <p:spPr>
           <a:xfrm>
-            <a:off x="5526613" y="3647796"/>
+            <a:off x="5526613" y="4004046"/>
             <a:ext cx="569387" cy="369332"/>
           </a:xfrm>
           <a:prstGeom prst="rect">
@@ -12253,7 +13056,7 @@
         </p:nvSpPr>
         <p:spPr>
           <a:xfrm>
-            <a:off x="8738929" y="5742279"/>
+            <a:off x="8738929" y="6098529"/>
             <a:ext cx="1024063" cy="369332"/>
           </a:xfrm>
           <a:prstGeom prst="rect">
@@ -12293,7 +13096,7 @@
         </p:nvSpPr>
         <p:spPr>
           <a:xfrm>
-            <a:off x="10763587" y="5742279"/>
+            <a:off x="10763587" y="6098529"/>
             <a:ext cx="1289007" cy="369332"/>
           </a:xfrm>
           <a:prstGeom prst="rect">
@@ -12333,7 +13136,7 @@
         </p:nvSpPr>
         <p:spPr>
           <a:xfrm>
-            <a:off x="5364252" y="5719127"/>
+            <a:off x="5364252" y="6075377"/>
             <a:ext cx="1473224" cy="369332"/>
           </a:xfrm>
           <a:prstGeom prst="rect">
@@ -12379,7 +13182,7 @@
         </p:nvSpPr>
         <p:spPr>
           <a:xfrm>
-            <a:off x="6996916" y="5732585"/>
+            <a:off x="6996916" y="6088835"/>
             <a:ext cx="1449756" cy="369332"/>
           </a:xfrm>
           <a:prstGeom prst="rect">
@@ -12425,7 +13228,7 @@
         </p:nvSpPr>
         <p:spPr>
           <a:xfrm>
-            <a:off x="2990793" y="3647796"/>
+            <a:off x="2990793" y="4004046"/>
             <a:ext cx="1195327" cy="369332"/>
           </a:xfrm>
           <a:prstGeom prst="rect">
@@ -12469,7 +13272,7 @@
         </p:nvSpPr>
         <p:spPr>
           <a:xfrm>
-            <a:off x="7973928" y="473469"/>
+            <a:off x="7973928" y="829719"/>
             <a:ext cx="644344" cy="369332"/>
           </a:xfrm>
           <a:prstGeom prst="rect">
@@ -12511,7 +13314,7 @@
         </p:nvSpPr>
         <p:spPr>
           <a:xfrm>
-            <a:off x="6985705" y="2384136"/>
+            <a:off x="6985705" y="2740386"/>
             <a:ext cx="900000" cy="432000"/>
           </a:xfrm>
           <a:prstGeom prst="rect">
@@ -12554,7 +13357,7 @@
         </p:nvSpPr>
         <p:spPr>
           <a:xfrm>
-            <a:off x="4764000" y="2384136"/>
+            <a:off x="4764000" y="2740386"/>
             <a:ext cx="1332000" cy="432000"/>
           </a:xfrm>
           <a:prstGeom prst="rect">
@@ -12597,7 +13400,7 @@
         </p:nvSpPr>
         <p:spPr>
           <a:xfrm>
-            <a:off x="8433745" y="3618566"/>
+            <a:off x="8433745" y="3974816"/>
             <a:ext cx="990000" cy="432000"/>
           </a:xfrm>
           <a:prstGeom prst="rect">
@@ -12640,7 +13443,7 @@
         </p:nvSpPr>
         <p:spPr>
           <a:xfrm>
-            <a:off x="5485277" y="3617530"/>
+            <a:off x="5485277" y="3973780"/>
             <a:ext cx="640354" cy="432000"/>
           </a:xfrm>
           <a:prstGeom prst="rect">
@@ -12683,7 +13486,7 @@
         </p:nvSpPr>
         <p:spPr>
           <a:xfrm>
-            <a:off x="4439369" y="3615458"/>
+            <a:off x="4439369" y="3971708"/>
             <a:ext cx="827413" cy="432000"/>
           </a:xfrm>
           <a:prstGeom prst="rect">
@@ -12726,7 +13529,7 @@
         </p:nvSpPr>
         <p:spPr>
           <a:xfrm>
-            <a:off x="2951234" y="3618581"/>
+            <a:off x="2951234" y="3974831"/>
             <a:ext cx="1263927" cy="432000"/>
           </a:xfrm>
           <a:prstGeom prst="rect">
@@ -12769,7 +13572,7 @@
         </p:nvSpPr>
         <p:spPr>
           <a:xfrm>
-            <a:off x="1544309" y="3615458"/>
+            <a:off x="1544309" y="3971708"/>
             <a:ext cx="1182717" cy="432000"/>
           </a:xfrm>
           <a:prstGeom prst="rect">
@@ -12812,7 +13615,7 @@
         </p:nvSpPr>
         <p:spPr>
           <a:xfrm>
-            <a:off x="136029" y="3611314"/>
+            <a:off x="136029" y="3967564"/>
             <a:ext cx="1182717" cy="432000"/>
           </a:xfrm>
           <a:prstGeom prst="rect">
@@ -12855,7 +13658,7 @@
         </p:nvSpPr>
         <p:spPr>
           <a:xfrm>
-            <a:off x="67061" y="4667586"/>
+            <a:off x="67061" y="5023836"/>
             <a:ext cx="1182717" cy="432000"/>
           </a:xfrm>
           <a:prstGeom prst="rect">
@@ -12898,7 +13701,7 @@
         </p:nvSpPr>
         <p:spPr>
           <a:xfrm>
-            <a:off x="1384059" y="4675372"/>
+            <a:off x="1384059" y="5031622"/>
             <a:ext cx="1458000" cy="432000"/>
           </a:xfrm>
           <a:prstGeom prst="rect">
@@ -12941,7 +13744,7 @@
         </p:nvSpPr>
         <p:spPr>
           <a:xfrm>
-            <a:off x="4450520" y="4673014"/>
+            <a:off x="4450520" y="5029264"/>
             <a:ext cx="810000" cy="432000"/>
           </a:xfrm>
           <a:prstGeom prst="rect">
@@ -12984,7 +13787,7 @@
         </p:nvSpPr>
         <p:spPr>
           <a:xfrm>
-            <a:off x="9045143" y="4678737"/>
+            <a:off x="9045143" y="5034987"/>
             <a:ext cx="1893600" cy="432000"/>
           </a:xfrm>
           <a:prstGeom prst="rect">
@@ -13027,7 +13830,7 @@
         </p:nvSpPr>
         <p:spPr>
           <a:xfrm>
-            <a:off x="8702933" y="5712402"/>
+            <a:off x="8702933" y="6068652"/>
             <a:ext cx="3391200" cy="432000"/>
           </a:xfrm>
           <a:prstGeom prst="rect">
@@ -13073,7 +13876,7 @@
         </p:nvCxnSpPr>
         <p:spPr>
           <a:xfrm flipH="1">
-            <a:off x="2824876" y="842801"/>
+            <a:off x="2824876" y="1199051"/>
             <a:ext cx="973344" cy="479499"/>
           </a:xfrm>
           <a:prstGeom prst="straightConnector1">
@@ -13118,7 +13921,7 @@
         </p:nvCxnSpPr>
         <p:spPr>
           <a:xfrm>
-            <a:off x="3798220" y="842801"/>
+            <a:off x="3798220" y="1199051"/>
             <a:ext cx="953498" cy="450739"/>
           </a:xfrm>
           <a:prstGeom prst="straightConnector1">
@@ -13163,7 +13966,7 @@
         </p:nvCxnSpPr>
         <p:spPr>
           <a:xfrm>
-            <a:off x="2824876" y="1691632"/>
+            <a:off x="2824876" y="2047882"/>
             <a:ext cx="2605124" cy="692504"/>
           </a:xfrm>
           <a:prstGeom prst="straightConnector1">
@@ -13208,7 +14011,7 @@
         </p:nvCxnSpPr>
         <p:spPr>
           <a:xfrm>
-            <a:off x="4751718" y="1662872"/>
+            <a:off x="4751718" y="2019122"/>
             <a:ext cx="678282" cy="721264"/>
           </a:xfrm>
           <a:prstGeom prst="straightConnector1">
@@ -13253,7 +14056,7 @@
         </p:nvCxnSpPr>
         <p:spPr>
           <a:xfrm>
-            <a:off x="2824876" y="1691632"/>
+            <a:off x="2824876" y="2047882"/>
             <a:ext cx="4610829" cy="692504"/>
           </a:xfrm>
           <a:prstGeom prst="straightConnector1">
@@ -13298,7 +14101,7 @@
         </p:nvCxnSpPr>
         <p:spPr>
           <a:xfrm>
-            <a:off x="4751718" y="1662872"/>
+            <a:off x="4751718" y="2019122"/>
             <a:ext cx="2683987" cy="721264"/>
           </a:xfrm>
           <a:prstGeom prst="straightConnector1">
@@ -13343,7 +14146,7 @@
         </p:nvCxnSpPr>
         <p:spPr>
           <a:xfrm flipH="1">
-            <a:off x="5430000" y="842801"/>
+            <a:off x="5430000" y="1199051"/>
             <a:ext cx="2866100" cy="1541335"/>
           </a:xfrm>
           <a:prstGeom prst="straightConnector1">
@@ -13388,7 +14191,7 @@
         </p:nvCxnSpPr>
         <p:spPr>
           <a:xfrm flipH="1">
-            <a:off x="7435705" y="842801"/>
+            <a:off x="7435705" y="1199051"/>
             <a:ext cx="860395" cy="1541335"/>
           </a:xfrm>
           <a:prstGeom prst="straightConnector1">
@@ -13433,7 +14236,7 @@
         </p:nvCxnSpPr>
         <p:spPr>
           <a:xfrm flipH="1">
-            <a:off x="727388" y="2816136"/>
+            <a:off x="727388" y="3172386"/>
             <a:ext cx="4702612" cy="795178"/>
           </a:xfrm>
           <a:prstGeom prst="straightConnector1">
@@ -13478,7 +14281,7 @@
         </p:nvCxnSpPr>
         <p:spPr>
           <a:xfrm flipH="1">
-            <a:off x="2135668" y="2816136"/>
+            <a:off x="2135668" y="3172386"/>
             <a:ext cx="3294332" cy="799322"/>
           </a:xfrm>
           <a:prstGeom prst="straightConnector1">
@@ -13523,7 +14326,7 @@
         </p:nvCxnSpPr>
         <p:spPr>
           <a:xfrm flipH="1">
-            <a:off x="3583198" y="2816136"/>
+            <a:off x="3583198" y="3172386"/>
             <a:ext cx="1846802" cy="802445"/>
           </a:xfrm>
           <a:prstGeom prst="straightConnector1">
@@ -13568,7 +14371,7 @@
         </p:nvCxnSpPr>
         <p:spPr>
           <a:xfrm flipH="1">
-            <a:off x="4853076" y="2816136"/>
+            <a:off x="4853076" y="3172386"/>
             <a:ext cx="576924" cy="799322"/>
           </a:xfrm>
           <a:prstGeom prst="straightConnector1">
@@ -13613,7 +14416,7 @@
         </p:nvCxnSpPr>
         <p:spPr>
           <a:xfrm>
-            <a:off x="5430000" y="2816136"/>
+            <a:off x="5430000" y="3172386"/>
             <a:ext cx="375454" cy="801394"/>
           </a:xfrm>
           <a:prstGeom prst="straightConnector1">
@@ -13658,7 +14461,7 @@
         </p:nvCxnSpPr>
         <p:spPr>
           <a:xfrm>
-            <a:off x="7435705" y="2816136"/>
+            <a:off x="7435705" y="3172386"/>
             <a:ext cx="144105" cy="831660"/>
           </a:xfrm>
           <a:prstGeom prst="straightConnector1">
@@ -13703,7 +14506,7 @@
         </p:nvCxnSpPr>
         <p:spPr>
           <a:xfrm>
-            <a:off x="7435705" y="2816136"/>
+            <a:off x="7435705" y="3172386"/>
             <a:ext cx="1493040" cy="802430"/>
           </a:xfrm>
           <a:prstGeom prst="straightConnector1">
@@ -13748,7 +14551,7 @@
         </p:nvCxnSpPr>
         <p:spPr>
           <a:xfrm flipH="1">
-            <a:off x="658420" y="4043314"/>
+            <a:off x="658420" y="4399564"/>
             <a:ext cx="68968" cy="624272"/>
           </a:xfrm>
           <a:prstGeom prst="straightConnector1">
@@ -13793,7 +14596,7 @@
         </p:nvCxnSpPr>
         <p:spPr>
           <a:xfrm>
-            <a:off x="727388" y="4043314"/>
+            <a:off x="727388" y="4399564"/>
             <a:ext cx="1385671" cy="632058"/>
           </a:xfrm>
           <a:prstGeom prst="straightConnector1">
@@ -13838,7 +14641,7 @@
         </p:nvCxnSpPr>
         <p:spPr>
           <a:xfrm>
-            <a:off x="4853076" y="4047458"/>
+            <a:off x="4853076" y="4403708"/>
             <a:ext cx="2444" cy="625556"/>
           </a:xfrm>
           <a:prstGeom prst="straightConnector1">
@@ -13883,7 +14686,7 @@
         </p:nvCxnSpPr>
         <p:spPr>
           <a:xfrm flipH="1">
-            <a:off x="7973928" y="4050566"/>
+            <a:off x="7973928" y="4406816"/>
             <a:ext cx="954817" cy="656140"/>
           </a:xfrm>
           <a:prstGeom prst="straightConnector1">
@@ -13928,7 +14731,7 @@
         </p:nvCxnSpPr>
         <p:spPr>
           <a:xfrm>
-            <a:off x="8928745" y="4050566"/>
+            <a:off x="8928745" y="4406816"/>
             <a:ext cx="1063198" cy="628171"/>
           </a:xfrm>
           <a:prstGeom prst="straightConnector1">
@@ -13973,7 +14776,7 @@
         </p:nvCxnSpPr>
         <p:spPr>
           <a:xfrm flipH="1">
-            <a:off x="6100864" y="5076038"/>
+            <a:off x="6100864" y="5432288"/>
             <a:ext cx="1873064" cy="643089"/>
           </a:xfrm>
           <a:prstGeom prst="straightConnector1">
@@ -14018,7 +14821,7 @@
         </p:nvCxnSpPr>
         <p:spPr>
           <a:xfrm flipH="1">
-            <a:off x="7721794" y="5076038"/>
+            <a:off x="7721794" y="5432288"/>
             <a:ext cx="252134" cy="656547"/>
           </a:xfrm>
           <a:prstGeom prst="straightConnector1">
@@ -14062,7 +14865,7 @@
         </p:nvCxnSpPr>
         <p:spPr>
           <a:xfrm flipH="1">
-            <a:off x="9195018" y="5110737"/>
+            <a:off x="9195018" y="5466987"/>
             <a:ext cx="796925" cy="601665"/>
           </a:xfrm>
           <a:prstGeom prst="straightConnector1">
@@ -14106,7 +14909,7 @@
         </p:nvCxnSpPr>
         <p:spPr>
           <a:xfrm>
-            <a:off x="9991943" y="5110737"/>
+            <a:off x="9991943" y="5466987"/>
             <a:ext cx="1438885" cy="601665"/>
           </a:xfrm>
           <a:prstGeom prst="straightConnector1">
@@ -14150,7 +14953,7 @@
         </p:nvCxnSpPr>
         <p:spPr>
           <a:xfrm>
-            <a:off x="9991943" y="5110737"/>
+            <a:off x="9991943" y="5466987"/>
             <a:ext cx="222574" cy="608390"/>
           </a:xfrm>
           <a:prstGeom prst="straightConnector1">
@@ -14196,7 +14999,7 @@
         </p:nvCxnSpPr>
         <p:spPr>
           <a:xfrm flipH="1">
-            <a:off x="7721794" y="5110737"/>
+            <a:off x="7721794" y="5466987"/>
             <a:ext cx="2270149" cy="621848"/>
           </a:xfrm>
           <a:prstGeom prst="straightConnector1">
@@ -14242,7 +15045,7 @@
         </p:nvCxnSpPr>
         <p:spPr>
           <a:xfrm>
-            <a:off x="7579810" y="4017128"/>
+            <a:off x="7579810" y="4373378"/>
             <a:ext cx="2412133" cy="661609"/>
           </a:xfrm>
           <a:prstGeom prst="straightConnector1">
@@ -14270,42 +15073,12 @@
           </a:fontRef>
         </p:style>
       </p:cxnSp>
-    </p:spTree>
-    <p:extLst>
-      <p:ext uri="{BB962C8B-B14F-4D97-AF65-F5344CB8AC3E}">
-        <p14:creationId xmlns:p14="http://schemas.microsoft.com/office/powerpoint/2010/main" val="32899026"/>
-      </p:ext>
-    </p:extLst>
-  </p:cSld>
-  <p:clrMapOvr>
-    <a:masterClrMapping/>
-  </p:clrMapOvr>
-</p:sld>
-</file>
-
-<file path=ppt/slides/slide4.xml><?xml version="1.0" encoding="utf-8"?>
-<p:sld xmlns:a="http://schemas.openxmlformats.org/drawingml/2006/main" xmlns:r="http://schemas.openxmlformats.org/officeDocument/2006/relationships" xmlns:p="http://schemas.openxmlformats.org/presentationml/2006/main">
-  <p:cSld>
-    <p:spTree>
-      <p:nvGrpSpPr>
-        <p:cNvPr id="1" name=""/>
-        <p:cNvGrpSpPr/>
-        <p:nvPr/>
-      </p:nvGrpSpPr>
-      <p:grpSpPr>
-        <a:xfrm>
-          <a:off x="0" y="0"/>
-          <a:ext cx="0" cy="0"/>
-          <a:chOff x="0" y="0"/>
-          <a:chExt cx="0" cy="0"/>
-        </a:xfrm>
-      </p:grpSpPr>
       <p:sp>
         <p:nvSpPr>
-          <p:cNvPr id="2" name="Rectangle 1">
-            <a:extLst>
-              <a:ext uri="{FF2B5EF4-FFF2-40B4-BE49-F238E27FC236}">
-                <a16:creationId xmlns:a16="http://schemas.microsoft.com/office/drawing/2014/main" id="{9C8CC98B-E053-2749-8A2B-8B289C42020E}"/>
+          <p:cNvPr id="67" name="Rectangle 66">
+            <a:extLst>
+              <a:ext uri="{FF2B5EF4-FFF2-40B4-BE49-F238E27FC236}">
+                <a16:creationId xmlns:a16="http://schemas.microsoft.com/office/drawing/2014/main" id="{E997D708-7C4A-A845-AAEE-DC9F3A48D53A}"/>
               </a:ext>
             </a:extLst>
           </p:cNvPr>
@@ -14314,125 +15087,36 @@
         </p:nvSpPr>
         <p:spPr>
           <a:xfrm>
-            <a:off x="407670" y="925473"/>
-            <a:ext cx="8622030" cy="3539430"/>
+            <a:off x="98961" y="275503"/>
+            <a:ext cx="3690882" cy="369332"/>
           </a:xfrm>
           <a:prstGeom prst="rect">
             <a:avLst/>
           </a:prstGeom>
         </p:spPr>
         <p:txBody>
-          <a:bodyPr wrap="square">
+          <a:bodyPr wrap="none">
             <a:spAutoFit/>
           </a:bodyPr>
           <a:lstStyle/>
           <a:p>
+            <a:pPr marL="342900" indent="-342900">
+              <a:buFont typeface="+mj-lt"/>
+              <a:buAutoNum type="arabicPeriod" startAt="2"/>
+            </a:pPr>
             <a:r>
-              <a:rPr lang="en-US" sz="1600" dirty="0">
-                <a:solidFill>
-                  <a:srgbClr val="000000"/>
-                </a:solidFill>
-                <a:latin typeface="Cambria" panose="02040503050406030204" pitchFamily="18" charset="0"/>
-              </a:rPr>
-              <a:t>1. between different categories of INDELs (e.g., coding INDELs vs non-coding INDELs) and SNPs (e.g., synonymous SNPs vs non-synonymous SNPs).</a:t>
+              <a:rPr lang="en-GB" dirty="0"/>
+              <a:t>Unfolded allele frequency spectra</a:t>
             </a:r>
-          </a:p>
-          <a:p>
-            <a:br>
-              <a:rPr lang="en-US" sz="1600" dirty="0">
-                <a:solidFill>
-                  <a:srgbClr val="000000"/>
-                </a:solidFill>
-                <a:latin typeface="Cambria" panose="02040503050406030204" pitchFamily="18" charset="0"/>
-              </a:rPr>
-            </a:br>
-            <a:endParaRPr lang="en-US" sz="1600" dirty="0">
-              <a:solidFill>
-                <a:srgbClr val="000000"/>
-              </a:solidFill>
-              <a:latin typeface="Cambria" panose="02040503050406030204" pitchFamily="18" charset="0"/>
-            </a:endParaRPr>
-          </a:p>
-          <a:p>
-            <a:r>
-              <a:rPr lang="en-US" sz="1600" dirty="0">
-                <a:solidFill>
-                  <a:srgbClr val="000000"/>
-                </a:solidFill>
-                <a:latin typeface="Cambria" panose="02040503050406030204" pitchFamily="18" charset="0"/>
-              </a:rPr>
-              <a:t>2. between INDELs and SNPs of the same category of annotation (e.g., coding INDELs vs coding SNPs).</a:t>
-            </a:r>
-          </a:p>
-          <a:p>
-            <a:br>
-              <a:rPr lang="en-US" sz="1600" dirty="0">
-                <a:solidFill>
-                  <a:srgbClr val="000000"/>
-                </a:solidFill>
-                <a:latin typeface="Cambria" panose="02040503050406030204" pitchFamily="18" charset="0"/>
-              </a:rPr>
-            </a:br>
-            <a:endParaRPr lang="en-US" sz="1600" dirty="0">
-              <a:solidFill>
-                <a:srgbClr val="000000"/>
-              </a:solidFill>
-              <a:latin typeface="Cambria" panose="02040503050406030204" pitchFamily="18" charset="0"/>
-            </a:endParaRPr>
-          </a:p>
-          <a:p>
-            <a:r>
-              <a:rPr lang="en-US" sz="1600" dirty="0">
-                <a:solidFill>
-                  <a:srgbClr val="000000"/>
-                </a:solidFill>
-                <a:latin typeface="Cambria" panose="02040503050406030204" pitchFamily="18" charset="0"/>
-              </a:rPr>
-              <a:t>3. between different categories of deletions and insertions (e.g., coding deletions vs non-coding deletions, frameshift insertions vs inframe insertions).</a:t>
-            </a:r>
-          </a:p>
-          <a:p>
-            <a:br>
-              <a:rPr lang="en-US" sz="1600" dirty="0">
-                <a:solidFill>
-                  <a:srgbClr val="000000"/>
-                </a:solidFill>
-                <a:latin typeface="Cambria" panose="02040503050406030204" pitchFamily="18" charset="0"/>
-              </a:rPr>
-            </a:br>
-            <a:endParaRPr lang="en-US" sz="1600" dirty="0">
-              <a:solidFill>
-                <a:srgbClr val="000000"/>
-              </a:solidFill>
-              <a:latin typeface="Cambria" panose="02040503050406030204" pitchFamily="18" charset="0"/>
-            </a:endParaRPr>
-          </a:p>
-          <a:p>
-            <a:r>
-              <a:rPr lang="en-US" sz="1600" dirty="0">
-                <a:solidFill>
-                  <a:srgbClr val="000000"/>
-                </a:solidFill>
-                <a:latin typeface="Cambria" panose="02040503050406030204" pitchFamily="18" charset="0"/>
-              </a:rPr>
-              <a:t>4. between deletions and insertions of the same category of annotation (e.g., non-coding deletions vs non-coding insertions).</a:t>
-            </a:r>
-            <a:endParaRPr lang="en-US" sz="1600" b="0" i="0" u="none" strike="noStrike" dirty="0">
-              <a:solidFill>
-                <a:srgbClr val="000000"/>
-              </a:solidFill>
-              <a:effectLst/>
-              <a:latin typeface="Cambria" panose="02040503050406030204" pitchFamily="18" charset="0"/>
-            </a:endParaRPr>
           </a:p>
         </p:txBody>
       </p:sp>
       <p:sp>
         <p:nvSpPr>
-          <p:cNvPr id="4" name="TextBox 3">
-            <a:extLst>
-              <a:ext uri="{FF2B5EF4-FFF2-40B4-BE49-F238E27FC236}">
-                <a16:creationId xmlns:a16="http://schemas.microsoft.com/office/drawing/2014/main" id="{63C4FCB4-DEF2-714B-87DE-62695168382E}"/>
+          <p:cNvPr id="14" name="TextBox 13">
+            <a:extLst>
+              <a:ext uri="{FF2B5EF4-FFF2-40B4-BE49-F238E27FC236}">
+                <a16:creationId xmlns:a16="http://schemas.microsoft.com/office/drawing/2014/main" id="{834F269C-45EA-D148-B722-217A8BFBEDCC}"/>
               </a:ext>
             </a:extLst>
           </p:cNvPr>
@@ -14441,80 +15125,23 @@
         </p:nvSpPr>
         <p:spPr>
           <a:xfrm>
-            <a:off x="407670" y="308610"/>
-            <a:ext cx="3473002" cy="369332"/>
+            <a:off x="8756515" y="2174883"/>
+            <a:ext cx="2979149" cy="400110"/>
           </a:xfrm>
           <a:prstGeom prst="rect">
             <a:avLst/>
           </a:prstGeom>
+          <a:noFill/>
         </p:spPr>
         <p:txBody>
-          <a:bodyPr>
+          <a:bodyPr wrap="none" rtlCol="0">
             <a:spAutoFit/>
           </a:bodyPr>
-          <a:lstStyle>
-            <a:defPPr>
-              <a:defRPr lang="en-US"/>
-            </a:defPPr>
-            <a:lvl1pPr>
-              <a:defRPr>
-                <a:solidFill>
-                  <a:srgbClr val="000000"/>
-                </a:solidFill>
-                <a:latin typeface="Cambria" panose="02040503050406030204" pitchFamily="18" charset="0"/>
-              </a:defRPr>
-            </a:lvl1pPr>
-          </a:lstStyle>
+          <a:lstStyle/>
           <a:p>
             <a:r>
-              <a:rPr lang="en-GB" dirty="0"/>
-              <a:t>For each island and each ecotype:</a:t>
-            </a:r>
-          </a:p>
-        </p:txBody>
-      </p:sp>
-      <p:sp>
-        <p:nvSpPr>
-          <p:cNvPr id="5" name="TextBox 4">
-            <a:extLst>
-              <a:ext uri="{FF2B5EF4-FFF2-40B4-BE49-F238E27FC236}">
-                <a16:creationId xmlns:a16="http://schemas.microsoft.com/office/drawing/2014/main" id="{F8EC594D-06B1-0749-B854-DA1020A65F07}"/>
-              </a:ext>
-            </a:extLst>
-          </p:cNvPr>
-          <p:cNvSpPr txBox="1"/>
-          <p:nvPr/>
-        </p:nvSpPr>
-        <p:spPr>
-          <a:xfrm>
-            <a:off x="407670" y="5563195"/>
-            <a:ext cx="3473002" cy="369332"/>
-          </a:xfrm>
-          <a:prstGeom prst="rect">
-            <a:avLst/>
-          </a:prstGeom>
-        </p:spPr>
-        <p:txBody>
-          <a:bodyPr>
-            <a:spAutoFit/>
-          </a:bodyPr>
-          <a:lstStyle>
-            <a:defPPr>
-              <a:defRPr lang="en-US"/>
-            </a:defPPr>
-            <a:lvl1pPr>
-              <a:defRPr>
-                <a:solidFill>
-                  <a:srgbClr val="000000"/>
-                </a:solidFill>
-                <a:latin typeface="Cambria" panose="02040503050406030204" pitchFamily="18" charset="0"/>
-              </a:defRPr>
-            </a:lvl1pPr>
-          </a:lstStyle>
-          <a:p>
-            <a:r>
-              <a:rPr lang="en-GB" dirty="0"/>
-              <a:t>And then also between ecotypes.</a:t>
+              <a:rPr lang="en-GB" sz="2000" dirty="0"/>
+              <a:t>TOO MANY COMPARISONS</a:t>
             </a:r>
           </a:p>
         </p:txBody>
@@ -14522,127 +15149,7 @@
     </p:spTree>
     <p:extLst>
       <p:ext uri="{BB962C8B-B14F-4D97-AF65-F5344CB8AC3E}">
-        <p14:creationId xmlns:p14="http://schemas.microsoft.com/office/powerpoint/2010/main" val="79112516"/>
-      </p:ext>
-    </p:extLst>
-  </p:cSld>
-  <p:clrMapOvr>
-    <a:masterClrMapping/>
-  </p:clrMapOvr>
-</p:sld>
-</file>
-
-<file path=ppt/slides/slide5.xml><?xml version="1.0" encoding="utf-8"?>
-<p:sld xmlns:a="http://schemas.openxmlformats.org/drawingml/2006/main" xmlns:r="http://schemas.openxmlformats.org/officeDocument/2006/relationships" xmlns:p="http://schemas.openxmlformats.org/presentationml/2006/main">
-  <p:cSld>
-    <p:spTree>
-      <p:nvGrpSpPr>
-        <p:cNvPr id="1" name=""/>
-        <p:cNvGrpSpPr/>
-        <p:nvPr/>
-      </p:nvGrpSpPr>
-      <p:grpSpPr>
-        <a:xfrm>
-          <a:off x="0" y="0"/>
-          <a:ext cx="0" cy="0"/>
-          <a:chOff x="0" y="0"/>
-          <a:chExt cx="0" cy="0"/>
-        </a:xfrm>
-      </p:grpSpPr>
-      <p:pic>
-        <p:nvPicPr>
-          <p:cNvPr id="3" name="Picture 2">
-            <a:extLst>
-              <a:ext uri="{FF2B5EF4-FFF2-40B4-BE49-F238E27FC236}">
-                <a16:creationId xmlns:a16="http://schemas.microsoft.com/office/drawing/2014/main" id="{9053DC1D-350F-8541-9E13-B6C019B0C6C0}"/>
-              </a:ext>
-            </a:extLst>
-          </p:cNvPr>
-          <p:cNvPicPr>
-            <a:picLocks noChangeAspect="1"/>
-          </p:cNvPicPr>
-          <p:nvPr/>
-        </p:nvPicPr>
-        <p:blipFill>
-          <a:blip r:embed="rId2"/>
-          <a:stretch>
-            <a:fillRect/>
-          </a:stretch>
-        </p:blipFill>
-        <p:spPr>
-          <a:xfrm>
-            <a:off x="1524000" y="228600"/>
-            <a:ext cx="9144000" cy="6400800"/>
-          </a:xfrm>
-          <a:prstGeom prst="rect">
-            <a:avLst/>
-          </a:prstGeom>
-        </p:spPr>
-      </p:pic>
-    </p:spTree>
-    <p:extLst>
-      <p:ext uri="{BB962C8B-B14F-4D97-AF65-F5344CB8AC3E}">
-        <p14:creationId xmlns:p14="http://schemas.microsoft.com/office/powerpoint/2010/main" val="562399673"/>
-      </p:ext>
-    </p:extLst>
-  </p:cSld>
-  <p:clrMapOvr>
-    <a:masterClrMapping/>
-  </p:clrMapOvr>
-</p:sld>
-</file>
-
-<file path=ppt/slides/slide6.xml><?xml version="1.0" encoding="utf-8"?>
-<p:sld xmlns:a="http://schemas.openxmlformats.org/drawingml/2006/main" xmlns:r="http://schemas.openxmlformats.org/officeDocument/2006/relationships" xmlns:p="http://schemas.openxmlformats.org/presentationml/2006/main">
-  <p:cSld>
-    <p:spTree>
-      <p:nvGrpSpPr>
-        <p:cNvPr id="1" name=""/>
-        <p:cNvGrpSpPr/>
-        <p:nvPr/>
-      </p:nvGrpSpPr>
-      <p:grpSpPr>
-        <a:xfrm>
-          <a:off x="0" y="0"/>
-          <a:ext cx="0" cy="0"/>
-          <a:chOff x="0" y="0"/>
-          <a:chExt cx="0" cy="0"/>
-        </a:xfrm>
-      </p:grpSpPr>
-      <p:pic>
-        <p:nvPicPr>
-          <p:cNvPr id="3" name="Picture 2">
-            <a:extLst>
-              <a:ext uri="{FF2B5EF4-FFF2-40B4-BE49-F238E27FC236}">
-                <a16:creationId xmlns:a16="http://schemas.microsoft.com/office/drawing/2014/main" id="{A698CAD4-B417-C345-9356-20922327CDBE}"/>
-              </a:ext>
-            </a:extLst>
-          </p:cNvPr>
-          <p:cNvPicPr>
-            <a:picLocks noChangeAspect="1"/>
-          </p:cNvPicPr>
-          <p:nvPr/>
-        </p:nvPicPr>
-        <p:blipFill>
-          <a:blip r:embed="rId2"/>
-          <a:stretch>
-            <a:fillRect/>
-          </a:stretch>
-        </p:blipFill>
-        <p:spPr>
-          <a:xfrm>
-            <a:off x="1524000" y="228600"/>
-            <a:ext cx="9144000" cy="6400800"/>
-          </a:xfrm>
-          <a:prstGeom prst="rect">
-            <a:avLst/>
-          </a:prstGeom>
-        </p:spPr>
-      </p:pic>
-    </p:spTree>
-    <p:extLst>
-      <p:ext uri="{BB962C8B-B14F-4D97-AF65-F5344CB8AC3E}">
-        <p14:creationId xmlns:p14="http://schemas.microsoft.com/office/powerpoint/2010/main" val="1753470758"/>
+        <p14:creationId xmlns:p14="http://schemas.microsoft.com/office/powerpoint/2010/main" val="32899026"/>
       </p:ext>
     </p:extLst>
   </p:cSld>
@@ -14674,7 +15181,7 @@
           <p:cNvPr id="3" name="Picture 2">
             <a:extLst>
               <a:ext uri="{FF2B5EF4-FFF2-40B4-BE49-F238E27FC236}">
-                <a16:creationId xmlns:a16="http://schemas.microsoft.com/office/drawing/2014/main" id="{7CC95EEF-11A7-4F4A-A6F7-ACD046A3FC32}"/>
+                <a16:creationId xmlns:a16="http://schemas.microsoft.com/office/drawing/2014/main" id="{95054174-3DB3-8D43-AF58-F4F65501D2BA}"/>
               </a:ext>
             </a:extLst>
           </p:cNvPr>
@@ -14691,18 +15198,166 @@
         </p:blipFill>
         <p:spPr>
           <a:xfrm>
-            <a:off x="1524000" y="228600"/>
-            <a:ext cx="9144000" cy="6400800"/>
+            <a:off x="526473" y="1238597"/>
+            <a:ext cx="6349340" cy="4762005"/>
           </a:xfrm>
           <a:prstGeom prst="rect">
             <a:avLst/>
           </a:prstGeom>
         </p:spPr>
       </p:pic>
+      <p:sp>
+        <p:nvSpPr>
+          <p:cNvPr id="4" name="Rectangle 3">
+            <a:extLst>
+              <a:ext uri="{FF2B5EF4-FFF2-40B4-BE49-F238E27FC236}">
+                <a16:creationId xmlns:a16="http://schemas.microsoft.com/office/drawing/2014/main" id="{DC1F7A85-BFDD-2B4E-95CF-48A4E6A38BB9}"/>
+              </a:ext>
+            </a:extLst>
+          </p:cNvPr>
+          <p:cNvSpPr/>
+          <p:nvPr/>
+        </p:nvSpPr>
+        <p:spPr>
+          <a:xfrm>
+            <a:off x="98961" y="275503"/>
+            <a:ext cx="3690882" cy="369332"/>
+          </a:xfrm>
+          <a:prstGeom prst="rect">
+            <a:avLst/>
+          </a:prstGeom>
+        </p:spPr>
+        <p:txBody>
+          <a:bodyPr wrap="none">
+            <a:spAutoFit/>
+          </a:bodyPr>
+          <a:lstStyle/>
+          <a:p>
+            <a:pPr marL="342900" indent="-342900">
+              <a:buFont typeface="+mj-lt"/>
+              <a:buAutoNum type="arabicPeriod" startAt="2"/>
+            </a:pPr>
+            <a:r>
+              <a:rPr lang="en-GB" dirty="0"/>
+              <a:t>Unfolded allele frequency spectra</a:t>
+            </a:r>
+          </a:p>
+        </p:txBody>
+      </p:sp>
+      <p:sp>
+        <p:nvSpPr>
+          <p:cNvPr id="5" name="TextBox 4">
+            <a:extLst>
+              <a:ext uri="{FF2B5EF4-FFF2-40B4-BE49-F238E27FC236}">
+                <a16:creationId xmlns:a16="http://schemas.microsoft.com/office/drawing/2014/main" id="{9ED01C18-0218-964D-8162-8D752E008B02}"/>
+              </a:ext>
+            </a:extLst>
+          </p:cNvPr>
+          <p:cNvSpPr txBox="1"/>
+          <p:nvPr/>
+        </p:nvSpPr>
+        <p:spPr>
+          <a:xfrm>
+            <a:off x="526472" y="5902907"/>
+            <a:ext cx="5482441" cy="338554"/>
+          </a:xfrm>
+          <a:prstGeom prst="rect">
+            <a:avLst/>
+          </a:prstGeom>
+          <a:noFill/>
+        </p:spPr>
+        <p:txBody>
+          <a:bodyPr wrap="square" rtlCol="0">
+            <a:spAutoFit/>
+          </a:bodyPr>
+          <a:lstStyle/>
+          <a:p>
+            <a:r>
+              <a:rPr lang="en-GB" sz="1600" dirty="0"/>
+              <a:t>Tajima’s D &lt; 0: excess of low frequencies</a:t>
+            </a:r>
+          </a:p>
+        </p:txBody>
+      </p:sp>
+      <p:sp>
+        <p:nvSpPr>
+          <p:cNvPr id="6" name="TextBox 5">
+            <a:extLst>
+              <a:ext uri="{FF2B5EF4-FFF2-40B4-BE49-F238E27FC236}">
+                <a16:creationId xmlns:a16="http://schemas.microsoft.com/office/drawing/2014/main" id="{74C91CC6-E24F-FA4A-8DC9-FE1969E7996C}"/>
+              </a:ext>
+            </a:extLst>
+          </p:cNvPr>
+          <p:cNvSpPr txBox="1"/>
+          <p:nvPr/>
+        </p:nvSpPr>
+        <p:spPr>
+          <a:xfrm>
+            <a:off x="526473" y="6354169"/>
+            <a:ext cx="6158789" cy="338554"/>
+          </a:xfrm>
+          <a:prstGeom prst="rect">
+            <a:avLst/>
+          </a:prstGeom>
+          <a:noFill/>
+        </p:spPr>
+        <p:txBody>
+          <a:bodyPr wrap="square" rtlCol="0">
+            <a:spAutoFit/>
+          </a:bodyPr>
+          <a:lstStyle/>
+          <a:p>
+            <a:r>
+              <a:rPr lang="en-GB" sz="1600" dirty="0"/>
+              <a:t>Fay and Wu’s H &gt; 0: </a:t>
+            </a:r>
+            <a:r>
+              <a:rPr lang="en-US" sz="1600" dirty="0"/>
+              <a:t>deficit of moderate- and high-frequencies</a:t>
+            </a:r>
+            <a:endParaRPr lang="en-GB" sz="1600" dirty="0"/>
+          </a:p>
+        </p:txBody>
+      </p:sp>
+      <p:sp>
+        <p:nvSpPr>
+          <p:cNvPr id="9" name="TextBox 8">
+            <a:extLst>
+              <a:ext uri="{FF2B5EF4-FFF2-40B4-BE49-F238E27FC236}">
+                <a16:creationId xmlns:a16="http://schemas.microsoft.com/office/drawing/2014/main" id="{B8231511-EDB9-C849-9121-E13296C549C7}"/>
+              </a:ext>
+            </a:extLst>
+          </p:cNvPr>
+          <p:cNvSpPr txBox="1"/>
+          <p:nvPr/>
+        </p:nvSpPr>
+        <p:spPr>
+          <a:xfrm>
+            <a:off x="526472" y="757050"/>
+            <a:ext cx="2248244" cy="369332"/>
+          </a:xfrm>
+          <a:prstGeom prst="rect">
+            <a:avLst/>
+          </a:prstGeom>
+          <a:noFill/>
+        </p:spPr>
+        <p:txBody>
+          <a:bodyPr wrap="none" rtlCol="0">
+            <a:spAutoFit/>
+          </a:bodyPr>
+          <a:lstStyle/>
+          <a:p>
+            <a:r>
+              <a:rPr lang="en-GB" dirty="0"/>
+              <a:t>A way to summarise...</a:t>
+            </a:r>
+          </a:p>
+        </p:txBody>
+      </p:sp>
     </p:spTree>
     <p:extLst>
       <p:ext uri="{BB962C8B-B14F-4D97-AF65-F5344CB8AC3E}">
-        <p14:creationId xmlns:p14="http://schemas.microsoft.com/office/powerpoint/2010/main" val="742288082"/>
+        <p14:creationId xmlns:p14="http://schemas.microsoft.com/office/powerpoint/2010/main" val="1589510583"/>
       </p:ext>
     </p:extLst>
   </p:cSld>
@@ -14729,40 +15384,802 @@
           <a:chExt cx="0" cy="0"/>
         </a:xfrm>
       </p:grpSpPr>
-      <p:pic>
-        <p:nvPicPr>
-          <p:cNvPr id="5" name="Picture 4">
-            <a:extLst>
-              <a:ext uri="{FF2B5EF4-FFF2-40B4-BE49-F238E27FC236}">
-                <a16:creationId xmlns:a16="http://schemas.microsoft.com/office/drawing/2014/main" id="{D7DE543E-CD5C-5344-8FB2-CAC51D1C301A}"/>
-              </a:ext>
-            </a:extLst>
-          </p:cNvPr>
-          <p:cNvPicPr>
-            <a:picLocks noChangeAspect="1"/>
-          </p:cNvPicPr>
+      <p:graphicFrame>
+        <p:nvGraphicFramePr>
+          <p:cNvPr id="2" name="Table 7">
+            <a:extLst>
+              <a:ext uri="{FF2B5EF4-FFF2-40B4-BE49-F238E27FC236}">
+                <a16:creationId xmlns:a16="http://schemas.microsoft.com/office/drawing/2014/main" id="{D9AAF6CB-8289-CE45-91AB-4B204446718D}"/>
+              </a:ext>
+            </a:extLst>
+          </p:cNvPr>
+          <p:cNvGraphicFramePr>
+            <a:graphicFrameLocks noGrp="1"/>
+          </p:cNvGraphicFramePr>
+          <p:nvPr>
+            <p:extLst>
+              <p:ext uri="{D42A27DB-BD31-4B8C-83A1-F6EECF244321}">
+                <p14:modId xmlns:p14="http://schemas.microsoft.com/office/powerpoint/2010/main" val="2955853157"/>
+              </p:ext>
+            </p:extLst>
+          </p:nvPr>
+        </p:nvGraphicFramePr>
+        <p:xfrm>
+          <a:off x="6972135" y="1238597"/>
+          <a:ext cx="3780000" cy="4536000"/>
+        </p:xfrm>
+        <a:graphic>
+          <a:graphicData uri="http://schemas.openxmlformats.org/drawingml/2006/table">
+            <a:tbl>
+              <a:tblPr>
+                <a:tableStyleId>{5C22544A-7EE6-4342-B048-85BDC9FD1C3A}</a:tableStyleId>
+              </a:tblPr>
+              <a:tblGrid>
+                <a:gridCol w="630000">
+                  <a:extLst>
+                    <a:ext uri="{9D8B030D-6E8A-4147-A177-3AD203B41FA5}">
+                      <a16:colId xmlns:a16="http://schemas.microsoft.com/office/drawing/2014/main" val="936314970"/>
+                    </a:ext>
+                  </a:extLst>
+                </a:gridCol>
+                <a:gridCol w="630000">
+                  <a:extLst>
+                    <a:ext uri="{9D8B030D-6E8A-4147-A177-3AD203B41FA5}">
+                      <a16:colId xmlns:a16="http://schemas.microsoft.com/office/drawing/2014/main" val="168546823"/>
+                    </a:ext>
+                  </a:extLst>
+                </a:gridCol>
+                <a:gridCol w="630000">
+                  <a:extLst>
+                    <a:ext uri="{9D8B030D-6E8A-4147-A177-3AD203B41FA5}">
+                      <a16:colId xmlns:a16="http://schemas.microsoft.com/office/drawing/2014/main" val="744904588"/>
+                    </a:ext>
+                  </a:extLst>
+                </a:gridCol>
+                <a:gridCol w="630000">
+                  <a:extLst>
+                    <a:ext uri="{9D8B030D-6E8A-4147-A177-3AD203B41FA5}">
+                      <a16:colId xmlns:a16="http://schemas.microsoft.com/office/drawing/2014/main" val="2944584992"/>
+                    </a:ext>
+                  </a:extLst>
+                </a:gridCol>
+                <a:gridCol w="630000">
+                  <a:extLst>
+                    <a:ext uri="{9D8B030D-6E8A-4147-A177-3AD203B41FA5}">
+                      <a16:colId xmlns:a16="http://schemas.microsoft.com/office/drawing/2014/main" val="2722547086"/>
+                    </a:ext>
+                  </a:extLst>
+                </a:gridCol>
+                <a:gridCol w="630000">
+                  <a:extLst>
+                    <a:ext uri="{9D8B030D-6E8A-4147-A177-3AD203B41FA5}">
+                      <a16:colId xmlns:a16="http://schemas.microsoft.com/office/drawing/2014/main" val="2255470262"/>
+                    </a:ext>
+                  </a:extLst>
+                </a:gridCol>
+              </a:tblGrid>
+              <a:tr h="756000">
+                <a:tc gridSpan="6">
+                  <a:txBody>
+                    <a:bodyPr/>
+                    <a:lstStyle/>
+                    <a:p>
+                      <a:pPr algn="ctr"/>
+                      <a:r>
+                        <a:rPr lang="en-GB" sz="1200" dirty="0"/>
+                        <a:t>SNPs</a:t>
+                      </a:r>
+                    </a:p>
+                  </a:txBody>
+                  <a:tcPr marL="94128" marR="94128" marT="47064" marB="47064" anchor="ctr"/>
+                </a:tc>
+                <a:tc hMerge="1">
+                  <a:txBody>
+                    <a:bodyPr/>
+                    <a:lstStyle/>
+                    <a:p>
+                      <a:endParaRPr lang="en-GB" sz="1200" dirty="0"/>
+                    </a:p>
+                  </a:txBody>
+                  <a:tcPr marL="94128" marR="94128" marT="47064" marB="47064"/>
+                </a:tc>
+                <a:tc hMerge="1">
+                  <a:txBody>
+                    <a:bodyPr/>
+                    <a:lstStyle/>
+                    <a:p>
+                      <a:endParaRPr lang="en-GB" sz="1200" dirty="0"/>
+                    </a:p>
+                  </a:txBody>
+                  <a:tcPr marL="94128" marR="94128" marT="47064" marB="47064"/>
+                </a:tc>
+                <a:tc hMerge="1">
+                  <a:txBody>
+                    <a:bodyPr/>
+                    <a:lstStyle/>
+                    <a:p>
+                      <a:endParaRPr lang="en-GB" sz="1200" dirty="0"/>
+                    </a:p>
+                  </a:txBody>
+                  <a:tcPr marL="94128" marR="94128" marT="47064" marB="47064"/>
+                </a:tc>
+                <a:tc hMerge="1">
+                  <a:txBody>
+                    <a:bodyPr/>
+                    <a:lstStyle/>
+                    <a:p>
+                      <a:endParaRPr lang="en-GB" sz="1200" dirty="0"/>
+                    </a:p>
+                  </a:txBody>
+                  <a:tcPr marL="94128" marR="94128" marT="47064" marB="47064"/>
+                </a:tc>
+                <a:tc hMerge="1">
+                  <a:txBody>
+                    <a:bodyPr/>
+                    <a:lstStyle/>
+                    <a:p>
+                      <a:endParaRPr lang="en-GB" sz="1200" dirty="0"/>
+                    </a:p>
+                  </a:txBody>
+                  <a:tcPr marL="94128" marR="94128" marT="47064" marB="47064"/>
+                </a:tc>
+                <a:extLst>
+                  <a:ext uri="{0D108BD9-81ED-4DB2-BD59-A6C34878D82A}">
+                    <a16:rowId xmlns:a16="http://schemas.microsoft.com/office/drawing/2014/main" val="2312340407"/>
+                  </a:ext>
+                </a:extLst>
+              </a:tr>
+              <a:tr h="756000">
+                <a:tc rowSpan="5">
+                  <a:txBody>
+                    <a:bodyPr/>
+                    <a:lstStyle/>
+                    <a:p>
+                      <a:pPr algn="ctr"/>
+                      <a:r>
+                        <a:rPr lang="en-GB" sz="1200" dirty="0"/>
+                        <a:t>INDELs</a:t>
+                      </a:r>
+                    </a:p>
+                  </a:txBody>
+                  <a:tcPr marL="94128" marR="94128" marT="47064" marB="47064" vert="vert270" anchor="ctr"/>
+                </a:tc>
+                <a:tc>
+                  <a:txBody>
+                    <a:bodyPr/>
+                    <a:lstStyle/>
+                    <a:p>
+                      <a:r>
+                        <a:rPr lang="en-GB" sz="1200" dirty="0"/>
+                        <a:t>D,H</a:t>
+                      </a:r>
+                    </a:p>
+                  </a:txBody>
+                  <a:tcPr marL="94128" marR="94128" marT="47064" marB="47064" anchor="ctr"/>
+                </a:tc>
+                <a:tc>
+                  <a:txBody>
+                    <a:bodyPr/>
+                    <a:lstStyle/>
+                    <a:p>
+                      <a:r>
+                        <a:rPr lang="en-GB" sz="1200" dirty="0"/>
+                        <a:t>All</a:t>
+                      </a:r>
+                    </a:p>
+                  </a:txBody>
+                  <a:tcPr marL="94128" marR="94128" marT="47064" marB="47064" anchor="ctr"/>
+                </a:tc>
+                <a:tc>
+                  <a:txBody>
+                    <a:bodyPr/>
+                    <a:lstStyle/>
+                    <a:p>
+                      <a:r>
+                        <a:rPr lang="en-GB" sz="1200" dirty="0"/>
+                        <a:t>Non-coding</a:t>
+                      </a:r>
+                    </a:p>
+                  </a:txBody>
+                  <a:tcPr marL="94128" marR="94128" marT="47064" marB="47064" anchor="ctr"/>
+                </a:tc>
+                <a:tc>
+                  <a:txBody>
+                    <a:bodyPr/>
+                    <a:lstStyle/>
+                    <a:p>
+                      <a:r>
+                        <a:rPr lang="en-GB" sz="1200" dirty="0"/>
+                        <a:t>Coding</a:t>
+                      </a:r>
+                    </a:p>
+                  </a:txBody>
+                  <a:tcPr marL="94128" marR="94128" marT="47064" marB="47064" anchor="ctr"/>
+                </a:tc>
+                <a:tc>
+                  <a:txBody>
+                    <a:bodyPr/>
+                    <a:lstStyle/>
+                    <a:p>
+                      <a:r>
+                        <a:rPr lang="en-GB" sz="1200" dirty="0"/>
+                        <a:t>Non-synonymous</a:t>
+                      </a:r>
+                    </a:p>
+                  </a:txBody>
+                  <a:tcPr marL="94128" marR="94128" marT="47064" marB="47064" anchor="ctr"/>
+                </a:tc>
+                <a:extLst>
+                  <a:ext uri="{0D108BD9-81ED-4DB2-BD59-A6C34878D82A}">
+                    <a16:rowId xmlns:a16="http://schemas.microsoft.com/office/drawing/2014/main" val="1784954504"/>
+                  </a:ext>
+                </a:extLst>
+              </a:tr>
+              <a:tr h="756000">
+                <a:tc vMerge="1">
+                  <a:txBody>
+                    <a:bodyPr/>
+                    <a:lstStyle/>
+                    <a:p>
+                      <a:endParaRPr lang="en-GB" sz="1200" dirty="0"/>
+                    </a:p>
+                  </a:txBody>
+                  <a:tcPr marL="94128" marR="94128" marT="47064" marB="47064"/>
+                </a:tc>
+                <a:tc>
+                  <a:txBody>
+                    <a:bodyPr/>
+                    <a:lstStyle/>
+                    <a:p>
+                      <a:r>
+                        <a:rPr lang="en-GB" sz="1200" dirty="0"/>
+                        <a:t>All</a:t>
+                      </a:r>
+                    </a:p>
+                  </a:txBody>
+                  <a:tcPr marL="94128" marR="94128" marT="47064" marB="47064" anchor="ctr"/>
+                </a:tc>
+                <a:tc>
+                  <a:txBody>
+                    <a:bodyPr/>
+                    <a:lstStyle/>
+                    <a:p>
+                      <a:r>
+                        <a:rPr lang="en-GB" sz="1800" dirty="0"/>
+                        <a:t>*,</a:t>
+                      </a:r>
+                    </a:p>
+                  </a:txBody>
+                  <a:tcPr marL="94128" marR="94128" marT="47064" marB="47064" anchor="ctr"/>
+                </a:tc>
+                <a:tc>
+                  <a:txBody>
+                    <a:bodyPr/>
+                    <a:lstStyle/>
+                    <a:p>
+                      <a:endParaRPr lang="en-GB" sz="1800" dirty="0"/>
+                    </a:p>
+                  </a:txBody>
+                  <a:tcPr marL="94128" marR="94128" marT="47064" marB="47064" anchor="ctr"/>
+                </a:tc>
+                <a:tc>
+                  <a:txBody>
+                    <a:bodyPr/>
+                    <a:lstStyle/>
+                    <a:p>
+                      <a:endParaRPr lang="en-GB" sz="1800" dirty="0"/>
+                    </a:p>
+                  </a:txBody>
+                  <a:tcPr marL="94128" marR="94128" marT="47064" marB="47064" anchor="ctr"/>
+                </a:tc>
+                <a:tc>
+                  <a:txBody>
+                    <a:bodyPr/>
+                    <a:lstStyle/>
+                    <a:p>
+                      <a:endParaRPr lang="en-GB" sz="1800"/>
+                    </a:p>
+                  </a:txBody>
+                  <a:tcPr marL="94128" marR="94128" marT="47064" marB="47064" anchor="ctr"/>
+                </a:tc>
+                <a:extLst>
+                  <a:ext uri="{0D108BD9-81ED-4DB2-BD59-A6C34878D82A}">
+                    <a16:rowId xmlns:a16="http://schemas.microsoft.com/office/drawing/2014/main" val="4229002189"/>
+                  </a:ext>
+                </a:extLst>
+              </a:tr>
+              <a:tr h="756000">
+                <a:tc vMerge="1">
+                  <a:txBody>
+                    <a:bodyPr/>
+                    <a:lstStyle/>
+                    <a:p>
+                      <a:pPr marL="0" marR="0" lvl="0" indent="0" algn="l" defTabSz="914400" rtl="0" eaLnBrk="1" fontAlgn="auto" latinLnBrk="0" hangingPunct="1">
+                        <a:lnSpc>
+                          <a:spcPct val="100000"/>
+                        </a:lnSpc>
+                        <a:spcBef>
+                          <a:spcPts val="0"/>
+                        </a:spcBef>
+                        <a:spcAft>
+                          <a:spcPts val="0"/>
+                        </a:spcAft>
+                        <a:buClrTx/>
+                        <a:buSzTx/>
+                        <a:buFontTx/>
+                        <a:buNone/>
+                        <a:tabLst/>
+                        <a:defRPr/>
+                      </a:pPr>
+                      <a:endParaRPr lang="en-GB" sz="1200" dirty="0"/>
+                    </a:p>
+                  </a:txBody>
+                  <a:tcPr marL="94128" marR="94128" marT="47064" marB="47064"/>
+                </a:tc>
+                <a:tc>
+                  <a:txBody>
+                    <a:bodyPr/>
+                    <a:lstStyle/>
+                    <a:p>
+                      <a:pPr marL="0" marR="0" lvl="0" indent="0" algn="l" defTabSz="914400" rtl="0" eaLnBrk="1" fontAlgn="auto" latinLnBrk="0" hangingPunct="1">
+                        <a:lnSpc>
+                          <a:spcPct val="100000"/>
+                        </a:lnSpc>
+                        <a:spcBef>
+                          <a:spcPts val="0"/>
+                        </a:spcBef>
+                        <a:spcAft>
+                          <a:spcPts val="0"/>
+                        </a:spcAft>
+                        <a:buClrTx/>
+                        <a:buSzTx/>
+                        <a:buFontTx/>
+                        <a:buNone/>
+                        <a:tabLst/>
+                        <a:defRPr/>
+                      </a:pPr>
+                      <a:r>
+                        <a:rPr lang="en-GB" sz="1200" dirty="0"/>
+                        <a:t>Non-coding</a:t>
+                      </a:r>
+                    </a:p>
+                  </a:txBody>
+                  <a:tcPr marL="94128" marR="94128" marT="47064" marB="47064" anchor="ctr"/>
+                </a:tc>
+                <a:tc>
+                  <a:txBody>
+                    <a:bodyPr/>
+                    <a:lstStyle/>
+                    <a:p>
+                      <a:endParaRPr lang="en-GB" sz="1800" dirty="0"/>
+                    </a:p>
+                  </a:txBody>
+                  <a:tcPr marL="94128" marR="94128" marT="47064" marB="47064" anchor="ctr"/>
+                </a:tc>
+                <a:tc>
+                  <a:txBody>
+                    <a:bodyPr/>
+                    <a:lstStyle/>
+                    <a:p>
+                      <a:r>
+                        <a:rPr lang="en-GB" sz="1800" dirty="0"/>
+                        <a:t>*,</a:t>
+                      </a:r>
+                    </a:p>
+                  </a:txBody>
+                  <a:tcPr marL="94128" marR="94128" marT="47064" marB="47064" anchor="ctr"/>
+                </a:tc>
+                <a:tc>
+                  <a:txBody>
+                    <a:bodyPr/>
+                    <a:lstStyle/>
+                    <a:p>
+                      <a:endParaRPr lang="en-GB" sz="1800" dirty="0"/>
+                    </a:p>
+                  </a:txBody>
+                  <a:tcPr marL="94128" marR="94128" marT="47064" marB="47064" anchor="ctr"/>
+                </a:tc>
+                <a:tc>
+                  <a:txBody>
+                    <a:bodyPr/>
+                    <a:lstStyle/>
+                    <a:p>
+                      <a:endParaRPr lang="en-GB" sz="1800" dirty="0"/>
+                    </a:p>
+                  </a:txBody>
+                  <a:tcPr marL="94128" marR="94128" marT="47064" marB="47064" anchor="ctr"/>
+                </a:tc>
+                <a:extLst>
+                  <a:ext uri="{0D108BD9-81ED-4DB2-BD59-A6C34878D82A}">
+                    <a16:rowId xmlns:a16="http://schemas.microsoft.com/office/drawing/2014/main" val="2347989587"/>
+                  </a:ext>
+                </a:extLst>
+              </a:tr>
+              <a:tr h="756000">
+                <a:tc vMerge="1">
+                  <a:txBody>
+                    <a:bodyPr/>
+                    <a:lstStyle/>
+                    <a:p>
+                      <a:endParaRPr lang="en-GB" sz="1200" dirty="0"/>
+                    </a:p>
+                  </a:txBody>
+                  <a:tcPr marL="94128" marR="94128" marT="47064" marB="47064"/>
+                </a:tc>
+                <a:tc>
+                  <a:txBody>
+                    <a:bodyPr/>
+                    <a:lstStyle/>
+                    <a:p>
+                      <a:r>
+                        <a:rPr lang="en-GB" sz="1200" dirty="0"/>
+                        <a:t>Coding</a:t>
+                      </a:r>
+                    </a:p>
+                  </a:txBody>
+                  <a:tcPr marL="94128" marR="94128" marT="47064" marB="47064" anchor="ctr"/>
+                </a:tc>
+                <a:tc>
+                  <a:txBody>
+                    <a:bodyPr/>
+                    <a:lstStyle/>
+                    <a:p>
+                      <a:endParaRPr lang="en-GB" sz="1800"/>
+                    </a:p>
+                  </a:txBody>
+                  <a:tcPr marL="94128" marR="94128" marT="47064" marB="47064" anchor="ctr"/>
+                </a:tc>
+                <a:tc>
+                  <a:txBody>
+                    <a:bodyPr/>
+                    <a:lstStyle/>
+                    <a:p>
+                      <a:endParaRPr lang="en-GB" sz="1800" dirty="0"/>
+                    </a:p>
+                  </a:txBody>
+                  <a:tcPr marL="94128" marR="94128" marT="47064" marB="47064" anchor="ctr"/>
+                </a:tc>
+                <a:tc>
+                  <a:txBody>
+                    <a:bodyPr/>
+                    <a:lstStyle/>
+                    <a:p>
+                      <a:r>
+                        <a:rPr lang="en-GB" sz="1800" dirty="0"/>
+                        <a:t>*, *</a:t>
+                      </a:r>
+                    </a:p>
+                  </a:txBody>
+                  <a:tcPr marL="94128" marR="94128" marT="47064" marB="47064" anchor="ctr"/>
+                </a:tc>
+                <a:tc>
+                  <a:txBody>
+                    <a:bodyPr/>
+                    <a:lstStyle/>
+                    <a:p>
+                      <a:endParaRPr lang="en-GB" sz="1800" dirty="0"/>
+                    </a:p>
+                  </a:txBody>
+                  <a:tcPr marL="94128" marR="94128" marT="47064" marB="47064" anchor="ctr"/>
+                </a:tc>
+                <a:extLst>
+                  <a:ext uri="{0D108BD9-81ED-4DB2-BD59-A6C34878D82A}">
+                    <a16:rowId xmlns:a16="http://schemas.microsoft.com/office/drawing/2014/main" val="651276409"/>
+                  </a:ext>
+                </a:extLst>
+              </a:tr>
+              <a:tr h="756000">
+                <a:tc vMerge="1">
+                  <a:txBody>
+                    <a:bodyPr/>
+                    <a:lstStyle/>
+                    <a:p>
+                      <a:endParaRPr lang="en-GB" sz="1200" dirty="0"/>
+                    </a:p>
+                  </a:txBody>
+                  <a:tcPr marL="94128" marR="94128" marT="47064" marB="47064"/>
+                </a:tc>
+                <a:tc>
+                  <a:txBody>
+                    <a:bodyPr/>
+                    <a:lstStyle/>
+                    <a:p>
+                      <a:r>
+                        <a:rPr lang="en-GB" sz="1200" dirty="0"/>
+                        <a:t>Non-synonymous</a:t>
+                      </a:r>
+                    </a:p>
+                  </a:txBody>
+                  <a:tcPr marL="94128" marR="94128" marT="47064" marB="47064" anchor="ctr"/>
+                </a:tc>
+                <a:tc>
+                  <a:txBody>
+                    <a:bodyPr/>
+                    <a:lstStyle/>
+                    <a:p>
+                      <a:endParaRPr lang="en-GB" sz="1800"/>
+                    </a:p>
+                  </a:txBody>
+                  <a:tcPr marL="94128" marR="94128" marT="47064" marB="47064" anchor="ctr"/>
+                </a:tc>
+                <a:tc>
+                  <a:txBody>
+                    <a:bodyPr/>
+                    <a:lstStyle/>
+                    <a:p>
+                      <a:endParaRPr lang="en-GB" sz="1800" dirty="0"/>
+                    </a:p>
+                  </a:txBody>
+                  <a:tcPr marL="94128" marR="94128" marT="47064" marB="47064" anchor="ctr"/>
+                </a:tc>
+                <a:tc>
+                  <a:txBody>
+                    <a:bodyPr/>
+                    <a:lstStyle/>
+                    <a:p>
+                      <a:endParaRPr lang="en-GB" sz="1800" dirty="0"/>
+                    </a:p>
+                  </a:txBody>
+                  <a:tcPr marL="94128" marR="94128" marT="47064" marB="47064" anchor="ctr"/>
+                </a:tc>
+                <a:tc>
+                  <a:txBody>
+                    <a:bodyPr/>
+                    <a:lstStyle/>
+                    <a:p>
+                      <a:r>
+                        <a:rPr lang="en-GB" sz="1800" dirty="0"/>
+                        <a:t>*, *</a:t>
+                      </a:r>
+                    </a:p>
+                  </a:txBody>
+                  <a:tcPr marL="94128" marR="94128" marT="47064" marB="47064" anchor="ctr"/>
+                </a:tc>
+                <a:extLst>
+                  <a:ext uri="{0D108BD9-81ED-4DB2-BD59-A6C34878D82A}">
+                    <a16:rowId xmlns:a16="http://schemas.microsoft.com/office/drawing/2014/main" val="2416166948"/>
+                  </a:ext>
+                </a:extLst>
+              </a:tr>
+            </a:tbl>
+          </a:graphicData>
+        </a:graphic>
+      </p:graphicFrame>
+      <p:sp>
+        <p:nvSpPr>
+          <p:cNvPr id="3" name="TextBox 2">
+            <a:extLst>
+              <a:ext uri="{FF2B5EF4-FFF2-40B4-BE49-F238E27FC236}">
+                <a16:creationId xmlns:a16="http://schemas.microsoft.com/office/drawing/2014/main" id="{72E14865-E1FA-5249-8311-5210EAE21CD3}"/>
+              </a:ext>
+            </a:extLst>
+          </p:cNvPr>
+          <p:cNvSpPr txBox="1"/>
           <p:nvPr/>
-        </p:nvPicPr>
-        <p:blipFill>
-          <a:blip r:embed="rId2"/>
-          <a:stretch>
-            <a:fillRect/>
-          </a:stretch>
-        </p:blipFill>
+        </p:nvSpPr>
         <p:spPr>
           <a:xfrm>
-            <a:off x="1524000" y="228600"/>
-            <a:ext cx="9144000" cy="6400800"/>
+            <a:off x="665018" y="3059668"/>
+            <a:ext cx="3922805" cy="369332"/>
+          </a:xfrm>
+          <a:prstGeom prst="rect">
+            <a:avLst/>
+          </a:prstGeom>
+          <a:noFill/>
+        </p:spPr>
+        <p:txBody>
+          <a:bodyPr wrap="none" rtlCol="0">
+            <a:spAutoFit/>
+          </a:bodyPr>
+          <a:lstStyle/>
+          <a:p>
+            <a:r>
+              <a:rPr lang="en-GB" dirty="0"/>
+              <a:t>* = slope is significantly different from 0</a:t>
+            </a:r>
+          </a:p>
+        </p:txBody>
+      </p:sp>
+      <p:sp>
+        <p:nvSpPr>
+          <p:cNvPr id="5" name="Rectangle 4">
+            <a:extLst>
+              <a:ext uri="{FF2B5EF4-FFF2-40B4-BE49-F238E27FC236}">
+                <a16:creationId xmlns:a16="http://schemas.microsoft.com/office/drawing/2014/main" id="{7806A448-4E32-4E40-B3AF-E68C781DE72E}"/>
+              </a:ext>
+            </a:extLst>
+          </p:cNvPr>
+          <p:cNvSpPr/>
+          <p:nvPr/>
+        </p:nvSpPr>
+        <p:spPr>
+          <a:xfrm>
+            <a:off x="98961" y="275503"/>
+            <a:ext cx="3690882" cy="369332"/>
           </a:xfrm>
           <a:prstGeom prst="rect">
             <a:avLst/>
           </a:prstGeom>
         </p:spPr>
-      </p:pic>
+        <p:txBody>
+          <a:bodyPr wrap="none">
+            <a:spAutoFit/>
+          </a:bodyPr>
+          <a:lstStyle/>
+          <a:p>
+            <a:pPr marL="342900" indent="-342900">
+              <a:buFont typeface="+mj-lt"/>
+              <a:buAutoNum type="arabicPeriod" startAt="2"/>
+            </a:pPr>
+            <a:r>
+              <a:rPr lang="en-GB" dirty="0"/>
+              <a:t>Unfolded allele frequency spectra</a:t>
+            </a:r>
+          </a:p>
+        </p:txBody>
+      </p:sp>
+      <p:sp>
+        <p:nvSpPr>
+          <p:cNvPr id="6" name="TextBox 5">
+            <a:extLst>
+              <a:ext uri="{FF2B5EF4-FFF2-40B4-BE49-F238E27FC236}">
+                <a16:creationId xmlns:a16="http://schemas.microsoft.com/office/drawing/2014/main" id="{39AD158E-AFC2-F541-A5E7-B59349822E8C}"/>
+              </a:ext>
+            </a:extLst>
+          </p:cNvPr>
+          <p:cNvSpPr txBox="1"/>
+          <p:nvPr/>
+        </p:nvSpPr>
+        <p:spPr>
+          <a:xfrm>
+            <a:off x="526472" y="757050"/>
+            <a:ext cx="3876189" cy="369332"/>
+          </a:xfrm>
+          <a:prstGeom prst="rect">
+            <a:avLst/>
+          </a:prstGeom>
+          <a:noFill/>
+        </p:spPr>
+        <p:txBody>
+          <a:bodyPr wrap="none" rtlCol="0">
+            <a:spAutoFit/>
+          </a:bodyPr>
+          <a:lstStyle/>
+          <a:p>
+            <a:r>
+              <a:rPr lang="en-GB" dirty="0"/>
+              <a:t>... And test for similarity of the patterns</a:t>
+            </a:r>
+          </a:p>
+        </p:txBody>
+      </p:sp>
+      <p:sp>
+        <p:nvSpPr>
+          <p:cNvPr id="7" name="TextBox 6">
+            <a:extLst>
+              <a:ext uri="{FF2B5EF4-FFF2-40B4-BE49-F238E27FC236}">
+                <a16:creationId xmlns:a16="http://schemas.microsoft.com/office/drawing/2014/main" id="{826E5C6E-BFB0-B043-97C4-61467C6148AA}"/>
+              </a:ext>
+            </a:extLst>
+          </p:cNvPr>
+          <p:cNvSpPr txBox="1"/>
+          <p:nvPr/>
+        </p:nvSpPr>
+        <p:spPr>
+          <a:xfrm>
+            <a:off x="665018" y="1638795"/>
+            <a:ext cx="5193538" cy="923330"/>
+          </a:xfrm>
+          <a:prstGeom prst="rect">
+            <a:avLst/>
+          </a:prstGeom>
+          <a:noFill/>
+        </p:spPr>
+        <p:txBody>
+          <a:bodyPr wrap="none" rtlCol="0">
+            <a:spAutoFit/>
+          </a:bodyPr>
+          <a:lstStyle/>
+          <a:p>
+            <a:r>
+              <a:rPr lang="en-GB" dirty="0"/>
+              <a:t>One linear model for each of the four category where</a:t>
+            </a:r>
+          </a:p>
+          <a:p>
+            <a:r>
+              <a:rPr lang="en-GB" dirty="0"/>
+              <a:t>y = D or H</a:t>
+            </a:r>
+          </a:p>
+          <a:p>
+            <a:r>
+              <a:rPr lang="en-GB" dirty="0"/>
+              <a:t>x = factor with two levels, INDELs and SNPs</a:t>
+            </a:r>
+          </a:p>
+        </p:txBody>
+      </p:sp>
+      <p:cxnSp>
+        <p:nvCxnSpPr>
+          <p:cNvPr id="10" name="Straight Arrow Connector 9">
+            <a:extLst>
+              <a:ext uri="{FF2B5EF4-FFF2-40B4-BE49-F238E27FC236}">
+                <a16:creationId xmlns:a16="http://schemas.microsoft.com/office/drawing/2014/main" id="{4A5515D1-B0B6-AF4C-8746-2E7308FC7BE9}"/>
+              </a:ext>
+            </a:extLst>
+          </p:cNvPr>
+          <p:cNvCxnSpPr>
+            <a:stCxn id="3" idx="2"/>
+          </p:cNvCxnSpPr>
+          <p:nvPr/>
+        </p:nvCxnSpPr>
+        <p:spPr>
+          <a:xfrm flipH="1">
+            <a:off x="2576945" y="3429000"/>
+            <a:ext cx="0" cy="703613"/>
+          </a:xfrm>
+          <a:prstGeom prst="straightConnector1">
+            <a:avLst/>
+          </a:prstGeom>
+          <a:ln w="28575">
+            <a:tailEnd type="triangle"/>
+          </a:ln>
+        </p:spPr>
+        <p:style>
+          <a:lnRef idx="1">
+            <a:schemeClr val="dk1"/>
+          </a:lnRef>
+          <a:fillRef idx="0">
+            <a:schemeClr val="dk1"/>
+          </a:fillRef>
+          <a:effectRef idx="0">
+            <a:schemeClr val="dk1"/>
+          </a:effectRef>
+          <a:fontRef idx="minor">
+            <a:schemeClr val="tx1"/>
+          </a:fontRef>
+        </p:style>
+      </p:cxnSp>
+      <p:sp>
+        <p:nvSpPr>
+          <p:cNvPr id="11" name="TextBox 10">
+            <a:extLst>
+              <a:ext uri="{FF2B5EF4-FFF2-40B4-BE49-F238E27FC236}">
+                <a16:creationId xmlns:a16="http://schemas.microsoft.com/office/drawing/2014/main" id="{4FD1BEF3-5A68-AA44-943C-1D85386394EA}"/>
+              </a:ext>
+            </a:extLst>
+          </p:cNvPr>
+          <p:cNvSpPr txBox="1"/>
+          <p:nvPr/>
+        </p:nvSpPr>
+        <p:spPr>
+          <a:xfrm>
+            <a:off x="247123" y="4152221"/>
+            <a:ext cx="5115246" cy="369332"/>
+          </a:xfrm>
+          <a:prstGeom prst="rect">
+            <a:avLst/>
+          </a:prstGeom>
+          <a:noFill/>
+        </p:spPr>
+        <p:txBody>
+          <a:bodyPr wrap="none" rtlCol="0">
+            <a:spAutoFit/>
+          </a:bodyPr>
+          <a:lstStyle/>
+          <a:p>
+            <a:r>
+              <a:rPr lang="en-GB" dirty="0"/>
+              <a:t>INDELs and SNPs differed significantly for D and/or H</a:t>
+            </a:r>
+          </a:p>
+        </p:txBody>
+      </p:sp>
     </p:spTree>
     <p:extLst>
       <p:ext uri="{BB962C8B-B14F-4D97-AF65-F5344CB8AC3E}">
-        <p14:creationId xmlns:p14="http://schemas.microsoft.com/office/powerpoint/2010/main" val="1720103837"/>
+        <p14:creationId xmlns:p14="http://schemas.microsoft.com/office/powerpoint/2010/main" val="796507323"/>
       </p:ext>
     </p:extLst>
   </p:cSld>
@@ -14789,40 +16206,391 @@
           <a:chExt cx="0" cy="0"/>
         </a:xfrm>
       </p:grpSpPr>
-      <p:pic>
-        <p:nvPicPr>
-          <p:cNvPr id="3" name="Picture 2">
-            <a:extLst>
-              <a:ext uri="{FF2B5EF4-FFF2-40B4-BE49-F238E27FC236}">
-                <a16:creationId xmlns:a16="http://schemas.microsoft.com/office/drawing/2014/main" id="{8E0FFEF7-35D0-7A41-98EA-913846E14C4A}"/>
-              </a:ext>
-            </a:extLst>
-          </p:cNvPr>
-          <p:cNvPicPr>
-            <a:picLocks noChangeAspect="1"/>
-          </p:cNvPicPr>
+      <p:sp>
+        <p:nvSpPr>
+          <p:cNvPr id="4" name="Rectangle 3">
+            <a:extLst>
+              <a:ext uri="{FF2B5EF4-FFF2-40B4-BE49-F238E27FC236}">
+                <a16:creationId xmlns:a16="http://schemas.microsoft.com/office/drawing/2014/main" id="{DC1F7A85-BFDD-2B4E-95CF-48A4E6A38BB9}"/>
+              </a:ext>
+            </a:extLst>
+          </p:cNvPr>
+          <p:cNvSpPr/>
           <p:nvPr/>
-        </p:nvPicPr>
-        <p:blipFill>
-          <a:blip r:embed="rId2"/>
-          <a:stretch>
-            <a:fillRect/>
-          </a:stretch>
-        </p:blipFill>
+        </p:nvSpPr>
         <p:spPr>
           <a:xfrm>
-            <a:off x="1524000" y="228600"/>
-            <a:ext cx="9144000" cy="6400800"/>
+            <a:off x="98961" y="275503"/>
+            <a:ext cx="6445354" cy="369332"/>
           </a:xfrm>
           <a:prstGeom prst="rect">
             <a:avLst/>
           </a:prstGeom>
         </p:spPr>
-      </p:pic>
+        <p:txBody>
+          <a:bodyPr wrap="none">
+            <a:spAutoFit/>
+          </a:bodyPr>
+          <a:lstStyle/>
+          <a:p>
+            <a:pPr marL="342900" indent="-342900">
+              <a:buFont typeface="+mj-lt"/>
+              <a:buAutoNum type="arabicPeriod" startAt="2"/>
+            </a:pPr>
+            <a:r>
+              <a:rPr lang="en-GB" dirty="0"/>
+              <a:t>Unfolded allele frequency spectra – GC-biased gene conversion</a:t>
+            </a:r>
+          </a:p>
+        </p:txBody>
+      </p:sp>
+      <p:grpSp>
+        <p:nvGrpSpPr>
+          <p:cNvPr id="14" name="Group 13">
+            <a:extLst>
+              <a:ext uri="{FF2B5EF4-FFF2-40B4-BE49-F238E27FC236}">
+                <a16:creationId xmlns:a16="http://schemas.microsoft.com/office/drawing/2014/main" id="{EC248700-F4DD-FB47-807E-90CD9DADAFA1}"/>
+              </a:ext>
+            </a:extLst>
+          </p:cNvPr>
+          <p:cNvGrpSpPr/>
+          <p:nvPr/>
+        </p:nvGrpSpPr>
+        <p:grpSpPr>
+          <a:xfrm>
+            <a:off x="4262597" y="981065"/>
+            <a:ext cx="3666806" cy="338554"/>
+            <a:chOff x="3957210" y="981065"/>
+            <a:chExt cx="3666806" cy="338554"/>
+          </a:xfrm>
+        </p:grpSpPr>
+        <p:sp>
+          <p:nvSpPr>
+            <p:cNvPr id="10" name="TextBox 9">
+              <a:extLst>
+                <a:ext uri="{FF2B5EF4-FFF2-40B4-BE49-F238E27FC236}">
+                  <a16:creationId xmlns:a16="http://schemas.microsoft.com/office/drawing/2014/main" id="{A74F0FF3-CA8A-FC45-A21B-9A9010612847}"/>
+                </a:ext>
+              </a:extLst>
+            </p:cNvPr>
+            <p:cNvSpPr txBox="1"/>
+            <p:nvPr/>
+          </p:nvSpPr>
+          <p:spPr>
+            <a:xfrm>
+              <a:off x="3957210" y="981065"/>
+              <a:ext cx="1728230" cy="338554"/>
+            </a:xfrm>
+            <a:prstGeom prst="rect">
+              <a:avLst/>
+            </a:prstGeom>
+            <a:noFill/>
+          </p:spPr>
+          <p:txBody>
+            <a:bodyPr wrap="none" rtlCol="0">
+              <a:spAutoFit/>
+            </a:bodyPr>
+            <a:lstStyle/>
+            <a:p>
+              <a:r>
+                <a:rPr lang="en-GB" sz="1600" dirty="0"/>
+                <a:t>S = Strong = G or C</a:t>
+              </a:r>
+            </a:p>
+          </p:txBody>
+        </p:sp>
+        <p:sp>
+          <p:nvSpPr>
+            <p:cNvPr id="11" name="TextBox 10">
+              <a:extLst>
+                <a:ext uri="{FF2B5EF4-FFF2-40B4-BE49-F238E27FC236}">
+                  <a16:creationId xmlns:a16="http://schemas.microsoft.com/office/drawing/2014/main" id="{3498497B-711A-AA4B-9D24-9EA32211BDAF}"/>
+                </a:ext>
+              </a:extLst>
+            </p:cNvPr>
+            <p:cNvSpPr txBox="1"/>
+            <p:nvPr/>
+          </p:nvSpPr>
+          <p:spPr>
+            <a:xfrm>
+              <a:off x="5904763" y="981065"/>
+              <a:ext cx="1719253" cy="338554"/>
+            </a:xfrm>
+            <a:prstGeom prst="rect">
+              <a:avLst/>
+            </a:prstGeom>
+            <a:noFill/>
+          </p:spPr>
+          <p:txBody>
+            <a:bodyPr wrap="none" rtlCol="0">
+              <a:spAutoFit/>
+            </a:bodyPr>
+            <a:lstStyle/>
+            <a:p>
+              <a:r>
+                <a:rPr lang="en-GB" sz="1600" dirty="0"/>
+                <a:t>W = Weak = A or T</a:t>
+              </a:r>
+            </a:p>
+          </p:txBody>
+        </p:sp>
+      </p:grpSp>
+      <p:grpSp>
+        <p:nvGrpSpPr>
+          <p:cNvPr id="15" name="Group 14">
+            <a:extLst>
+              <a:ext uri="{FF2B5EF4-FFF2-40B4-BE49-F238E27FC236}">
+                <a16:creationId xmlns:a16="http://schemas.microsoft.com/office/drawing/2014/main" id="{67ACAD1D-98FF-C147-9449-E46FCA586681}"/>
+              </a:ext>
+            </a:extLst>
+          </p:cNvPr>
+          <p:cNvGrpSpPr/>
+          <p:nvPr/>
+        </p:nvGrpSpPr>
+        <p:grpSpPr>
+          <a:xfrm>
+            <a:off x="2628422" y="1756896"/>
+            <a:ext cx="6935156" cy="340925"/>
+            <a:chOff x="2852355" y="2243785"/>
+            <a:chExt cx="6935156" cy="340925"/>
+          </a:xfrm>
+        </p:grpSpPr>
+        <p:sp>
+          <p:nvSpPr>
+            <p:cNvPr id="12" name="TextBox 11">
+              <a:extLst>
+                <a:ext uri="{FF2B5EF4-FFF2-40B4-BE49-F238E27FC236}">
+                  <a16:creationId xmlns:a16="http://schemas.microsoft.com/office/drawing/2014/main" id="{597C0115-405B-C54F-8119-7A6A75AA221C}"/>
+                </a:ext>
+              </a:extLst>
+            </p:cNvPr>
+            <p:cNvSpPr txBox="1"/>
+            <p:nvPr/>
+          </p:nvSpPr>
+          <p:spPr>
+            <a:xfrm>
+              <a:off x="6544315" y="2246156"/>
+              <a:ext cx="3243196" cy="338554"/>
+            </a:xfrm>
+            <a:prstGeom prst="rect">
+              <a:avLst/>
+            </a:prstGeom>
+            <a:noFill/>
+          </p:spPr>
+          <p:txBody>
+            <a:bodyPr wrap="none" rtlCol="0">
+              <a:spAutoFit/>
+            </a:bodyPr>
+            <a:lstStyle/>
+            <a:p>
+              <a:r>
+                <a:rPr lang="en-GB" sz="1600" dirty="0"/>
+                <a:t>SW = Strong ancestral, Weak derived</a:t>
+              </a:r>
+            </a:p>
+          </p:txBody>
+        </p:sp>
+        <p:sp>
+          <p:nvSpPr>
+            <p:cNvPr id="13" name="TextBox 12">
+              <a:extLst>
+                <a:ext uri="{FF2B5EF4-FFF2-40B4-BE49-F238E27FC236}">
+                  <a16:creationId xmlns:a16="http://schemas.microsoft.com/office/drawing/2014/main" id="{1FE78988-C7F8-FC44-9EEB-4B465F6F4E27}"/>
+                </a:ext>
+              </a:extLst>
+            </p:cNvPr>
+            <p:cNvSpPr txBox="1"/>
+            <p:nvPr/>
+          </p:nvSpPr>
+          <p:spPr>
+            <a:xfrm>
+              <a:off x="2852355" y="2243785"/>
+              <a:ext cx="3243645" cy="338554"/>
+            </a:xfrm>
+            <a:prstGeom prst="rect">
+              <a:avLst/>
+            </a:prstGeom>
+            <a:noFill/>
+          </p:spPr>
+          <p:txBody>
+            <a:bodyPr wrap="none" rtlCol="0">
+              <a:spAutoFit/>
+            </a:bodyPr>
+            <a:lstStyle/>
+            <a:p>
+              <a:r>
+                <a:rPr lang="en-GB" sz="1600" dirty="0"/>
+                <a:t>WS = Weak ancestral, Strong derived</a:t>
+              </a:r>
+            </a:p>
+          </p:txBody>
+        </p:sp>
+      </p:grpSp>
+      <p:sp>
+        <p:nvSpPr>
+          <p:cNvPr id="16" name="TextBox 15">
+            <a:extLst>
+              <a:ext uri="{FF2B5EF4-FFF2-40B4-BE49-F238E27FC236}">
+                <a16:creationId xmlns:a16="http://schemas.microsoft.com/office/drawing/2014/main" id="{22C33838-5ACB-6B4A-BDE6-8CB74EE49D0C}"/>
+              </a:ext>
+            </a:extLst>
+          </p:cNvPr>
+          <p:cNvSpPr txBox="1"/>
+          <p:nvPr/>
+        </p:nvSpPr>
+        <p:spPr>
+          <a:xfrm>
+            <a:off x="5309873" y="2636322"/>
+            <a:ext cx="1526187" cy="430887"/>
+          </a:xfrm>
+          <a:prstGeom prst="rect">
+            <a:avLst/>
+          </a:prstGeom>
+          <a:noFill/>
+        </p:spPr>
+        <p:txBody>
+          <a:bodyPr wrap="none" rtlCol="0">
+            <a:spAutoFit/>
+          </a:bodyPr>
+          <a:lstStyle/>
+          <a:p>
+            <a:r>
+              <a:rPr lang="en-GB" sz="2200" dirty="0"/>
+              <a:t>D: WS &gt; SW</a:t>
+            </a:r>
+          </a:p>
+        </p:txBody>
+      </p:sp>
+      <p:sp>
+        <p:nvSpPr>
+          <p:cNvPr id="17" name="TextBox 16">
+            <a:extLst>
+              <a:ext uri="{FF2B5EF4-FFF2-40B4-BE49-F238E27FC236}">
+                <a16:creationId xmlns:a16="http://schemas.microsoft.com/office/drawing/2014/main" id="{67721FC2-051B-F346-971E-0DE32BD78D00}"/>
+              </a:ext>
+            </a:extLst>
+          </p:cNvPr>
+          <p:cNvSpPr txBox="1"/>
+          <p:nvPr/>
+        </p:nvSpPr>
+        <p:spPr>
+          <a:xfrm>
+            <a:off x="5308270" y="3265714"/>
+            <a:ext cx="1529393" cy="430887"/>
+          </a:xfrm>
+          <a:prstGeom prst="rect">
+            <a:avLst/>
+          </a:prstGeom>
+          <a:noFill/>
+        </p:spPr>
+        <p:txBody>
+          <a:bodyPr wrap="none" rtlCol="0">
+            <a:spAutoFit/>
+          </a:bodyPr>
+          <a:lstStyle/>
+          <a:p>
+            <a:r>
+              <a:rPr lang="en-GB" sz="2200" dirty="0"/>
+              <a:t>H: WS &lt; SW</a:t>
+            </a:r>
+          </a:p>
+        </p:txBody>
+      </p:sp>
+      <p:grpSp>
+        <p:nvGrpSpPr>
+          <p:cNvPr id="18" name="Group 17">
+            <a:extLst>
+              <a:ext uri="{FF2B5EF4-FFF2-40B4-BE49-F238E27FC236}">
+                <a16:creationId xmlns:a16="http://schemas.microsoft.com/office/drawing/2014/main" id="{BAE21F49-C7C9-DF48-B12E-BF746B979BCB}"/>
+              </a:ext>
+            </a:extLst>
+          </p:cNvPr>
+          <p:cNvGrpSpPr/>
+          <p:nvPr/>
+        </p:nvGrpSpPr>
+        <p:grpSpPr>
+          <a:xfrm>
+            <a:off x="1798867" y="4525940"/>
+            <a:ext cx="8594266" cy="369332"/>
+            <a:chOff x="1974933" y="2246156"/>
+            <a:chExt cx="8594266" cy="369332"/>
+          </a:xfrm>
+        </p:grpSpPr>
+        <p:sp>
+          <p:nvSpPr>
+            <p:cNvPr id="19" name="TextBox 18">
+              <a:extLst>
+                <a:ext uri="{FF2B5EF4-FFF2-40B4-BE49-F238E27FC236}">
+                  <a16:creationId xmlns:a16="http://schemas.microsoft.com/office/drawing/2014/main" id="{A6819964-3EC0-184A-BEC8-1E753F91BCE8}"/>
+                </a:ext>
+              </a:extLst>
+            </p:cNvPr>
+            <p:cNvSpPr txBox="1"/>
+            <p:nvPr/>
+          </p:nvSpPr>
+          <p:spPr>
+            <a:xfrm>
+              <a:off x="6544315" y="2246156"/>
+              <a:ext cx="4024884" cy="369332"/>
+            </a:xfrm>
+            <a:prstGeom prst="rect">
+              <a:avLst/>
+            </a:prstGeom>
+            <a:noFill/>
+          </p:spPr>
+          <p:txBody>
+            <a:bodyPr wrap="none" rtlCol="0">
+              <a:spAutoFit/>
+            </a:bodyPr>
+            <a:lstStyle/>
+            <a:p>
+              <a:r>
+                <a:rPr lang="en-GB" dirty="0"/>
+                <a:t>SW = more low and less high frequencies</a:t>
+              </a:r>
+            </a:p>
+          </p:txBody>
+        </p:sp>
+        <p:sp>
+          <p:nvSpPr>
+            <p:cNvPr id="20" name="TextBox 19">
+              <a:extLst>
+                <a:ext uri="{FF2B5EF4-FFF2-40B4-BE49-F238E27FC236}">
+                  <a16:creationId xmlns:a16="http://schemas.microsoft.com/office/drawing/2014/main" id="{90C77ECA-04CA-F24F-A535-E64A2271E48D}"/>
+                </a:ext>
+              </a:extLst>
+            </p:cNvPr>
+            <p:cNvSpPr txBox="1"/>
+            <p:nvPr/>
+          </p:nvSpPr>
+          <p:spPr>
+            <a:xfrm>
+              <a:off x="1974933" y="2246156"/>
+              <a:ext cx="4025397" cy="369332"/>
+            </a:xfrm>
+            <a:prstGeom prst="rect">
+              <a:avLst/>
+            </a:prstGeom>
+            <a:noFill/>
+          </p:spPr>
+          <p:txBody>
+            <a:bodyPr wrap="none" rtlCol="0">
+              <a:spAutoFit/>
+            </a:bodyPr>
+            <a:lstStyle/>
+            <a:p>
+              <a:r>
+                <a:rPr lang="en-GB" dirty="0"/>
+                <a:t>WS = less low and more high frequencies</a:t>
+              </a:r>
+            </a:p>
+          </p:txBody>
+        </p:sp>
+      </p:grpSp>
     </p:spTree>
     <p:extLst>
       <p:ext uri="{BB962C8B-B14F-4D97-AF65-F5344CB8AC3E}">
-        <p14:creationId xmlns:p14="http://schemas.microsoft.com/office/powerpoint/2010/main" val="4085342594"/>
+        <p14:creationId xmlns:p14="http://schemas.microsoft.com/office/powerpoint/2010/main" val="2721920372"/>
       </p:ext>
     </p:extLst>
   </p:cSld>

</xml_diff>